<commit_message>
transferred some content to powerpoint poster
</commit_message>
<xml_diff>
--- a/poster/poster.pptx
+++ b/poster/poster.pptx
@@ -288,7 +288,7 @@
           <a:p>
             <a:fld id="{0809B32C-EADE-4737-9FCF-CC2867D24216}" type="datetimeFigureOut">
               <a:rPr lang="en-US" smtClean="0"/>
-              <a:t>5/25/2018</a:t>
+              <a:t>5/26/2018</a:t>
             </a:fld>
             <a:endParaRPr lang="en-US"/>
           </a:p>
@@ -458,7 +458,7 @@
           <a:p>
             <a:fld id="{0809B32C-EADE-4737-9FCF-CC2867D24216}" type="datetimeFigureOut">
               <a:rPr lang="en-US" smtClean="0"/>
-              <a:t>5/25/2018</a:t>
+              <a:t>5/26/2018</a:t>
             </a:fld>
             <a:endParaRPr lang="en-US"/>
           </a:p>
@@ -638,7 +638,7 @@
           <a:p>
             <a:fld id="{0809B32C-EADE-4737-9FCF-CC2867D24216}" type="datetimeFigureOut">
               <a:rPr lang="en-US" smtClean="0"/>
-              <a:t>5/25/2018</a:t>
+              <a:t>5/26/2018</a:t>
             </a:fld>
             <a:endParaRPr lang="en-US"/>
           </a:p>
@@ -808,7 +808,7 @@
           <a:p>
             <a:fld id="{0809B32C-EADE-4737-9FCF-CC2867D24216}" type="datetimeFigureOut">
               <a:rPr lang="en-US" smtClean="0"/>
-              <a:t>5/25/2018</a:t>
+              <a:t>5/26/2018</a:t>
             </a:fld>
             <a:endParaRPr lang="en-US"/>
           </a:p>
@@ -1054,7 +1054,7 @@
           <a:p>
             <a:fld id="{0809B32C-EADE-4737-9FCF-CC2867D24216}" type="datetimeFigureOut">
               <a:rPr lang="en-US" smtClean="0"/>
-              <a:t>5/25/2018</a:t>
+              <a:t>5/26/2018</a:t>
             </a:fld>
             <a:endParaRPr lang="en-US"/>
           </a:p>
@@ -1342,7 +1342,7 @@
           <a:p>
             <a:fld id="{0809B32C-EADE-4737-9FCF-CC2867D24216}" type="datetimeFigureOut">
               <a:rPr lang="en-US" smtClean="0"/>
-              <a:t>5/25/2018</a:t>
+              <a:t>5/26/2018</a:t>
             </a:fld>
             <a:endParaRPr lang="en-US"/>
           </a:p>
@@ -1769,7 +1769,7 @@
           <a:p>
             <a:fld id="{0809B32C-EADE-4737-9FCF-CC2867D24216}" type="datetimeFigureOut">
               <a:rPr lang="en-US" smtClean="0"/>
-              <a:t>5/25/2018</a:t>
+              <a:t>5/26/2018</a:t>
             </a:fld>
             <a:endParaRPr lang="en-US"/>
           </a:p>
@@ -1887,7 +1887,7 @@
           <a:p>
             <a:fld id="{0809B32C-EADE-4737-9FCF-CC2867D24216}" type="datetimeFigureOut">
               <a:rPr lang="en-US" smtClean="0"/>
-              <a:t>5/25/2018</a:t>
+              <a:t>5/26/2018</a:t>
             </a:fld>
             <a:endParaRPr lang="en-US"/>
           </a:p>
@@ -1982,7 +1982,7 @@
           <a:p>
             <a:fld id="{0809B32C-EADE-4737-9FCF-CC2867D24216}" type="datetimeFigureOut">
               <a:rPr lang="en-US" smtClean="0"/>
-              <a:t>5/25/2018</a:t>
+              <a:t>5/26/2018</a:t>
             </a:fld>
             <a:endParaRPr lang="en-US"/>
           </a:p>
@@ -2259,7 +2259,7 @@
           <a:p>
             <a:fld id="{0809B32C-EADE-4737-9FCF-CC2867D24216}" type="datetimeFigureOut">
               <a:rPr lang="en-US" smtClean="0"/>
-              <a:t>5/25/2018</a:t>
+              <a:t>5/26/2018</a:t>
             </a:fld>
             <a:endParaRPr lang="en-US"/>
           </a:p>
@@ -2512,7 +2512,7 @@
           <a:p>
             <a:fld id="{0809B32C-EADE-4737-9FCF-CC2867D24216}" type="datetimeFigureOut">
               <a:rPr lang="en-US" smtClean="0"/>
-              <a:t>5/25/2018</a:t>
+              <a:t>5/26/2018</a:t>
             </a:fld>
             <a:endParaRPr lang="en-US"/>
           </a:p>
@@ -2725,7 +2725,7 @@
           <a:p>
             <a:fld id="{0809B32C-EADE-4737-9FCF-CC2867D24216}" type="datetimeFigureOut">
               <a:rPr lang="en-US" smtClean="0"/>
-              <a:t>5/25/2018</a:t>
+              <a:t>5/26/2018</a:t>
             </a:fld>
             <a:endParaRPr lang="en-US"/>
           </a:p>
@@ -3102,50 +3102,6 @@
       </p:grpSpPr>
       <p:sp>
         <p:nvSpPr>
-          <p:cNvPr id="5" name="Rounded Rectangle 4"/>
-          <p:cNvSpPr/>
-          <p:nvPr/>
-        </p:nvSpPr>
-        <p:spPr>
-          <a:xfrm>
-            <a:off x="228600" y="12801600"/>
-            <a:ext cx="15087600" cy="19888200"/>
-          </a:xfrm>
-          <a:prstGeom prst="roundRect">
-            <a:avLst>
-              <a:gd name="adj" fmla="val 2972"/>
-            </a:avLst>
-          </a:prstGeom>
-          <a:noFill/>
-          <a:ln w="38100"/>
-        </p:spPr>
-        <p:style>
-          <a:lnRef idx="2">
-            <a:schemeClr val="accent1">
-              <a:shade val="50000"/>
-            </a:schemeClr>
-          </a:lnRef>
-          <a:fillRef idx="1">
-            <a:schemeClr val="accent1"/>
-          </a:fillRef>
-          <a:effectRef idx="0">
-            <a:schemeClr val="accent1"/>
-          </a:effectRef>
-          <a:fontRef idx="minor">
-            <a:schemeClr val="lt1"/>
-          </a:fontRef>
-        </p:style>
-        <p:txBody>
-          <a:bodyPr rtlCol="0" anchor="ctr"/>
-          <a:lstStyle/>
-          <a:p>
-            <a:pPr algn="ctr"/>
-            <a:endParaRPr lang="en-US"/>
-          </a:p>
-        </p:txBody>
-      </p:sp>
-      <p:sp>
-        <p:nvSpPr>
           <p:cNvPr id="11" name="Rounded Rectangle 10"/>
           <p:cNvSpPr/>
           <p:nvPr/>
@@ -3153,7 +3109,7 @@
         <p:spPr>
           <a:xfrm>
             <a:off x="228601" y="3657600"/>
-            <a:ext cx="15087599" cy="8915400"/>
+            <a:ext cx="15087599" cy="29032200"/>
           </a:xfrm>
           <a:prstGeom prst="roundRect">
             <a:avLst>
@@ -3241,7 +3197,7 @@
         <p:spPr>
           <a:xfrm>
             <a:off x="29260800" y="3657600"/>
-            <a:ext cx="14401800" cy="20574000"/>
+            <a:ext cx="14401800" cy="11887200"/>
           </a:xfrm>
           <a:prstGeom prst="roundRect">
             <a:avLst>
@@ -3284,7 +3240,7 @@
         </p:nvSpPr>
         <p:spPr>
           <a:xfrm>
-            <a:off x="457200" y="13944600"/>
+            <a:off x="457200" y="22631400"/>
             <a:ext cx="14630399" cy="707886"/>
           </a:xfrm>
           <a:prstGeom prst="rect">
@@ -3303,7 +3259,6 @@
               <a:rPr lang="en-US" sz="4000" dirty="0" smtClean="0"/>
               <a:t>Text</a:t>
             </a:r>
-            <a:endParaRPr lang="en-US" sz="4000" dirty="0" smtClean="0"/>
           </a:p>
         </p:txBody>
       </p:sp>
@@ -3377,7 +3332,7 @@
         </p:nvSpPr>
         <p:spPr>
           <a:xfrm>
-            <a:off x="29260800" y="24460200"/>
+            <a:off x="29260800" y="15773400"/>
             <a:ext cx="14401800" cy="8229600"/>
           </a:xfrm>
           <a:prstGeom prst="roundRect">
@@ -3422,9 +3377,9 @@
         <p:grpSpPr>
           <a:xfrm>
             <a:off x="457200" y="3657600"/>
-            <a:ext cx="36495269" cy="22002929"/>
+            <a:ext cx="36495269" cy="24469130"/>
             <a:chOff x="457200" y="3657600"/>
-            <a:chExt cx="36495269" cy="22002929"/>
+            <a:chExt cx="36495269" cy="24469130"/>
           </a:xfrm>
         </p:grpSpPr>
         <p:sp>
@@ -3436,7 +3391,7 @@
           <p:spPr>
             <a:xfrm>
               <a:off x="457200" y="3657600"/>
-              <a:ext cx="3429080" cy="1200329"/>
+              <a:ext cx="4724307" cy="1200329"/>
             </a:xfrm>
             <a:prstGeom prst="rect">
               <a:avLst/>
@@ -3455,7 +3410,7 @@
                     <a:srgbClr val="33006F"/>
                   </a:solidFill>
                 </a:rPr>
-                <a:t>Problem</a:t>
+                <a:t>Background</a:t>
               </a:r>
               <a:endParaRPr lang="en-US" sz="7200" b="1" dirty="0" smtClean="0">
                 <a:solidFill>
@@ -3473,7 +3428,7 @@
           </p:nvSpPr>
           <p:spPr>
             <a:xfrm>
-              <a:off x="457200" y="12801600"/>
+              <a:off x="457200" y="21488400"/>
               <a:ext cx="14401800" cy="1200329"/>
             </a:xfrm>
             <a:prstGeom prst="rect">
@@ -3625,7 +3580,7 @@
           </p:nvSpPr>
           <p:spPr>
             <a:xfrm>
-              <a:off x="29489400" y="24460200"/>
+              <a:off x="29489400" y="16002000"/>
               <a:ext cx="4979248" cy="1200329"/>
             </a:xfrm>
             <a:prstGeom prst="rect">
@@ -3693,6 +3648,120 @@
             </a:p>
           </p:txBody>
         </p:sp>
+        <p:sp>
+          <p:nvSpPr>
+            <p:cNvPr id="26" name="TextBox 25"/>
+            <p:cNvSpPr txBox="1"/>
+            <p:nvPr/>
+          </p:nvSpPr>
+          <p:spPr>
+            <a:xfrm>
+              <a:off x="15773400" y="27203400"/>
+              <a:ext cx="2875339" cy="923330"/>
+            </a:xfrm>
+            <a:prstGeom prst="rect">
+              <a:avLst/>
+            </a:prstGeom>
+            <a:noFill/>
+          </p:spPr>
+          <p:txBody>
+            <a:bodyPr wrap="none" rtlCol="0">
+              <a:spAutoFit/>
+            </a:bodyPr>
+            <a:lstStyle/>
+            <a:p>
+              <a:r>
+                <a:rPr lang="en-US" sz="5400" b="1" dirty="0" smtClean="0">
+                  <a:solidFill>
+                    <a:srgbClr val="33006F"/>
+                  </a:solidFill>
+                </a:rPr>
+                <a:t>Narrative</a:t>
+              </a:r>
+              <a:endParaRPr lang="en-US" sz="5400" b="1" dirty="0">
+                <a:solidFill>
+                  <a:srgbClr val="33006F"/>
+                </a:solidFill>
+              </a:endParaRPr>
+            </a:p>
+          </p:txBody>
+        </p:sp>
+        <p:sp>
+          <p:nvSpPr>
+            <p:cNvPr id="28" name="TextBox 27"/>
+            <p:cNvSpPr txBox="1"/>
+            <p:nvPr/>
+          </p:nvSpPr>
+          <p:spPr>
+            <a:xfrm>
+              <a:off x="457200" y="16401871"/>
+              <a:ext cx="14401800" cy="1200329"/>
+            </a:xfrm>
+            <a:prstGeom prst="rect">
+              <a:avLst/>
+            </a:prstGeom>
+            <a:noFill/>
+          </p:spPr>
+          <p:txBody>
+            <a:bodyPr wrap="square" rtlCol="0">
+              <a:spAutoFit/>
+            </a:bodyPr>
+            <a:lstStyle/>
+            <a:p>
+              <a:r>
+                <a:rPr lang="en-US" sz="7200" b="1" dirty="0" smtClean="0">
+                  <a:solidFill>
+                    <a:srgbClr val="33006F"/>
+                  </a:solidFill>
+                </a:rPr>
+                <a:t>Problem</a:t>
+              </a:r>
+              <a:endParaRPr lang="en-US" sz="7200" b="1" dirty="0">
+                <a:solidFill>
+                  <a:srgbClr val="33006F"/>
+                </a:solidFill>
+              </a:endParaRPr>
+            </a:p>
+          </p:txBody>
+        </p:sp>
+        <p:sp>
+          <p:nvSpPr>
+            <p:cNvPr id="30" name="TextBox 29"/>
+            <p:cNvSpPr txBox="1"/>
+            <p:nvPr/>
+          </p:nvSpPr>
+          <p:spPr>
+            <a:xfrm>
+              <a:off x="29489400" y="24231600"/>
+              <a:ext cx="4387355" cy="1200329"/>
+            </a:xfrm>
+            <a:prstGeom prst="rect">
+              <a:avLst/>
+            </a:prstGeom>
+            <a:noFill/>
+          </p:spPr>
+          <p:txBody>
+            <a:bodyPr wrap="none" rtlCol="0">
+              <a:spAutoFit/>
+            </a:bodyPr>
+            <a:lstStyle/>
+            <a:p>
+              <a:r>
+                <a:rPr lang="en-US" sz="7200" b="1" dirty="0" smtClean="0">
+                  <a:solidFill>
+                    <a:srgbClr val="33006F"/>
+                  </a:solidFill>
+                </a:rPr>
+                <a:t>References</a:t>
+              </a:r>
+              <a:endParaRPr lang="en-US" sz="7200" b="1" dirty="0">
+                <a:solidFill>
+                  <a:srgbClr val="33006F"/>
+                </a:solidFill>
+              </a:endParaRPr>
+            </a:p>
+          </p:txBody>
+        </p:sp>
       </p:grpSp>
       <p:sp>
         <p:nvSpPr>
@@ -3703,7 +3772,7 @@
         <p:spPr>
           <a:xfrm>
             <a:off x="457200" y="4800600"/>
-            <a:ext cx="14630400" cy="707886"/>
+            <a:ext cx="14630400" cy="10895290"/>
           </a:xfrm>
           <a:prstGeom prst="rect">
             <a:avLst/>
@@ -3716,12 +3785,180 @@
           </a:bodyPr>
           <a:lstStyle/>
           <a:p>
-            <a:pPr algn="just"/>
-            <a:r>
-              <a:rPr lang="en-US" sz="4000" dirty="0" smtClean="0"/>
-              <a:t>Text</a:t>
-            </a:r>
-            <a:endParaRPr lang="en-US" sz="4000" dirty="0" smtClean="0"/>
+            <a:r>
+              <a:rPr lang="en-US" sz="3600" dirty="0"/>
+              <a:t>Coastal cities all along the west coast are susceptible to damage caused by </a:t>
+            </a:r>
+            <a:r>
+              <a:rPr lang="en-US" sz="3600" dirty="0" smtClean="0"/>
+              <a:t>tsunamis. In </a:t>
+            </a:r>
+            <a:r>
+              <a:rPr lang="en-US" sz="3600" dirty="0"/>
+              <a:t>order to improve tsunami preparedness, researchers turn to numerical simulations </a:t>
+            </a:r>
+            <a:r>
+              <a:rPr lang="en-US" sz="3600" dirty="0" smtClean="0"/>
+              <a:t>to predict </a:t>
+            </a:r>
+            <a:r>
+              <a:rPr lang="en-US" sz="3600" dirty="0"/>
+              <a:t>the impact of tsunamis caused by different seismological events. One set of </a:t>
+            </a:r>
+            <a:r>
+              <a:rPr lang="en-US" sz="3600" dirty="0" smtClean="0"/>
+              <a:t>simulations</a:t>
+            </a:r>
+            <a:r>
+              <a:rPr lang="en-US" sz="3600" dirty="0"/>
+              <a:t>, carried out by researchers at the University of Washington, model the effects </a:t>
+            </a:r>
+            <a:r>
+              <a:rPr lang="en-US" sz="3600" dirty="0" smtClean="0"/>
+              <a:t>of several </a:t>
+            </a:r>
+            <a:r>
+              <a:rPr lang="en-US" sz="3600" dirty="0"/>
+              <a:t>tsunamis on a region of Crescent City, California which has a history of </a:t>
+            </a:r>
+            <a:r>
+              <a:rPr lang="en-US" sz="3600" dirty="0" smtClean="0"/>
+              <a:t>extreme damage </a:t>
+            </a:r>
+            <a:r>
+              <a:rPr lang="en-US" sz="3600" dirty="0"/>
+              <a:t>from tsunamis. By estimating the probability of occurrence of each </a:t>
+            </a:r>
+            <a:r>
+              <a:rPr lang="en-US" sz="3600" dirty="0" smtClean="0"/>
+              <a:t>simulated tsunami</a:t>
+            </a:r>
+            <a:r>
+              <a:rPr lang="en-US" sz="3600" dirty="0"/>
+              <a:t>, the annual probability of exceeding a given level of inundation (flooding) </a:t>
+            </a:r>
+            <a:r>
+              <a:rPr lang="en-US" sz="3600" dirty="0" smtClean="0"/>
+              <a:t>can be </a:t>
+            </a:r>
+            <a:r>
+              <a:rPr lang="en-US" sz="3600" dirty="0"/>
+              <a:t>estimated for every point in the landscape, giving rise to a hazard map. There </a:t>
+            </a:r>
+            <a:r>
+              <a:rPr lang="en-US" sz="3600" dirty="0" smtClean="0"/>
+              <a:t>are multiple </a:t>
+            </a:r>
+            <a:r>
+              <a:rPr lang="en-US" sz="3600" dirty="0"/>
+              <a:t>sources of uncertainty that feed into hazard </a:t>
+            </a:r>
+            <a:r>
+              <a:rPr lang="en-US" sz="3600" dirty="0" smtClean="0"/>
+              <a:t>maps:</a:t>
+            </a:r>
+          </a:p>
+          <a:p>
+            <a:endParaRPr lang="en-US" sz="900" dirty="0" smtClean="0"/>
+          </a:p>
+          <a:p>
+            <a:pPr marL="914400" lvl="1" indent="-640080">
+              <a:buFont typeface="+mj-lt"/>
+              <a:buAutoNum type="arabicPeriod"/>
+            </a:pPr>
+            <a:r>
+              <a:rPr lang="en-US" sz="3600" dirty="0" smtClean="0"/>
+              <a:t>Estimation </a:t>
+            </a:r>
+            <a:r>
+              <a:rPr lang="en-US" sz="3600" dirty="0"/>
+              <a:t>of the annual likelihood of different seismic events</a:t>
+            </a:r>
+          </a:p>
+          <a:p>
+            <a:pPr marL="914400" lvl="1" indent="-640080">
+              <a:buFont typeface="+mj-lt"/>
+              <a:buAutoNum type="arabicPeriod"/>
+            </a:pPr>
+            <a:r>
+              <a:rPr lang="en-US" sz="3600" dirty="0" smtClean="0"/>
+              <a:t>Error </a:t>
+            </a:r>
+            <a:r>
+              <a:rPr lang="en-US" sz="3600" dirty="0"/>
+              <a:t>in the numerical simulations of </a:t>
+            </a:r>
+            <a:r>
+              <a:rPr lang="en-US" sz="3600" dirty="0" smtClean="0"/>
+              <a:t>tsunamis</a:t>
+            </a:r>
+            <a:endParaRPr lang="en-US" sz="3600" dirty="0"/>
+          </a:p>
+          <a:p>
+            <a:pPr marL="914400" lvl="1" indent="-640080">
+              <a:buFont typeface="+mj-lt"/>
+              <a:buAutoNum type="arabicPeriod"/>
+            </a:pPr>
+            <a:r>
+              <a:rPr lang="en-US" sz="3600" dirty="0" smtClean="0"/>
+              <a:t>Variance </a:t>
+            </a:r>
+            <a:r>
+              <a:rPr lang="en-US" sz="3600" dirty="0"/>
+              <a:t>due to the relatively small number of simulated events</a:t>
+            </a:r>
+          </a:p>
+          <a:p>
+            <a:pPr marL="914400" lvl="1" indent="-640080">
+              <a:buFont typeface="+mj-lt"/>
+              <a:buAutoNum type="arabicPeriod"/>
+            </a:pPr>
+            <a:r>
+              <a:rPr lang="en-US" sz="3600" dirty="0" smtClean="0"/>
+              <a:t>Error </a:t>
+            </a:r>
+            <a:r>
+              <a:rPr lang="en-US" sz="3600" dirty="0"/>
+              <a:t>due to the assumption that the seismic events are </a:t>
+            </a:r>
+            <a:r>
+              <a:rPr lang="en-US" sz="3600" dirty="0" smtClean="0"/>
+              <a:t>independent</a:t>
+            </a:r>
+          </a:p>
+          <a:p>
+            <a:pPr marL="914400" lvl="1" indent="-640080">
+              <a:buFont typeface="+mj-lt"/>
+              <a:buAutoNum type="arabicPeriod"/>
+            </a:pPr>
+            <a:endParaRPr lang="en-US" sz="900" dirty="0"/>
+          </a:p>
+          <a:p>
+            <a:r>
+              <a:rPr lang="en-US" sz="3600" dirty="0"/>
+              <a:t>Furthermore, the hazard maps plot complicated hazard functions at every point, </a:t>
+            </a:r>
+            <a:r>
+              <a:rPr lang="en-US" sz="3600" dirty="0" smtClean="0"/>
+              <a:t>which describes </a:t>
+            </a:r>
+            <a:r>
+              <a:rPr lang="en-US" sz="3600" dirty="0"/>
+              <a:t>the probability of inundation at every depth. Properly interpreting this map </a:t>
+            </a:r>
+            <a:r>
+              <a:rPr lang="en-US" sz="3600" dirty="0" smtClean="0"/>
+              <a:t>can be </a:t>
+            </a:r>
+            <a:r>
+              <a:rPr lang="en-US" sz="3600" dirty="0"/>
+              <a:t>difficult for people without a technical background</a:t>
+            </a:r>
+            <a:r>
+              <a:rPr lang="en-US" sz="3600" dirty="0" smtClean="0"/>
+              <a:t>.</a:t>
+            </a:r>
+            <a:endParaRPr lang="en-US" sz="3600" dirty="0"/>
           </a:p>
         </p:txBody>
       </p:sp>
@@ -3791,7 +4028,6 @@
               <a:rPr lang="en-US" sz="4000" dirty="0" smtClean="0"/>
               <a:t>Text</a:t>
             </a:r>
-            <a:endParaRPr lang="en-US" sz="4000" dirty="0" smtClean="0"/>
           </a:p>
         </p:txBody>
       </p:sp>
@@ -3803,7 +4039,7 @@
         </p:nvSpPr>
         <p:spPr>
           <a:xfrm>
-            <a:off x="29489400" y="25603200"/>
+            <a:off x="29489400" y="17145000"/>
             <a:ext cx="13944600" cy="707886"/>
           </a:xfrm>
           <a:prstGeom prst="rect">
@@ -3821,7 +4057,6 @@
               <a:rPr lang="en-US" sz="4000" dirty="0" smtClean="0"/>
               <a:t>Text</a:t>
             </a:r>
-            <a:endParaRPr lang="en-US" sz="4000" dirty="0" smtClean="0"/>
           </a:p>
         </p:txBody>
       </p:sp>
@@ -3904,8 +4139,8 @@
         </p:nvSpPr>
         <p:spPr>
           <a:xfrm>
-            <a:off x="15773400" y="22860000"/>
-            <a:ext cx="13030200" cy="707886"/>
+            <a:off x="15773400" y="28117800"/>
+            <a:ext cx="13030200" cy="1754326"/>
           </a:xfrm>
           <a:prstGeom prst="rect">
             <a:avLst/>
@@ -3920,10 +4155,239 @@
           <a:p>
             <a:pPr algn="just"/>
             <a:r>
+              <a:rPr lang="en-US" sz="3600" dirty="0"/>
+              <a:t>To make the </a:t>
+            </a:r>
+            <a:r>
+              <a:rPr lang="en-US" sz="3600" dirty="0" smtClean="0"/>
+              <a:t>visualizations </a:t>
+            </a:r>
+            <a:r>
+              <a:rPr lang="en-US" sz="3600" dirty="0"/>
+              <a:t>more digestible we embed </a:t>
+            </a:r>
+            <a:r>
+              <a:rPr lang="en-US" sz="3600" dirty="0" smtClean="0"/>
+              <a:t>them </a:t>
+            </a:r>
+            <a:r>
+              <a:rPr lang="en-US" sz="3600" dirty="0"/>
+              <a:t>within a larger narrative structure. In particular, we adopt the </a:t>
+            </a:r>
+            <a:r>
+              <a:rPr lang="en-US" sz="3600" dirty="0" smtClean="0"/>
+              <a:t>“magazine style” </a:t>
+            </a:r>
+            <a:r>
+              <a:rPr lang="en-US" sz="3600" dirty="0"/>
+              <a:t>approach of </a:t>
+            </a:r>
+            <a:r>
+              <a:rPr lang="en-US" sz="3600" dirty="0" err="1" smtClean="0"/>
+              <a:t>Segel</a:t>
+            </a:r>
+            <a:r>
+              <a:rPr lang="en-US" sz="3600" dirty="0" smtClean="0"/>
+              <a:t> and </a:t>
+            </a:r>
+            <a:r>
+              <a:rPr lang="en-US" sz="3600" dirty="0" err="1" smtClean="0"/>
+              <a:t>Heer</a:t>
+            </a:r>
+            <a:r>
+              <a:rPr lang="en-US" sz="3600" dirty="0" smtClean="0"/>
+              <a:t> [3].</a:t>
+            </a:r>
+            <a:endParaRPr lang="en-US" sz="3600" dirty="0"/>
+          </a:p>
+        </p:txBody>
+      </p:sp>
+      <p:sp>
+        <p:nvSpPr>
+          <p:cNvPr id="27" name="TextBox 26"/>
+          <p:cNvSpPr txBox="1"/>
+          <p:nvPr/>
+        </p:nvSpPr>
+        <p:spPr>
+          <a:xfrm>
+            <a:off x="457200" y="17527012"/>
+            <a:ext cx="14630399" cy="3046988"/>
+          </a:xfrm>
+          <a:prstGeom prst="rect">
+            <a:avLst/>
+          </a:prstGeom>
+          <a:noFill/>
+        </p:spPr>
+        <p:txBody>
+          <a:bodyPr wrap="square" rtlCol="0">
+            <a:spAutoFit/>
+          </a:bodyPr>
+          <a:lstStyle/>
+          <a:p>
+            <a:pPr algn="just"/>
+            <a:r>
+              <a:rPr lang="en-US" sz="3200" dirty="0"/>
+              <a:t>Our project seeks to address the following problems:</a:t>
+            </a:r>
+          </a:p>
+          <a:p>
+            <a:pPr marL="514350" indent="-514350" algn="just">
+              <a:buFont typeface="+mj-lt"/>
+              <a:buAutoNum type="arabicPeriod"/>
+            </a:pPr>
+            <a:r>
+              <a:rPr lang="en-US" sz="3200" dirty="0" smtClean="0"/>
+              <a:t>Hazard </a:t>
+            </a:r>
+            <a:r>
+              <a:rPr lang="en-US" sz="3200" dirty="0"/>
+              <a:t>maps and the data used to produce them contain multiple sources </a:t>
+            </a:r>
+            <a:r>
+              <a:rPr lang="en-US" sz="3200" dirty="0" smtClean="0"/>
+              <a:t>of uncertainty</a:t>
+            </a:r>
+            <a:r>
+              <a:rPr lang="en-US" sz="3200" dirty="0"/>
+              <a:t>. It is challenging to communicate this uncertainty alongside or </a:t>
+            </a:r>
+            <a:r>
+              <a:rPr lang="en-US" sz="3200" dirty="0" smtClean="0"/>
+              <a:t>as part </a:t>
+            </a:r>
+            <a:r>
+              <a:rPr lang="en-US" sz="3200" dirty="0"/>
+              <a:t>of hazard maps in an intuitive way.</a:t>
+            </a:r>
+          </a:p>
+          <a:p>
+            <a:pPr marL="514350" indent="-514350" algn="just">
+              <a:buFont typeface="+mj-lt"/>
+              <a:buAutoNum type="arabicPeriod"/>
+            </a:pPr>
+            <a:r>
+              <a:rPr lang="en-US" sz="3200" dirty="0" smtClean="0"/>
+              <a:t>Hazard </a:t>
+            </a:r>
+            <a:r>
+              <a:rPr lang="en-US" sz="3200" dirty="0"/>
+              <a:t>maps are inherently complex and nuanced and can therefore be </a:t>
+            </a:r>
+            <a:r>
+              <a:rPr lang="en-US" sz="3200" dirty="0" smtClean="0"/>
+              <a:t>difficult for </a:t>
+            </a:r>
+            <a:r>
+              <a:rPr lang="en-US" sz="3200" dirty="0"/>
+              <a:t>non-experts to decipher.</a:t>
+            </a:r>
+            <a:endParaRPr lang="en-US" sz="3200" dirty="0" smtClean="0"/>
+          </a:p>
+        </p:txBody>
+      </p:sp>
+      <p:sp>
+        <p:nvSpPr>
+          <p:cNvPr id="29" name="Rounded Rectangle 28"/>
+          <p:cNvSpPr/>
+          <p:nvPr/>
+        </p:nvSpPr>
+        <p:spPr>
+          <a:xfrm>
+            <a:off x="29260800" y="24231600"/>
+            <a:ext cx="14401800" cy="8229600"/>
+          </a:xfrm>
+          <a:prstGeom prst="roundRect">
+            <a:avLst>
+              <a:gd name="adj" fmla="val 5302"/>
+            </a:avLst>
+          </a:prstGeom>
+          <a:noFill/>
+          <a:ln w="38100"/>
+        </p:spPr>
+        <p:style>
+          <a:lnRef idx="2">
+            <a:schemeClr val="accent1">
+              <a:shade val="50000"/>
+            </a:schemeClr>
+          </a:lnRef>
+          <a:fillRef idx="1">
+            <a:schemeClr val="accent1"/>
+          </a:fillRef>
+          <a:effectRef idx="0">
+            <a:schemeClr val="accent1"/>
+          </a:effectRef>
+          <a:fontRef idx="minor">
+            <a:schemeClr val="lt1"/>
+          </a:fontRef>
+        </p:style>
+        <p:txBody>
+          <a:bodyPr rtlCol="0" anchor="ctr"/>
+          <a:lstStyle/>
+          <a:p>
+            <a:pPr algn="ctr"/>
+            <a:endParaRPr lang="en-US"/>
+          </a:p>
+        </p:txBody>
+      </p:sp>
+      <p:sp>
+        <p:nvSpPr>
+          <p:cNvPr id="31" name="TextBox 30"/>
+          <p:cNvSpPr txBox="1"/>
+          <p:nvPr/>
+        </p:nvSpPr>
+        <p:spPr>
+          <a:xfrm>
+            <a:off x="29489400" y="25374600"/>
+            <a:ext cx="13944600" cy="1938992"/>
+          </a:xfrm>
+          <a:prstGeom prst="rect">
+            <a:avLst/>
+          </a:prstGeom>
+          <a:noFill/>
+        </p:spPr>
+        <p:txBody>
+          <a:bodyPr wrap="square" rtlCol="0">
+            <a:spAutoFit/>
+          </a:bodyPr>
+          <a:lstStyle/>
+          <a:p>
+            <a:r>
               <a:rPr lang="en-US" sz="4000" dirty="0" smtClean="0"/>
-              <a:t>Text</a:t>
-            </a:r>
-            <a:endParaRPr lang="en-US" sz="4000" dirty="0"/>
+              <a:t>[3] Edward </a:t>
+            </a:r>
+            <a:r>
+              <a:rPr lang="en-US" sz="4000" dirty="0" err="1"/>
+              <a:t>Segel</a:t>
+            </a:r>
+            <a:r>
+              <a:rPr lang="en-US" sz="4000" dirty="0"/>
+              <a:t> and Jeffrey </a:t>
+            </a:r>
+            <a:r>
+              <a:rPr lang="en-US" sz="4000" dirty="0" err="1"/>
+              <a:t>Heer</a:t>
+            </a:r>
+            <a:r>
+              <a:rPr lang="en-US" sz="4000" dirty="0"/>
+              <a:t>. Narrative visualization: Telling stories with </a:t>
+            </a:r>
+            <a:r>
+              <a:rPr lang="en-US" sz="4000" dirty="0" smtClean="0"/>
+              <a:t>data. </a:t>
+            </a:r>
+            <a:r>
+              <a:rPr lang="en-US" sz="4000" i="1" dirty="0" smtClean="0"/>
+              <a:t>IEEE </a:t>
+            </a:r>
+            <a:r>
+              <a:rPr lang="en-US" sz="4000" i="1" dirty="0"/>
+              <a:t>transactions on visualization and computer graphics</a:t>
+            </a:r>
+            <a:r>
+              <a:rPr lang="en-US" sz="4000" dirty="0"/>
+              <a:t>, 16(6):1139–1148, 2010.</a:t>
+            </a:r>
+            <a:endParaRPr lang="en-US" sz="4000" dirty="0" smtClean="0"/>
           </a:p>
         </p:txBody>
       </p:sp>

</xml_diff>

<commit_message>
added figure to small multiples
</commit_message>
<xml_diff>
--- a/poster/poster.pptx
+++ b/poster/poster.pptx
@@ -288,7 +288,7 @@
           <a:p>
             <a:fld id="{0809B32C-EADE-4737-9FCF-CC2867D24216}" type="datetimeFigureOut">
               <a:rPr lang="en-US" smtClean="0"/>
-              <a:t>5/26/2018</a:t>
+              <a:t>5/27/2018</a:t>
             </a:fld>
             <a:endParaRPr lang="en-US"/>
           </a:p>
@@ -458,7 +458,7 @@
           <a:p>
             <a:fld id="{0809B32C-EADE-4737-9FCF-CC2867D24216}" type="datetimeFigureOut">
               <a:rPr lang="en-US" smtClean="0"/>
-              <a:t>5/26/2018</a:t>
+              <a:t>5/27/2018</a:t>
             </a:fld>
             <a:endParaRPr lang="en-US"/>
           </a:p>
@@ -638,7 +638,7 @@
           <a:p>
             <a:fld id="{0809B32C-EADE-4737-9FCF-CC2867D24216}" type="datetimeFigureOut">
               <a:rPr lang="en-US" smtClean="0"/>
-              <a:t>5/26/2018</a:t>
+              <a:t>5/27/2018</a:t>
             </a:fld>
             <a:endParaRPr lang="en-US"/>
           </a:p>
@@ -808,7 +808,7 @@
           <a:p>
             <a:fld id="{0809B32C-EADE-4737-9FCF-CC2867D24216}" type="datetimeFigureOut">
               <a:rPr lang="en-US" smtClean="0"/>
-              <a:t>5/26/2018</a:t>
+              <a:t>5/27/2018</a:t>
             </a:fld>
             <a:endParaRPr lang="en-US"/>
           </a:p>
@@ -1054,7 +1054,7 @@
           <a:p>
             <a:fld id="{0809B32C-EADE-4737-9FCF-CC2867D24216}" type="datetimeFigureOut">
               <a:rPr lang="en-US" smtClean="0"/>
-              <a:t>5/26/2018</a:t>
+              <a:t>5/27/2018</a:t>
             </a:fld>
             <a:endParaRPr lang="en-US"/>
           </a:p>
@@ -1342,7 +1342,7 @@
           <a:p>
             <a:fld id="{0809B32C-EADE-4737-9FCF-CC2867D24216}" type="datetimeFigureOut">
               <a:rPr lang="en-US" smtClean="0"/>
-              <a:t>5/26/2018</a:t>
+              <a:t>5/27/2018</a:t>
             </a:fld>
             <a:endParaRPr lang="en-US"/>
           </a:p>
@@ -1769,7 +1769,7 @@
           <a:p>
             <a:fld id="{0809B32C-EADE-4737-9FCF-CC2867D24216}" type="datetimeFigureOut">
               <a:rPr lang="en-US" smtClean="0"/>
-              <a:t>5/26/2018</a:t>
+              <a:t>5/27/2018</a:t>
             </a:fld>
             <a:endParaRPr lang="en-US"/>
           </a:p>
@@ -1887,7 +1887,7 @@
           <a:p>
             <a:fld id="{0809B32C-EADE-4737-9FCF-CC2867D24216}" type="datetimeFigureOut">
               <a:rPr lang="en-US" smtClean="0"/>
-              <a:t>5/26/2018</a:t>
+              <a:t>5/27/2018</a:t>
             </a:fld>
             <a:endParaRPr lang="en-US"/>
           </a:p>
@@ -1982,7 +1982,7 @@
           <a:p>
             <a:fld id="{0809B32C-EADE-4737-9FCF-CC2867D24216}" type="datetimeFigureOut">
               <a:rPr lang="en-US" smtClean="0"/>
-              <a:t>5/26/2018</a:t>
+              <a:t>5/27/2018</a:t>
             </a:fld>
             <a:endParaRPr lang="en-US"/>
           </a:p>
@@ -2259,7 +2259,7 @@
           <a:p>
             <a:fld id="{0809B32C-EADE-4737-9FCF-CC2867D24216}" type="datetimeFigureOut">
               <a:rPr lang="en-US" smtClean="0"/>
-              <a:t>5/26/2018</a:t>
+              <a:t>5/27/2018</a:t>
             </a:fld>
             <a:endParaRPr lang="en-US"/>
           </a:p>
@@ -2512,7 +2512,7 @@
           <a:p>
             <a:fld id="{0809B32C-EADE-4737-9FCF-CC2867D24216}" type="datetimeFigureOut">
               <a:rPr lang="en-US" smtClean="0"/>
-              <a:t>5/26/2018</a:t>
+              <a:t>5/27/2018</a:t>
             </a:fld>
             <a:endParaRPr lang="en-US"/>
           </a:p>
@@ -2725,7 +2725,7 @@
           <a:p>
             <a:fld id="{0809B32C-EADE-4737-9FCF-CC2867D24216}" type="datetimeFigureOut">
               <a:rPr lang="en-US" smtClean="0"/>
-              <a:t>5/26/2018</a:t>
+              <a:t>5/27/2018</a:t>
             </a:fld>
             <a:endParaRPr lang="en-US"/>
           </a:p>
@@ -3109,11 +3109,11 @@
         <p:spPr>
           <a:xfrm>
             <a:off x="228601" y="3657600"/>
-            <a:ext cx="15087599" cy="29032200"/>
+            <a:ext cx="13258799" cy="29032200"/>
           </a:xfrm>
           <a:prstGeom prst="roundRect">
             <a:avLst>
-              <a:gd name="adj" fmla="val 5072"/>
+              <a:gd name="adj" fmla="val 3052"/>
             </a:avLst>
           </a:prstGeom>
           <a:noFill/>
@@ -3152,12 +3152,12 @@
         </p:nvSpPr>
         <p:spPr>
           <a:xfrm>
-            <a:off x="15544800" y="3657600"/>
-            <a:ext cx="13487400" cy="29032200"/>
+            <a:off x="13716000" y="3657600"/>
+            <a:ext cx="15316200" cy="29032200"/>
           </a:xfrm>
           <a:prstGeom prst="roundRect">
             <a:avLst>
-              <a:gd name="adj" fmla="val 3351"/>
+              <a:gd name="adj" fmla="val 2791"/>
             </a:avLst>
           </a:prstGeom>
           <a:noFill/>
@@ -3201,7 +3201,7 @@
           </a:xfrm>
           <a:prstGeom prst="roundRect">
             <a:avLst>
-              <a:gd name="adj" fmla="val 3106"/>
+              <a:gd name="adj" fmla="val 3640"/>
             </a:avLst>
           </a:prstGeom>
           <a:noFill/>
@@ -3240,8 +3240,8 @@
         </p:nvSpPr>
         <p:spPr>
           <a:xfrm>
-            <a:off x="15773400" y="4867809"/>
-            <a:ext cx="13030200" cy="707886"/>
+            <a:off x="13944600" y="4867809"/>
+            <a:ext cx="14859000" cy="707886"/>
           </a:xfrm>
           <a:prstGeom prst="rect">
             <a:avLst/>
@@ -3302,8 +3302,8 @@
         </p:nvSpPr>
         <p:spPr>
           <a:xfrm>
-            <a:off x="29260800" y="15773400"/>
-            <a:ext cx="14401800" cy="8229600"/>
+            <a:off x="29260800" y="16459200"/>
+            <a:ext cx="14401800" cy="7543800"/>
           </a:xfrm>
           <a:prstGeom prst="roundRect">
             <a:avLst>
@@ -3431,7 +3431,7 @@
           </p:nvSpPr>
           <p:spPr>
             <a:xfrm>
-              <a:off x="15829978" y="3657600"/>
+              <a:off x="14001178" y="3657600"/>
               <a:ext cx="3885936" cy="1200329"/>
             </a:xfrm>
             <a:prstGeom prst="rect">
@@ -3469,7 +3469,7 @@
           </p:nvSpPr>
           <p:spPr>
             <a:xfrm>
-              <a:off x="15773400" y="10058400"/>
+              <a:off x="13944600" y="10058400"/>
               <a:ext cx="2661306" cy="923330"/>
             </a:xfrm>
             <a:prstGeom prst="rect">
@@ -3507,7 +3507,7 @@
           </p:nvSpPr>
           <p:spPr>
             <a:xfrm>
-              <a:off x="29489400" y="16002000"/>
+              <a:off x="29489400" y="16459200"/>
               <a:ext cx="4979248" cy="1200329"/>
             </a:xfrm>
             <a:prstGeom prst="rect">
@@ -3545,7 +3545,7 @@
           </p:nvSpPr>
           <p:spPr>
             <a:xfrm>
-              <a:off x="15773400" y="21945600"/>
+              <a:off x="13944600" y="18516600"/>
               <a:ext cx="4636206" cy="923330"/>
             </a:xfrm>
             <a:prstGeom prst="rect">
@@ -3583,7 +3583,7 @@
           </p:nvSpPr>
           <p:spPr>
             <a:xfrm>
-              <a:off x="15773400" y="27203400"/>
+              <a:off x="13944600" y="27203400"/>
               <a:ext cx="2875339" cy="923330"/>
             </a:xfrm>
             <a:prstGeom prst="rect">
@@ -3621,8 +3621,8 @@
           </p:nvSpPr>
           <p:spPr>
             <a:xfrm>
-              <a:off x="457200" y="16401871"/>
-              <a:ext cx="14401800" cy="1200329"/>
+              <a:off x="457200" y="18687871"/>
+              <a:ext cx="3657600" cy="1200329"/>
             </a:xfrm>
             <a:prstGeom prst="rect">
               <a:avLst/>
@@ -3659,7 +3659,7 @@
           </p:nvSpPr>
           <p:spPr>
             <a:xfrm>
-              <a:off x="29489400" y="24231600"/>
+              <a:off x="29489400" y="24688800"/>
               <a:ext cx="4387355" cy="1200329"/>
             </a:xfrm>
             <a:prstGeom prst="rect">
@@ -3699,7 +3699,7 @@
         <p:spPr>
           <a:xfrm>
             <a:off x="457200" y="4800600"/>
-            <a:ext cx="14630400" cy="10895290"/>
+            <a:ext cx="12801600" cy="13942278"/>
           </a:xfrm>
           <a:prstGeom prst="rect">
             <a:avLst/>
@@ -3713,80 +3713,124 @@
           <a:lstStyle/>
           <a:p>
             <a:r>
-              <a:rPr lang="en-US" sz="3600" dirty="0"/>
-              <a:t>Coastal cities all along the west coast are susceptible to damage caused by </a:t>
-            </a:r>
-            <a:r>
-              <a:rPr lang="en-US" sz="3600" dirty="0" smtClean="0"/>
+              <a:rPr lang="en-US" sz="4000" dirty="0"/>
+              <a:t>Coastal cities </a:t>
+            </a:r>
+            <a:r>
+              <a:rPr lang="en-US" sz="4000" dirty="0" smtClean="0"/>
+              <a:t>along </a:t>
+            </a:r>
+            <a:r>
+              <a:rPr lang="en-US" sz="4000" dirty="0"/>
+              <a:t>the west coast are susceptible to damage caused by </a:t>
+            </a:r>
+            <a:r>
+              <a:rPr lang="en-US" sz="4000" dirty="0" smtClean="0"/>
               <a:t>tsunamis. In </a:t>
             </a:r>
             <a:r>
-              <a:rPr lang="en-US" sz="3600" dirty="0"/>
-              <a:t>order to improve tsunami preparedness, researchers turn to numerical simulations </a:t>
-            </a:r>
-            <a:r>
-              <a:rPr lang="en-US" sz="3600" dirty="0" smtClean="0"/>
+              <a:rPr lang="en-US" sz="4000" dirty="0"/>
+              <a:t>order to improve tsunami preparedness, researchers </a:t>
+            </a:r>
+            <a:r>
+              <a:rPr lang="en-US" sz="4000" dirty="0" smtClean="0"/>
+              <a:t>use</a:t>
+            </a:r>
+            <a:r>
+              <a:rPr lang="en-US" sz="4000" dirty="0" smtClean="0"/>
+              <a:t> </a:t>
+            </a:r>
+            <a:r>
+              <a:rPr lang="en-US" sz="4000" dirty="0"/>
+              <a:t>numerical simulations </a:t>
+            </a:r>
+            <a:r>
+              <a:rPr lang="en-US" sz="4000" dirty="0" smtClean="0"/>
               <a:t>to predict </a:t>
             </a:r>
             <a:r>
-              <a:rPr lang="en-US" sz="3600" dirty="0"/>
-              <a:t>the impact of tsunamis caused by different seismological events. One set of </a:t>
-            </a:r>
-            <a:r>
-              <a:rPr lang="en-US" sz="3600" dirty="0" smtClean="0"/>
-              <a:t>simulations</a:t>
-            </a:r>
-            <a:r>
-              <a:rPr lang="en-US" sz="3600" dirty="0"/>
-              <a:t>, carried out by researchers at the University of Washington, model the effects </a:t>
-            </a:r>
-            <a:r>
-              <a:rPr lang="en-US" sz="3600" dirty="0" smtClean="0"/>
-              <a:t>of several </a:t>
-            </a:r>
-            <a:r>
-              <a:rPr lang="en-US" sz="3600" dirty="0"/>
-              <a:t>tsunamis on a region of Crescent City, California which has a history of </a:t>
-            </a:r>
-            <a:r>
-              <a:rPr lang="en-US" sz="3600" dirty="0" smtClean="0"/>
+              <a:rPr lang="en-US" sz="4000" dirty="0"/>
+              <a:t>the impact of tsunamis caused by different seismological events. </a:t>
+            </a:r>
+            <a:r>
+              <a:rPr lang="en-US" sz="4000" dirty="0" smtClean="0"/>
+              <a:t>Researchers </a:t>
+            </a:r>
+            <a:r>
+              <a:rPr lang="en-US" sz="4000" dirty="0"/>
+              <a:t>at the University of </a:t>
+            </a:r>
+            <a:r>
+              <a:rPr lang="en-US" sz="4000" dirty="0" smtClean="0"/>
+              <a:t>Washington model </a:t>
+            </a:r>
+            <a:r>
+              <a:rPr lang="en-US" sz="4000" dirty="0"/>
+              <a:t>the </a:t>
+            </a:r>
+            <a:r>
+              <a:rPr lang="en-US" sz="4000" dirty="0" smtClean="0"/>
+              <a:t>impact of tsunamis </a:t>
+            </a:r>
+            <a:r>
+              <a:rPr lang="en-US" sz="4000" dirty="0"/>
+              <a:t>on </a:t>
+            </a:r>
+            <a:r>
+              <a:rPr lang="en-US" sz="4000" dirty="0" smtClean="0"/>
+              <a:t>Crescent </a:t>
+            </a:r>
+            <a:r>
+              <a:rPr lang="en-US" sz="4000" dirty="0"/>
+              <a:t>City</a:t>
+            </a:r>
+            <a:r>
+              <a:rPr lang="en-US" sz="4000" dirty="0" smtClean="0"/>
+              <a:t>, a coastal city in </a:t>
+            </a:r>
+            <a:r>
+              <a:rPr lang="en-US" sz="4000" dirty="0"/>
+              <a:t>California which has a history of </a:t>
+            </a:r>
+            <a:r>
+              <a:rPr lang="en-US" sz="4000" dirty="0" smtClean="0"/>
               <a:t>extreme damage </a:t>
             </a:r>
             <a:r>
-              <a:rPr lang="en-US" sz="3600" dirty="0"/>
+              <a:rPr lang="en-US" sz="4000" dirty="0"/>
               <a:t>from tsunamis. By estimating the probability of occurrence of each </a:t>
             </a:r>
             <a:r>
-              <a:rPr lang="en-US" sz="3600" dirty="0" smtClean="0"/>
+              <a:rPr lang="en-US" sz="4000" dirty="0" smtClean="0"/>
               <a:t>simulated tsunami</a:t>
             </a:r>
             <a:r>
-              <a:rPr lang="en-US" sz="3600" dirty="0"/>
+              <a:rPr lang="en-US" sz="4000" dirty="0"/>
               <a:t>, the annual probability of exceeding a given level of inundation (flooding) </a:t>
             </a:r>
             <a:r>
-              <a:rPr lang="en-US" sz="3600" dirty="0" smtClean="0"/>
+              <a:rPr lang="en-US" sz="4000" dirty="0" smtClean="0"/>
               <a:t>can be </a:t>
             </a:r>
             <a:r>
-              <a:rPr lang="en-US" sz="3600" dirty="0"/>
+              <a:rPr lang="en-US" sz="4000" dirty="0"/>
               <a:t>estimated for every point in the landscape, giving rise to a hazard map. There </a:t>
             </a:r>
             <a:r>
-              <a:rPr lang="en-US" sz="3600" dirty="0" smtClean="0"/>
+              <a:rPr lang="en-US" sz="4000" dirty="0" smtClean="0"/>
               <a:t>are multiple </a:t>
             </a:r>
             <a:r>
-              <a:rPr lang="en-US" sz="3600" dirty="0"/>
+              <a:rPr lang="en-US" sz="4000" dirty="0"/>
               <a:t>sources of uncertainty that feed into hazard </a:t>
             </a:r>
             <a:r>
-              <a:rPr lang="en-US" sz="3600" dirty="0" smtClean="0"/>
+              <a:rPr lang="en-US" sz="4000" dirty="0" smtClean="0"/>
               <a:t>maps:</a:t>
             </a:r>
           </a:p>
           <a:p>
-            <a:endParaRPr lang="en-US" sz="900" dirty="0" smtClean="0"/>
+            <a:endParaRPr lang="en-US" sz="1000" dirty="0" smtClean="0"/>
           </a:p>
           <a:p>
             <a:pPr marL="914400" lvl="1" indent="-640080">
@@ -3794,12 +3838,20 @@
               <a:buAutoNum type="arabicPeriod"/>
             </a:pPr>
             <a:r>
-              <a:rPr lang="en-US" sz="3600" dirty="0" smtClean="0"/>
+              <a:rPr lang="en-US" sz="4000" dirty="0" smtClean="0"/>
               <a:t>Estimation </a:t>
             </a:r>
             <a:r>
-              <a:rPr lang="en-US" sz="3600" dirty="0"/>
-              <a:t>of the annual likelihood of different seismic events</a:t>
+              <a:rPr lang="en-US" sz="4000" dirty="0"/>
+              <a:t>of the annual likelihood of </a:t>
+            </a:r>
+            <a:r>
+              <a:rPr lang="en-US" sz="4000" dirty="0" smtClean="0"/>
+              <a:t>seismic </a:t>
+            </a:r>
+            <a:r>
+              <a:rPr lang="en-US" sz="4000" dirty="0"/>
+              <a:t>events</a:t>
             </a:r>
           </a:p>
           <a:p>
@@ -3808,18 +3860,26 @@
               <a:buAutoNum type="arabicPeriod"/>
             </a:pPr>
             <a:r>
-              <a:rPr lang="en-US" sz="3600" dirty="0" smtClean="0"/>
+              <a:rPr lang="en-US" sz="4000" dirty="0" smtClean="0"/>
               <a:t>Error </a:t>
             </a:r>
             <a:r>
-              <a:rPr lang="en-US" sz="3600" dirty="0"/>
-              <a:t>in the numerical simulations of </a:t>
-            </a:r>
-            <a:r>
-              <a:rPr lang="en-US" sz="3600" dirty="0" smtClean="0"/>
+              <a:rPr lang="en-US" sz="4000" dirty="0"/>
+              <a:t>in the numerical </a:t>
+            </a:r>
+            <a:r>
+              <a:rPr lang="en-US" sz="4000" dirty="0" smtClean="0"/>
+              <a:t>simulation </a:t>
+            </a:r>
+            <a:r>
+              <a:rPr lang="en-US" sz="4000" dirty="0"/>
+              <a:t>of </a:t>
+            </a:r>
+            <a:r>
+              <a:rPr lang="en-US" sz="4000" dirty="0" smtClean="0"/>
               <a:t>tsunamis</a:t>
             </a:r>
-            <a:endParaRPr lang="en-US" sz="3600" dirty="0"/>
+            <a:endParaRPr lang="en-US" sz="4000" dirty="0"/>
           </a:p>
           <a:p>
             <a:pPr marL="914400" lvl="1" indent="-640080">
@@ -3827,13 +3887,18 @@
               <a:buAutoNum type="arabicPeriod"/>
             </a:pPr>
             <a:r>
-              <a:rPr lang="en-US" sz="3600" dirty="0" smtClean="0"/>
+              <a:rPr lang="en-US" sz="4000" dirty="0" smtClean="0"/>
               <a:t>Variance </a:t>
             </a:r>
             <a:r>
-              <a:rPr lang="en-US" sz="3600" dirty="0"/>
-              <a:t>due to the relatively small number of simulated events</a:t>
-            </a:r>
+              <a:rPr lang="en-US" sz="4000" dirty="0"/>
+              <a:t>due to the relatively small number of </a:t>
+            </a:r>
+            <a:r>
+              <a:rPr lang="en-US" sz="4000" dirty="0" smtClean="0"/>
+              <a:t>events</a:t>
+            </a:r>
+            <a:endParaRPr lang="en-US" sz="4000" dirty="0"/>
           </a:p>
           <a:p>
             <a:pPr marL="914400" lvl="1" indent="-640080">
@@ -3841,15 +3906,15 @@
               <a:buAutoNum type="arabicPeriod"/>
             </a:pPr>
             <a:r>
-              <a:rPr lang="en-US" sz="3600" dirty="0" smtClean="0"/>
+              <a:rPr lang="en-US" sz="4000" dirty="0" smtClean="0"/>
               <a:t>Error </a:t>
             </a:r>
             <a:r>
-              <a:rPr lang="en-US" sz="3600" dirty="0"/>
+              <a:rPr lang="en-US" sz="4000" dirty="0"/>
               <a:t>due to the assumption that the seismic events are </a:t>
             </a:r>
             <a:r>
-              <a:rPr lang="en-US" sz="3600" dirty="0" smtClean="0"/>
+              <a:rPr lang="en-US" sz="4000" dirty="0" smtClean="0"/>
               <a:t>independent</a:t>
             </a:r>
           </a:p>
@@ -3858,34 +3923,34 @@
               <a:buFont typeface="+mj-lt"/>
               <a:buAutoNum type="arabicPeriod"/>
             </a:pPr>
-            <a:endParaRPr lang="en-US" sz="900" dirty="0"/>
-          </a:p>
-          <a:p>
-            <a:r>
-              <a:rPr lang="en-US" sz="3600" dirty="0"/>
+            <a:endParaRPr lang="en-US" sz="1000" dirty="0"/>
+          </a:p>
+          <a:p>
+            <a:r>
+              <a:rPr lang="en-US" sz="4000" dirty="0"/>
               <a:t>Furthermore, the hazard maps plot complicated hazard functions at every point, </a:t>
             </a:r>
             <a:r>
-              <a:rPr lang="en-US" sz="3600" dirty="0" smtClean="0"/>
+              <a:rPr lang="en-US" sz="4000" dirty="0" smtClean="0"/>
               <a:t>which describes </a:t>
             </a:r>
             <a:r>
-              <a:rPr lang="en-US" sz="3600" dirty="0"/>
+              <a:rPr lang="en-US" sz="4000" dirty="0"/>
               <a:t>the probability of inundation at every depth. Properly interpreting this map </a:t>
             </a:r>
             <a:r>
-              <a:rPr lang="en-US" sz="3600" dirty="0" smtClean="0"/>
+              <a:rPr lang="en-US" sz="4000" dirty="0" smtClean="0"/>
               <a:t>can be </a:t>
             </a:r>
             <a:r>
-              <a:rPr lang="en-US" sz="3600" dirty="0"/>
+              <a:rPr lang="en-US" sz="4000" dirty="0"/>
               <a:t>difficult for people without a technical background</a:t>
             </a:r>
             <a:r>
-              <a:rPr lang="en-US" sz="3600" dirty="0" smtClean="0"/>
+              <a:rPr lang="en-US" sz="4000" dirty="0" smtClean="0"/>
               <a:t>.</a:t>
             </a:r>
-            <a:endParaRPr lang="en-US" sz="3600" dirty="0"/>
+            <a:endParaRPr lang="en-US" sz="4000" dirty="0"/>
           </a:p>
         </p:txBody>
       </p:sp>
@@ -3966,7 +4031,7 @@
         </p:nvSpPr>
         <p:spPr>
           <a:xfrm>
-            <a:off x="29489400" y="17145000"/>
+            <a:off x="29489400" y="17602200"/>
             <a:ext cx="13944600" cy="707886"/>
           </a:xfrm>
           <a:prstGeom prst="rect">
@@ -4035,8 +4100,8 @@
         </p:nvSpPr>
         <p:spPr>
           <a:xfrm>
-            <a:off x="15773400" y="10972800"/>
-            <a:ext cx="13030200" cy="707886"/>
+            <a:off x="13944600" y="10972800"/>
+            <a:ext cx="14859000" cy="707886"/>
           </a:xfrm>
           <a:prstGeom prst="rect">
             <a:avLst/>
@@ -4066,8 +4131,8 @@
         </p:nvSpPr>
         <p:spPr>
           <a:xfrm>
-            <a:off x="15773400" y="28117800"/>
-            <a:ext cx="13030200" cy="1754326"/>
+            <a:off x="13944600" y="28117800"/>
+            <a:ext cx="14859000" cy="1938992"/>
           </a:xfrm>
           <a:prstGeom prst="rect">
             <a:avLst/>
@@ -4082,50 +4147,50 @@
           <a:p>
             <a:pPr algn="just"/>
             <a:r>
-              <a:rPr lang="en-US" sz="3600" dirty="0"/>
+              <a:rPr lang="en-US" sz="4000" dirty="0"/>
               <a:t>To make the </a:t>
             </a:r>
             <a:r>
-              <a:rPr lang="en-US" sz="3600" dirty="0" smtClean="0"/>
+              <a:rPr lang="en-US" sz="4000" dirty="0" smtClean="0"/>
               <a:t>visualizations </a:t>
             </a:r>
             <a:r>
-              <a:rPr lang="en-US" sz="3600" dirty="0"/>
+              <a:rPr lang="en-US" sz="4000" dirty="0"/>
               <a:t>more digestible we embed </a:t>
             </a:r>
             <a:r>
-              <a:rPr lang="en-US" sz="3600" dirty="0" smtClean="0"/>
+              <a:rPr lang="en-US" sz="4000" dirty="0" smtClean="0"/>
               <a:t>them </a:t>
             </a:r>
             <a:r>
-              <a:rPr lang="en-US" sz="3600" dirty="0"/>
+              <a:rPr lang="en-US" sz="4000" dirty="0"/>
               <a:t>within a larger narrative structure. In particular, we adopt the </a:t>
             </a:r>
             <a:r>
-              <a:rPr lang="en-US" sz="3600" dirty="0" smtClean="0"/>
+              <a:rPr lang="en-US" sz="4000" dirty="0" smtClean="0"/>
               <a:t>“magazine style” </a:t>
             </a:r>
             <a:r>
-              <a:rPr lang="en-US" sz="3600" dirty="0"/>
+              <a:rPr lang="en-US" sz="4000" dirty="0"/>
               <a:t>approach of </a:t>
             </a:r>
             <a:r>
-              <a:rPr lang="en-US" sz="3600" dirty="0" err="1" smtClean="0"/>
+              <a:rPr lang="en-US" sz="4000" dirty="0" err="1" smtClean="0"/>
               <a:t>Segel</a:t>
             </a:r>
             <a:r>
-              <a:rPr lang="en-US" sz="3600" dirty="0" smtClean="0"/>
+              <a:rPr lang="en-US" sz="4000" dirty="0" smtClean="0"/>
               <a:t> and </a:t>
             </a:r>
             <a:r>
-              <a:rPr lang="en-US" sz="3600" dirty="0" err="1" smtClean="0"/>
+              <a:rPr lang="en-US" sz="4000" dirty="0" err="1" smtClean="0"/>
               <a:t>Heer</a:t>
             </a:r>
             <a:r>
-              <a:rPr lang="en-US" sz="3600" dirty="0" smtClean="0"/>
+              <a:rPr lang="en-US" sz="4000" dirty="0" smtClean="0"/>
               <a:t> [3].</a:t>
             </a:r>
-            <a:endParaRPr lang="en-US" sz="3600" dirty="0"/>
+            <a:endParaRPr lang="en-US" sz="4000" dirty="0"/>
           </a:p>
         </p:txBody>
       </p:sp>
@@ -4137,8 +4202,8 @@
         </p:nvSpPr>
         <p:spPr>
           <a:xfrm>
-            <a:off x="457200" y="17527012"/>
-            <a:ext cx="14630399" cy="3046988"/>
+            <a:off x="457200" y="19888200"/>
+            <a:ext cx="12801599" cy="4401205"/>
           </a:xfrm>
           <a:prstGeom prst="rect">
             <a:avLst/>
@@ -4153,7 +4218,7 @@
           <a:p>
             <a:pPr algn="just"/>
             <a:r>
-              <a:rPr lang="en-US" sz="3200" dirty="0"/>
+              <a:rPr lang="en-US" sz="4000" dirty="0"/>
               <a:t>Our project seeks to address the following problems:</a:t>
             </a:r>
           </a:p>
@@ -4163,27 +4228,27 @@
               <a:buAutoNum type="arabicPeriod"/>
             </a:pPr>
             <a:r>
-              <a:rPr lang="en-US" sz="3200" dirty="0" smtClean="0"/>
+              <a:rPr lang="en-US" sz="4000" dirty="0" smtClean="0"/>
               <a:t>Hazard </a:t>
             </a:r>
             <a:r>
-              <a:rPr lang="en-US" sz="3200" dirty="0"/>
+              <a:rPr lang="en-US" sz="4000" dirty="0"/>
               <a:t>maps and the data used to produce them contain multiple sources </a:t>
             </a:r>
             <a:r>
-              <a:rPr lang="en-US" sz="3200" dirty="0" smtClean="0"/>
+              <a:rPr lang="en-US" sz="4000" dirty="0" smtClean="0"/>
               <a:t>of uncertainty</a:t>
             </a:r>
             <a:r>
-              <a:rPr lang="en-US" sz="3200" dirty="0"/>
+              <a:rPr lang="en-US" sz="4000" dirty="0"/>
               <a:t>. It is challenging to communicate this uncertainty alongside or </a:t>
             </a:r>
             <a:r>
-              <a:rPr lang="en-US" sz="3200" dirty="0" smtClean="0"/>
+              <a:rPr lang="en-US" sz="4000" dirty="0" smtClean="0"/>
               <a:t>as part </a:t>
             </a:r>
             <a:r>
-              <a:rPr lang="en-US" sz="3200" dirty="0"/>
+              <a:rPr lang="en-US" sz="4000" dirty="0"/>
               <a:t>of hazard maps in an intuitive way.</a:t>
             </a:r>
           </a:p>
@@ -4193,22 +4258,22 @@
               <a:buAutoNum type="arabicPeriod"/>
             </a:pPr>
             <a:r>
-              <a:rPr lang="en-US" sz="3200" dirty="0" smtClean="0"/>
+              <a:rPr lang="en-US" sz="4000" dirty="0" smtClean="0"/>
               <a:t>Hazard </a:t>
             </a:r>
             <a:r>
-              <a:rPr lang="en-US" sz="3200" dirty="0"/>
+              <a:rPr lang="en-US" sz="4000" dirty="0"/>
               <a:t>maps are inherently complex and nuanced and can therefore be </a:t>
             </a:r>
             <a:r>
-              <a:rPr lang="en-US" sz="3200" dirty="0" smtClean="0"/>
+              <a:rPr lang="en-US" sz="4000" dirty="0" smtClean="0"/>
               <a:t>difficult for </a:t>
             </a:r>
             <a:r>
-              <a:rPr lang="en-US" sz="3200" dirty="0"/>
+              <a:rPr lang="en-US" sz="4000" dirty="0"/>
               <a:t>non-experts to decipher.</a:t>
             </a:r>
-            <a:endParaRPr lang="en-US" sz="3200" dirty="0" smtClean="0"/>
+            <a:endParaRPr lang="en-US" sz="4000" dirty="0" smtClean="0"/>
           </a:p>
         </p:txBody>
       </p:sp>
@@ -4220,8 +4285,8 @@
         </p:nvSpPr>
         <p:spPr>
           <a:xfrm>
-            <a:off x="29260800" y="24231600"/>
-            <a:ext cx="14401800" cy="8229600"/>
+            <a:off x="29260800" y="24688800"/>
+            <a:ext cx="14401800" cy="8001000"/>
           </a:xfrm>
           <a:prstGeom prst="roundRect">
             <a:avLst>
@@ -4264,7 +4329,7 @@
         </p:nvSpPr>
         <p:spPr>
           <a:xfrm>
-            <a:off x="29489400" y="25374600"/>
+            <a:off x="29489400" y="25897582"/>
             <a:ext cx="13944600" cy="1077218"/>
           </a:xfrm>
           <a:prstGeom prst="rect">
@@ -4315,6 +4380,107 @@
               <a:t>, 16(6):1139–1148, 2010.</a:t>
             </a:r>
             <a:endParaRPr lang="en-US" sz="3200" dirty="0" smtClean="0"/>
+          </a:p>
+        </p:txBody>
+      </p:sp>
+      <p:sp>
+        <p:nvSpPr>
+          <p:cNvPr id="32" name="TextBox 31"/>
+          <p:cNvSpPr txBox="1"/>
+          <p:nvPr/>
+        </p:nvSpPr>
+        <p:spPr>
+          <a:xfrm>
+            <a:off x="13944600" y="19431000"/>
+            <a:ext cx="8229600" cy="1323439"/>
+          </a:xfrm>
+          <a:prstGeom prst="rect">
+            <a:avLst/>
+          </a:prstGeom>
+          <a:noFill/>
+        </p:spPr>
+        <p:txBody>
+          <a:bodyPr wrap="square" rtlCol="0">
+            <a:spAutoFit/>
+          </a:bodyPr>
+          <a:lstStyle/>
+          <a:p>
+            <a:r>
+              <a:rPr lang="en-US" sz="4000" dirty="0" smtClean="0"/>
+              <a:t>We use small multiples to convey that there are many possible scenarios.</a:t>
+            </a:r>
+            <a:endParaRPr lang="en-US" sz="4000" dirty="0"/>
+          </a:p>
+        </p:txBody>
+      </p:sp>
+      <p:pic>
+        <p:nvPicPr>
+          <p:cNvPr id="1026" name="Picture 2" descr="C:\xampp\htdocs\tsunami-inundation\poster\figures\smallmultiples.png"/>
+          <p:cNvPicPr>
+            <a:picLocks noChangeAspect="1" noChangeArrowheads="1"/>
+          </p:cNvPicPr>
+          <p:nvPr/>
+        </p:nvPicPr>
+        <p:blipFill>
+          <a:blip r:embed="rId3">
+            <a:extLst>
+              <a:ext uri="{28A0092B-C50C-407E-A947-70E740481C1C}">
+                <a14:useLocalDpi xmlns:a14="http://schemas.microsoft.com/office/drawing/2010/main" val="0"/>
+              </a:ext>
+            </a:extLst>
+          </a:blip>
+          <a:srcRect/>
+          <a:stretch>
+            <a:fillRect/>
+          </a:stretch>
+        </p:blipFill>
+        <p:spPr bwMode="auto">
+          <a:xfrm>
+            <a:off x="22390242" y="20116800"/>
+            <a:ext cx="6443520" cy="4343400"/>
+          </a:xfrm>
+          <a:prstGeom prst="rect">
+            <a:avLst/>
+          </a:prstGeom>
+          <a:noFill/>
+          <a:extLst>
+            <a:ext uri="{909E8E84-426E-40DD-AFC4-6F175D3DCCD1}">
+              <a14:hiddenFill xmlns:a14="http://schemas.microsoft.com/office/drawing/2010/main">
+                <a:solidFill>
+                  <a:srgbClr val="FFFFFF"/>
+                </a:solidFill>
+              </a14:hiddenFill>
+            </a:ext>
+          </a:extLst>
+        </p:spPr>
+      </p:pic>
+      <p:sp>
+        <p:nvSpPr>
+          <p:cNvPr id="34" name="TextBox 33"/>
+          <p:cNvSpPr txBox="1"/>
+          <p:nvPr/>
+        </p:nvSpPr>
+        <p:spPr>
+          <a:xfrm>
+            <a:off x="22402800" y="24688800"/>
+            <a:ext cx="6400800" cy="2062103"/>
+          </a:xfrm>
+          <a:prstGeom prst="rect">
+            <a:avLst/>
+          </a:prstGeom>
+          <a:noFill/>
+        </p:spPr>
+        <p:txBody>
+          <a:bodyPr wrap="square" rtlCol="0">
+            <a:spAutoFit/>
+          </a:bodyPr>
+          <a:lstStyle/>
+          <a:p>
+            <a:r>
+              <a:rPr lang="en-US" sz="3200" dirty="0" smtClean="0"/>
+              <a:t>Figure 1. Small multiples of flooding under simulated tsunamis. Colors indicate shallow flooding (green) to deep flooding (purple).</a:t>
+            </a:r>
+            <a:endParaRPr lang="en-US" sz="3200" dirty="0"/>
           </a:p>
         </p:txBody>
       </p:sp>

</xml_diff>

<commit_message>
Add refs to poster
</commit_message>
<xml_diff>
--- a/poster/poster.pptx
+++ b/poster/poster.pptx
@@ -104,6 +104,22 @@
       </a:defRPr>
     </a:lvl9pPr>
   </p:defaultTextStyle>
+  <p:extLst>
+    <p:ext uri="{EFAFB233-063F-42B5-8137-9DF3F51BA10A}">
+      <p15:sldGuideLst xmlns:p15="http://schemas.microsoft.com/office/powerpoint/2012/main">
+        <p15:guide id="1" orient="horz" pos="10368">
+          <p15:clr>
+            <a:srgbClr val="A4A3A4"/>
+          </p15:clr>
+        </p15:guide>
+        <p15:guide id="2" pos="13824">
+          <p15:clr>
+            <a:srgbClr val="A4A3A4"/>
+          </p15:clr>
+        </p15:guide>
+      </p15:sldGuideLst>
+    </p:ext>
+  </p:extLst>
 </p:presentation>
 </file>
 
@@ -145,10 +161,9 @@
           <a:lstStyle/>
           <a:p>
             <a:r>
-              <a:rPr lang="en-US" smtClean="0"/>
+              <a:rPr lang="en-US"/>
               <a:t>Click to edit Master title style</a:t>
             </a:r>
-            <a:endParaRPr lang="en-US"/>
           </a:p>
         </p:txBody>
       </p:sp>
@@ -264,10 +279,9 @@
           </a:lstStyle>
           <a:p>
             <a:r>
-              <a:rPr lang="en-US" smtClean="0"/>
+              <a:rPr lang="en-US"/>
               <a:t>Click to edit Master subtitle style</a:t>
             </a:r>
-            <a:endParaRPr lang="en-US"/>
           </a:p>
         </p:txBody>
       </p:sp>
@@ -288,7 +302,7 @@
           <a:p>
             <a:fld id="{0809B32C-EADE-4737-9FCF-CC2867D24216}" type="datetimeFigureOut">
               <a:rPr lang="en-US" smtClean="0"/>
-              <a:t>5/27/2018</a:t>
+              <a:t>5/28/2018</a:t>
             </a:fld>
             <a:endParaRPr lang="en-US"/>
           </a:p>
@@ -382,10 +396,9 @@
           <a:lstStyle/>
           <a:p>
             <a:r>
-              <a:rPr lang="en-US" smtClean="0"/>
+              <a:rPr lang="en-US"/>
               <a:t>Click to edit Master title style</a:t>
             </a:r>
-            <a:endParaRPr lang="en-US"/>
           </a:p>
         </p:txBody>
       </p:sp>
@@ -406,38 +419,37 @@
           <a:p>
             <a:pPr lvl="0"/>
             <a:r>
-              <a:rPr lang="en-US" smtClean="0"/>
+              <a:rPr lang="en-US"/>
               <a:t>Click to edit Master text styles</a:t>
             </a:r>
           </a:p>
           <a:p>
             <a:pPr lvl="1"/>
             <a:r>
-              <a:rPr lang="en-US" smtClean="0"/>
+              <a:rPr lang="en-US"/>
               <a:t>Second level</a:t>
             </a:r>
           </a:p>
           <a:p>
             <a:pPr lvl="2"/>
             <a:r>
-              <a:rPr lang="en-US" smtClean="0"/>
+              <a:rPr lang="en-US"/>
               <a:t>Third level</a:t>
             </a:r>
           </a:p>
           <a:p>
             <a:pPr lvl="3"/>
             <a:r>
-              <a:rPr lang="en-US" smtClean="0"/>
+              <a:rPr lang="en-US"/>
               <a:t>Fourth level</a:t>
             </a:r>
           </a:p>
           <a:p>
             <a:pPr lvl="4"/>
             <a:r>
-              <a:rPr lang="en-US" smtClean="0"/>
+              <a:rPr lang="en-US"/>
               <a:t>Fifth level</a:t>
             </a:r>
-            <a:endParaRPr lang="en-US"/>
           </a:p>
         </p:txBody>
       </p:sp>
@@ -458,7 +470,7 @@
           <a:p>
             <a:fld id="{0809B32C-EADE-4737-9FCF-CC2867D24216}" type="datetimeFigureOut">
               <a:rPr lang="en-US" smtClean="0"/>
-              <a:t>5/27/2018</a:t>
+              <a:t>5/28/2018</a:t>
             </a:fld>
             <a:endParaRPr lang="en-US"/>
           </a:p>
@@ -557,10 +569,9 @@
           <a:lstStyle/>
           <a:p>
             <a:r>
-              <a:rPr lang="en-US" smtClean="0"/>
+              <a:rPr lang="en-US"/>
               <a:t>Click to edit Master title style</a:t>
             </a:r>
-            <a:endParaRPr lang="en-US"/>
           </a:p>
         </p:txBody>
       </p:sp>
@@ -586,38 +597,37 @@
           <a:p>
             <a:pPr lvl="0"/>
             <a:r>
-              <a:rPr lang="en-US" smtClean="0"/>
+              <a:rPr lang="en-US"/>
               <a:t>Click to edit Master text styles</a:t>
             </a:r>
           </a:p>
           <a:p>
             <a:pPr lvl="1"/>
             <a:r>
-              <a:rPr lang="en-US" smtClean="0"/>
+              <a:rPr lang="en-US"/>
               <a:t>Second level</a:t>
             </a:r>
           </a:p>
           <a:p>
             <a:pPr lvl="2"/>
             <a:r>
-              <a:rPr lang="en-US" smtClean="0"/>
+              <a:rPr lang="en-US"/>
               <a:t>Third level</a:t>
             </a:r>
           </a:p>
           <a:p>
             <a:pPr lvl="3"/>
             <a:r>
-              <a:rPr lang="en-US" smtClean="0"/>
+              <a:rPr lang="en-US"/>
               <a:t>Fourth level</a:t>
             </a:r>
           </a:p>
           <a:p>
             <a:pPr lvl="4"/>
             <a:r>
-              <a:rPr lang="en-US" smtClean="0"/>
+              <a:rPr lang="en-US"/>
               <a:t>Fifth level</a:t>
             </a:r>
-            <a:endParaRPr lang="en-US"/>
           </a:p>
         </p:txBody>
       </p:sp>
@@ -638,7 +648,7 @@
           <a:p>
             <a:fld id="{0809B32C-EADE-4737-9FCF-CC2867D24216}" type="datetimeFigureOut">
               <a:rPr lang="en-US" smtClean="0"/>
-              <a:t>5/27/2018</a:t>
+              <a:t>5/28/2018</a:t>
             </a:fld>
             <a:endParaRPr lang="en-US"/>
           </a:p>
@@ -732,10 +742,9 @@
           <a:lstStyle/>
           <a:p>
             <a:r>
-              <a:rPr lang="en-US" smtClean="0"/>
+              <a:rPr lang="en-US"/>
               <a:t>Click to edit Master title style</a:t>
             </a:r>
-            <a:endParaRPr lang="en-US"/>
           </a:p>
         </p:txBody>
       </p:sp>
@@ -756,38 +765,37 @@
           <a:p>
             <a:pPr lvl="0"/>
             <a:r>
-              <a:rPr lang="en-US" smtClean="0"/>
+              <a:rPr lang="en-US"/>
               <a:t>Click to edit Master text styles</a:t>
             </a:r>
           </a:p>
           <a:p>
             <a:pPr lvl="1"/>
             <a:r>
-              <a:rPr lang="en-US" smtClean="0"/>
+              <a:rPr lang="en-US"/>
               <a:t>Second level</a:t>
             </a:r>
           </a:p>
           <a:p>
             <a:pPr lvl="2"/>
             <a:r>
-              <a:rPr lang="en-US" smtClean="0"/>
+              <a:rPr lang="en-US"/>
               <a:t>Third level</a:t>
             </a:r>
           </a:p>
           <a:p>
             <a:pPr lvl="3"/>
             <a:r>
-              <a:rPr lang="en-US" smtClean="0"/>
+              <a:rPr lang="en-US"/>
               <a:t>Fourth level</a:t>
             </a:r>
           </a:p>
           <a:p>
             <a:pPr lvl="4"/>
             <a:r>
-              <a:rPr lang="en-US" smtClean="0"/>
+              <a:rPr lang="en-US"/>
               <a:t>Fifth level</a:t>
             </a:r>
-            <a:endParaRPr lang="en-US"/>
           </a:p>
         </p:txBody>
       </p:sp>
@@ -808,7 +816,7 @@
           <a:p>
             <a:fld id="{0809B32C-EADE-4737-9FCF-CC2867D24216}" type="datetimeFigureOut">
               <a:rPr lang="en-US" smtClean="0"/>
-              <a:t>5/27/2018</a:t>
+              <a:t>5/28/2018</a:t>
             </a:fld>
             <a:endParaRPr lang="en-US"/>
           </a:p>
@@ -911,10 +919,9 @@
           </a:lstStyle>
           <a:p>
             <a:r>
-              <a:rPr lang="en-US" smtClean="0"/>
+              <a:rPr lang="en-US"/>
               <a:t>Click to edit Master title style</a:t>
             </a:r>
-            <a:endParaRPr lang="en-US"/>
           </a:p>
         </p:txBody>
       </p:sp>
@@ -1031,7 +1038,7 @@
           <a:p>
             <a:pPr lvl="0"/>
             <a:r>
-              <a:rPr lang="en-US" smtClean="0"/>
+              <a:rPr lang="en-US"/>
               <a:t>Click to edit Master text styles</a:t>
             </a:r>
           </a:p>
@@ -1054,7 +1061,7 @@
           <a:p>
             <a:fld id="{0809B32C-EADE-4737-9FCF-CC2867D24216}" type="datetimeFigureOut">
               <a:rPr lang="en-US" smtClean="0"/>
-              <a:t>5/27/2018</a:t>
+              <a:t>5/28/2018</a:t>
             </a:fld>
             <a:endParaRPr lang="en-US"/>
           </a:p>
@@ -1148,10 +1155,9 @@
           <a:lstStyle/>
           <a:p>
             <a:r>
-              <a:rPr lang="en-US" smtClean="0"/>
+              <a:rPr lang="en-US"/>
               <a:t>Click to edit Master title style</a:t>
             </a:r>
-            <a:endParaRPr lang="en-US"/>
           </a:p>
         </p:txBody>
       </p:sp>
@@ -1205,38 +1211,37 @@
           <a:p>
             <a:pPr lvl="0"/>
             <a:r>
-              <a:rPr lang="en-US" smtClean="0"/>
+              <a:rPr lang="en-US"/>
               <a:t>Click to edit Master text styles</a:t>
             </a:r>
           </a:p>
           <a:p>
             <a:pPr lvl="1"/>
             <a:r>
-              <a:rPr lang="en-US" smtClean="0"/>
+              <a:rPr lang="en-US"/>
               <a:t>Second level</a:t>
             </a:r>
           </a:p>
           <a:p>
             <a:pPr lvl="2"/>
             <a:r>
-              <a:rPr lang="en-US" smtClean="0"/>
+              <a:rPr lang="en-US"/>
               <a:t>Third level</a:t>
             </a:r>
           </a:p>
           <a:p>
             <a:pPr lvl="3"/>
             <a:r>
-              <a:rPr lang="en-US" smtClean="0"/>
+              <a:rPr lang="en-US"/>
               <a:t>Fourth level</a:t>
             </a:r>
           </a:p>
           <a:p>
             <a:pPr lvl="4"/>
             <a:r>
-              <a:rPr lang="en-US" smtClean="0"/>
+              <a:rPr lang="en-US"/>
               <a:t>Fifth level</a:t>
             </a:r>
-            <a:endParaRPr lang="en-US"/>
           </a:p>
         </p:txBody>
       </p:sp>
@@ -1290,38 +1295,37 @@
           <a:p>
             <a:pPr lvl="0"/>
             <a:r>
-              <a:rPr lang="en-US" smtClean="0"/>
+              <a:rPr lang="en-US"/>
               <a:t>Click to edit Master text styles</a:t>
             </a:r>
           </a:p>
           <a:p>
             <a:pPr lvl="1"/>
             <a:r>
-              <a:rPr lang="en-US" smtClean="0"/>
+              <a:rPr lang="en-US"/>
               <a:t>Second level</a:t>
             </a:r>
           </a:p>
           <a:p>
             <a:pPr lvl="2"/>
             <a:r>
-              <a:rPr lang="en-US" smtClean="0"/>
+              <a:rPr lang="en-US"/>
               <a:t>Third level</a:t>
             </a:r>
           </a:p>
           <a:p>
             <a:pPr lvl="3"/>
             <a:r>
-              <a:rPr lang="en-US" smtClean="0"/>
+              <a:rPr lang="en-US"/>
               <a:t>Fourth level</a:t>
             </a:r>
           </a:p>
           <a:p>
             <a:pPr lvl="4"/>
             <a:r>
-              <a:rPr lang="en-US" smtClean="0"/>
+              <a:rPr lang="en-US"/>
               <a:t>Fifth level</a:t>
             </a:r>
-            <a:endParaRPr lang="en-US"/>
           </a:p>
         </p:txBody>
       </p:sp>
@@ -1342,7 +1346,7 @@
           <a:p>
             <a:fld id="{0809B32C-EADE-4737-9FCF-CC2867D24216}" type="datetimeFigureOut">
               <a:rPr lang="en-US" smtClean="0"/>
-              <a:t>5/27/2018</a:t>
+              <a:t>5/28/2018</a:t>
             </a:fld>
             <a:endParaRPr lang="en-US"/>
           </a:p>
@@ -1445,10 +1449,9 @@
           </a:lstStyle>
           <a:p>
             <a:r>
-              <a:rPr lang="en-US" smtClean="0"/>
+              <a:rPr lang="en-US"/>
               <a:t>Click to edit Master title style</a:t>
             </a:r>
-            <a:endParaRPr lang="en-US"/>
           </a:p>
         </p:txBody>
       </p:sp>
@@ -1511,7 +1514,7 @@
           <a:p>
             <a:pPr lvl="0"/>
             <a:r>
-              <a:rPr lang="en-US" smtClean="0"/>
+              <a:rPr lang="en-US"/>
               <a:t>Click to edit Master text styles</a:t>
             </a:r>
           </a:p>
@@ -1567,38 +1570,37 @@
           <a:p>
             <a:pPr lvl="0"/>
             <a:r>
-              <a:rPr lang="en-US" smtClean="0"/>
+              <a:rPr lang="en-US"/>
               <a:t>Click to edit Master text styles</a:t>
             </a:r>
           </a:p>
           <a:p>
             <a:pPr lvl="1"/>
             <a:r>
-              <a:rPr lang="en-US" smtClean="0"/>
+              <a:rPr lang="en-US"/>
               <a:t>Second level</a:t>
             </a:r>
           </a:p>
           <a:p>
             <a:pPr lvl="2"/>
             <a:r>
-              <a:rPr lang="en-US" smtClean="0"/>
+              <a:rPr lang="en-US"/>
               <a:t>Third level</a:t>
             </a:r>
           </a:p>
           <a:p>
             <a:pPr lvl="3"/>
             <a:r>
-              <a:rPr lang="en-US" smtClean="0"/>
+              <a:rPr lang="en-US"/>
               <a:t>Fourth level</a:t>
             </a:r>
           </a:p>
           <a:p>
             <a:pPr lvl="4"/>
             <a:r>
-              <a:rPr lang="en-US" smtClean="0"/>
+              <a:rPr lang="en-US"/>
               <a:t>Fifth level</a:t>
             </a:r>
-            <a:endParaRPr lang="en-US"/>
           </a:p>
         </p:txBody>
       </p:sp>
@@ -1661,7 +1663,7 @@
           <a:p>
             <a:pPr lvl="0"/>
             <a:r>
-              <a:rPr lang="en-US" smtClean="0"/>
+              <a:rPr lang="en-US"/>
               <a:t>Click to edit Master text styles</a:t>
             </a:r>
           </a:p>
@@ -1717,38 +1719,37 @@
           <a:p>
             <a:pPr lvl="0"/>
             <a:r>
-              <a:rPr lang="en-US" smtClean="0"/>
+              <a:rPr lang="en-US"/>
               <a:t>Click to edit Master text styles</a:t>
             </a:r>
           </a:p>
           <a:p>
             <a:pPr lvl="1"/>
             <a:r>
-              <a:rPr lang="en-US" smtClean="0"/>
+              <a:rPr lang="en-US"/>
               <a:t>Second level</a:t>
             </a:r>
           </a:p>
           <a:p>
             <a:pPr lvl="2"/>
             <a:r>
-              <a:rPr lang="en-US" smtClean="0"/>
+              <a:rPr lang="en-US"/>
               <a:t>Third level</a:t>
             </a:r>
           </a:p>
           <a:p>
             <a:pPr lvl="3"/>
             <a:r>
-              <a:rPr lang="en-US" smtClean="0"/>
+              <a:rPr lang="en-US"/>
               <a:t>Fourth level</a:t>
             </a:r>
           </a:p>
           <a:p>
             <a:pPr lvl="4"/>
             <a:r>
-              <a:rPr lang="en-US" smtClean="0"/>
+              <a:rPr lang="en-US"/>
               <a:t>Fifth level</a:t>
             </a:r>
-            <a:endParaRPr lang="en-US"/>
           </a:p>
         </p:txBody>
       </p:sp>
@@ -1769,7 +1770,7 @@
           <a:p>
             <a:fld id="{0809B32C-EADE-4737-9FCF-CC2867D24216}" type="datetimeFigureOut">
               <a:rPr lang="en-US" smtClean="0"/>
-              <a:t>5/27/2018</a:t>
+              <a:t>5/28/2018</a:t>
             </a:fld>
             <a:endParaRPr lang="en-US"/>
           </a:p>
@@ -1863,10 +1864,9 @@
           <a:lstStyle/>
           <a:p>
             <a:r>
-              <a:rPr lang="en-US" smtClean="0"/>
+              <a:rPr lang="en-US"/>
               <a:t>Click to edit Master title style</a:t>
             </a:r>
-            <a:endParaRPr lang="en-US"/>
           </a:p>
         </p:txBody>
       </p:sp>
@@ -1887,7 +1887,7 @@
           <a:p>
             <a:fld id="{0809B32C-EADE-4737-9FCF-CC2867D24216}" type="datetimeFigureOut">
               <a:rPr lang="en-US" smtClean="0"/>
-              <a:t>5/27/2018</a:t>
+              <a:t>5/28/2018</a:t>
             </a:fld>
             <a:endParaRPr lang="en-US"/>
           </a:p>
@@ -1982,7 +1982,7 @@
           <a:p>
             <a:fld id="{0809B32C-EADE-4737-9FCF-CC2867D24216}" type="datetimeFigureOut">
               <a:rPr lang="en-US" smtClean="0"/>
-              <a:t>5/27/2018</a:t>
+              <a:t>5/28/2018</a:t>
             </a:fld>
             <a:endParaRPr lang="en-US"/>
           </a:p>
@@ -2085,10 +2085,9 @@
           </a:lstStyle>
           <a:p>
             <a:r>
-              <a:rPr lang="en-US" smtClean="0"/>
+              <a:rPr lang="en-US"/>
               <a:t>Click to edit Master title style</a:t>
             </a:r>
-            <a:endParaRPr lang="en-US"/>
           </a:p>
         </p:txBody>
       </p:sp>
@@ -2142,38 +2141,37 @@
           <a:p>
             <a:pPr lvl="0"/>
             <a:r>
-              <a:rPr lang="en-US" smtClean="0"/>
+              <a:rPr lang="en-US"/>
               <a:t>Click to edit Master text styles</a:t>
             </a:r>
           </a:p>
           <a:p>
             <a:pPr lvl="1"/>
             <a:r>
-              <a:rPr lang="en-US" smtClean="0"/>
+              <a:rPr lang="en-US"/>
               <a:t>Second level</a:t>
             </a:r>
           </a:p>
           <a:p>
             <a:pPr lvl="2"/>
             <a:r>
-              <a:rPr lang="en-US" smtClean="0"/>
+              <a:rPr lang="en-US"/>
               <a:t>Third level</a:t>
             </a:r>
           </a:p>
           <a:p>
             <a:pPr lvl="3"/>
             <a:r>
-              <a:rPr lang="en-US" smtClean="0"/>
+              <a:rPr lang="en-US"/>
               <a:t>Fourth level</a:t>
             </a:r>
           </a:p>
           <a:p>
             <a:pPr lvl="4"/>
             <a:r>
-              <a:rPr lang="en-US" smtClean="0"/>
+              <a:rPr lang="en-US"/>
               <a:t>Fifth level</a:t>
             </a:r>
-            <a:endParaRPr lang="en-US"/>
           </a:p>
         </p:txBody>
       </p:sp>
@@ -2236,7 +2234,7 @@
           <a:p>
             <a:pPr lvl="0"/>
             <a:r>
-              <a:rPr lang="en-US" smtClean="0"/>
+              <a:rPr lang="en-US"/>
               <a:t>Click to edit Master text styles</a:t>
             </a:r>
           </a:p>
@@ -2259,7 +2257,7 @@
           <a:p>
             <a:fld id="{0809B32C-EADE-4737-9FCF-CC2867D24216}" type="datetimeFigureOut">
               <a:rPr lang="en-US" smtClean="0"/>
-              <a:t>5/27/2018</a:t>
+              <a:t>5/28/2018</a:t>
             </a:fld>
             <a:endParaRPr lang="en-US"/>
           </a:p>
@@ -2362,10 +2360,9 @@
           </a:lstStyle>
           <a:p>
             <a:r>
-              <a:rPr lang="en-US" smtClean="0"/>
+              <a:rPr lang="en-US"/>
               <a:t>Click to edit Master title style</a:t>
             </a:r>
-            <a:endParaRPr lang="en-US"/>
           </a:p>
         </p:txBody>
       </p:sp>
@@ -2489,7 +2486,7 @@
           <a:p>
             <a:pPr lvl="0"/>
             <a:r>
-              <a:rPr lang="en-US" smtClean="0"/>
+              <a:rPr lang="en-US"/>
               <a:t>Click to edit Master text styles</a:t>
             </a:r>
           </a:p>
@@ -2512,7 +2509,7 @@
           <a:p>
             <a:fld id="{0809B32C-EADE-4737-9FCF-CC2867D24216}" type="datetimeFigureOut">
               <a:rPr lang="en-US" smtClean="0"/>
-              <a:t>5/27/2018</a:t>
+              <a:t>5/28/2018</a:t>
             </a:fld>
             <a:endParaRPr lang="en-US"/>
           </a:p>
@@ -2621,10 +2618,9 @@
           <a:lstStyle/>
           <a:p>
             <a:r>
-              <a:rPr lang="en-US" smtClean="0"/>
+              <a:rPr lang="en-US"/>
               <a:t>Click to edit Master title style</a:t>
             </a:r>
-            <a:endParaRPr lang="en-US"/>
           </a:p>
         </p:txBody>
       </p:sp>
@@ -2655,38 +2651,37 @@
           <a:p>
             <a:pPr lvl="0"/>
             <a:r>
-              <a:rPr lang="en-US" smtClean="0"/>
+              <a:rPr lang="en-US"/>
               <a:t>Click to edit Master text styles</a:t>
             </a:r>
           </a:p>
           <a:p>
             <a:pPr lvl="1"/>
             <a:r>
-              <a:rPr lang="en-US" smtClean="0"/>
+              <a:rPr lang="en-US"/>
               <a:t>Second level</a:t>
             </a:r>
           </a:p>
           <a:p>
             <a:pPr lvl="2"/>
             <a:r>
-              <a:rPr lang="en-US" smtClean="0"/>
+              <a:rPr lang="en-US"/>
               <a:t>Third level</a:t>
             </a:r>
           </a:p>
           <a:p>
             <a:pPr lvl="3"/>
             <a:r>
-              <a:rPr lang="en-US" smtClean="0"/>
+              <a:rPr lang="en-US"/>
               <a:t>Fourth level</a:t>
             </a:r>
           </a:p>
           <a:p>
             <a:pPr lvl="4"/>
             <a:r>
-              <a:rPr lang="en-US" smtClean="0"/>
+              <a:rPr lang="en-US"/>
               <a:t>Fifth level</a:t>
             </a:r>
-            <a:endParaRPr lang="en-US"/>
           </a:p>
         </p:txBody>
       </p:sp>
@@ -2725,7 +2720,7 @@
           <a:p>
             <a:fld id="{0809B32C-EADE-4737-9FCF-CC2867D24216}" type="datetimeFigureOut">
               <a:rPr lang="en-US" smtClean="0"/>
-              <a:t>5/27/2018</a:t>
+              <a:t>5/28/2018</a:t>
             </a:fld>
             <a:endParaRPr lang="en-US"/>
           </a:p>
@@ -3306,10 +3301,9 @@
           <a:p>
             <a:pPr algn="ctr"/>
             <a:r>
-              <a:rPr lang="en-US" sz="11500" dirty="0" smtClean="0"/>
+              <a:rPr lang="en-US" sz="11500" dirty="0"/>
               <a:t>Tsunami Inundation Maps</a:t>
             </a:r>
-            <a:endParaRPr lang="en-US" sz="11500" dirty="0"/>
           </a:p>
         </p:txBody>
       </p:sp>
@@ -3394,7 +3388,7 @@
             <a:lstStyle/>
             <a:p>
               <a:r>
-                <a:rPr lang="en-US" sz="7200" b="1" dirty="0" smtClean="0">
+                <a:rPr lang="en-US" sz="7200" b="1" dirty="0">
                   <a:solidFill>
                     <a:srgbClr val="33006F"/>
                   </a:solidFill>
@@ -3427,18 +3421,13 @@
             <a:lstStyle/>
             <a:p>
               <a:r>
-                <a:rPr lang="en-US" sz="5400" b="1" dirty="0" smtClean="0">
+                <a:rPr lang="en-US" sz="5400" b="1" dirty="0">
                   <a:solidFill>
                     <a:srgbClr val="33006F"/>
                   </a:solidFill>
                 </a:rPr>
                 <a:t>Flipbook</a:t>
               </a:r>
-              <a:endParaRPr lang="en-US" sz="5400" b="1" dirty="0">
-                <a:solidFill>
-                  <a:srgbClr val="33006F"/>
-                </a:solidFill>
-              </a:endParaRPr>
             </a:p>
           </p:txBody>
         </p:sp>
@@ -3465,18 +3454,13 @@
             <a:lstStyle/>
             <a:p>
               <a:r>
-                <a:rPr lang="en-US" sz="7200" b="1" dirty="0" smtClean="0">
+                <a:rPr lang="en-US" sz="7200" b="1" dirty="0">
                   <a:solidFill>
                     <a:srgbClr val="33006F"/>
                   </a:solidFill>
                 </a:rPr>
                 <a:t>Future Work</a:t>
               </a:r>
-              <a:endParaRPr lang="en-US" sz="7200" b="1" dirty="0">
-                <a:solidFill>
-                  <a:srgbClr val="33006F"/>
-                </a:solidFill>
-              </a:endParaRPr>
             </a:p>
           </p:txBody>
         </p:sp>
@@ -3503,18 +3487,13 @@
             <a:lstStyle/>
             <a:p>
               <a:r>
-                <a:rPr lang="en-US" sz="5400" b="1" dirty="0" smtClean="0">
+                <a:rPr lang="en-US" sz="5400" b="1" dirty="0">
                   <a:solidFill>
                     <a:srgbClr val="33006F"/>
                   </a:solidFill>
                 </a:rPr>
                 <a:t>Small Multiples</a:t>
               </a:r>
-              <a:endParaRPr lang="en-US" sz="5400" b="1" dirty="0">
-                <a:solidFill>
-                  <a:srgbClr val="33006F"/>
-                </a:solidFill>
-              </a:endParaRPr>
             </a:p>
           </p:txBody>
         </p:sp>
@@ -3571,18 +3550,13 @@
             <a:lstStyle/>
             <a:p>
               <a:r>
-                <a:rPr lang="en-US" sz="7200" b="1" dirty="0" smtClean="0">
+                <a:rPr lang="en-US" sz="7200" b="1" dirty="0">
                   <a:solidFill>
                     <a:srgbClr val="33006F"/>
                   </a:solidFill>
                 </a:rPr>
                 <a:t>Problem</a:t>
               </a:r>
-              <a:endParaRPr lang="en-US" sz="7200" b="1" dirty="0">
-                <a:solidFill>
-                  <a:srgbClr val="33006F"/>
-                </a:solidFill>
-              </a:endParaRPr>
             </a:p>
           </p:txBody>
         </p:sp>
@@ -3609,18 +3583,13 @@
             <a:lstStyle/>
             <a:p>
               <a:r>
-                <a:rPr lang="en-US" sz="7200" b="1" dirty="0" smtClean="0">
+                <a:rPr lang="en-US" sz="7200" b="1" dirty="0">
                   <a:solidFill>
                     <a:srgbClr val="33006F"/>
                   </a:solidFill>
                 </a:rPr>
                 <a:t>References</a:t>
               </a:r>
-              <a:endParaRPr lang="en-US" sz="7200" b="1" dirty="0">
-                <a:solidFill>
-                  <a:srgbClr val="33006F"/>
-                </a:solidFill>
-              </a:endParaRPr>
             </a:p>
           </p:txBody>
         </p:sp>
@@ -3647,18 +3616,13 @@
             <a:lstStyle/>
             <a:p>
               <a:r>
-                <a:rPr lang="en-US" sz="5400" b="1" dirty="0" smtClean="0">
+                <a:rPr lang="en-US" sz="5400" b="1" dirty="0">
                   <a:solidFill>
                     <a:srgbClr val="33006F"/>
                   </a:solidFill>
                 </a:rPr>
                 <a:t>Narrative</a:t>
               </a:r>
-              <a:endParaRPr lang="en-US" sz="5400" b="1" dirty="0">
-                <a:solidFill>
-                  <a:srgbClr val="33006F"/>
-                </a:solidFill>
-              </a:endParaRPr>
             </a:p>
           </p:txBody>
         </p:sp>
@@ -3685,18 +3649,13 @@
             <a:lstStyle/>
             <a:p>
               <a:r>
-                <a:rPr lang="en-US" sz="5400" b="1" dirty="0" smtClean="0">
+                <a:rPr lang="en-US" sz="5400" b="1" dirty="0">
                   <a:solidFill>
                     <a:srgbClr val="33006F"/>
                   </a:solidFill>
                 </a:rPr>
                 <a:t>Aggregate Probabilities</a:t>
               </a:r>
-              <a:endParaRPr lang="en-US" sz="5400" b="1" dirty="0">
-                <a:solidFill>
-                  <a:srgbClr val="33006F"/>
-                </a:solidFill>
-              </a:endParaRPr>
             </a:p>
           </p:txBody>
         </p:sp>
@@ -3725,119 +3684,11 @@
           <a:p>
             <a:r>
               <a:rPr lang="en-US" sz="4000" dirty="0"/>
-              <a:t>Coastal cities </a:t>
-            </a:r>
-            <a:r>
-              <a:rPr lang="en-US" sz="4000" dirty="0" smtClean="0"/>
-              <a:t>along </a:t>
-            </a:r>
-            <a:r>
-              <a:rPr lang="en-US" sz="4000" dirty="0"/>
-              <a:t>the west coast are susceptible to damage caused by </a:t>
-            </a:r>
-            <a:r>
-              <a:rPr lang="en-US" sz="4000" dirty="0" smtClean="0"/>
-              <a:t>tsunamis. In </a:t>
-            </a:r>
-            <a:r>
-              <a:rPr lang="en-US" sz="4000" dirty="0"/>
-              <a:t>order to improve tsunami preparedness, researchers </a:t>
-            </a:r>
-            <a:r>
-              <a:rPr lang="en-US" sz="4000" dirty="0" smtClean="0"/>
-              <a:t>use </a:t>
-            </a:r>
-            <a:r>
-              <a:rPr lang="en-US" sz="4000" dirty="0"/>
-              <a:t>numerical simulations </a:t>
-            </a:r>
-            <a:r>
-              <a:rPr lang="en-US" sz="4000" dirty="0" smtClean="0"/>
-              <a:t>to predict </a:t>
-            </a:r>
-            <a:r>
-              <a:rPr lang="en-US" sz="4000" dirty="0"/>
-              <a:t>the impact of tsunamis caused by different seismological events. </a:t>
-            </a:r>
-            <a:r>
-              <a:rPr lang="en-US" sz="4000" dirty="0" smtClean="0"/>
-              <a:t>Researchers </a:t>
-            </a:r>
-            <a:r>
-              <a:rPr lang="en-US" sz="4000" dirty="0"/>
-              <a:t>at the University of </a:t>
-            </a:r>
-            <a:r>
-              <a:rPr lang="en-US" sz="4000" dirty="0" smtClean="0"/>
-              <a:t>Washington model </a:t>
-            </a:r>
-            <a:r>
-              <a:rPr lang="en-US" sz="4000" dirty="0"/>
-              <a:t>the </a:t>
-            </a:r>
-            <a:r>
-              <a:rPr lang="en-US" sz="4000" dirty="0" smtClean="0"/>
-              <a:t>impact of tsunamis </a:t>
-            </a:r>
-            <a:r>
-              <a:rPr lang="en-US" sz="4000" dirty="0"/>
-              <a:t>on </a:t>
-            </a:r>
-            <a:r>
-              <a:rPr lang="en-US" sz="4000" dirty="0" smtClean="0"/>
-              <a:t>Crescent </a:t>
-            </a:r>
-            <a:r>
-              <a:rPr lang="en-US" sz="4000" dirty="0"/>
-              <a:t>City</a:t>
-            </a:r>
-            <a:r>
-              <a:rPr lang="en-US" sz="4000" dirty="0" smtClean="0"/>
-              <a:t>, a coastal city in </a:t>
-            </a:r>
-            <a:r>
-              <a:rPr lang="en-US" sz="4000" dirty="0"/>
-              <a:t>California which has a history of </a:t>
-            </a:r>
-            <a:r>
-              <a:rPr lang="en-US" sz="4000" dirty="0" smtClean="0"/>
-              <a:t>extreme damage </a:t>
-            </a:r>
-            <a:r>
-              <a:rPr lang="en-US" sz="4000" dirty="0"/>
-              <a:t>from tsunamis. By estimating the probability of occurrence of each </a:t>
-            </a:r>
-            <a:r>
-              <a:rPr lang="en-US" sz="4000" dirty="0" smtClean="0"/>
-              <a:t>simulated tsunami</a:t>
-            </a:r>
-            <a:r>
-              <a:rPr lang="en-US" sz="4000" dirty="0"/>
-              <a:t>, the annual probability of exceeding a given level of inundation (flooding) </a:t>
-            </a:r>
-            <a:r>
-              <a:rPr lang="en-US" sz="4000" dirty="0" smtClean="0"/>
-              <a:t>can be </a:t>
-            </a:r>
-            <a:r>
-              <a:rPr lang="en-US" sz="4000" dirty="0"/>
-              <a:t>estimated for every point in the landscape, giving rise to a hazard map. There </a:t>
-            </a:r>
-            <a:r>
-              <a:rPr lang="en-US" sz="4000" dirty="0" smtClean="0"/>
-              <a:t>are multiple </a:t>
-            </a:r>
-            <a:r>
-              <a:rPr lang="en-US" sz="4000" dirty="0"/>
-              <a:t>sources of uncertainty that feed into hazard </a:t>
-            </a:r>
-            <a:r>
-              <a:rPr lang="en-US" sz="4000" dirty="0" smtClean="0"/>
-              <a:t>maps:</a:t>
-            </a:r>
-          </a:p>
-          <a:p>
-            <a:endParaRPr lang="en-US" sz="1000" dirty="0" smtClean="0"/>
+              <a:t>Coastal cities along the west coast are susceptible to damage caused by tsunamis. In order to improve tsunami preparedness, researchers use numerical simulations to predict the impact of tsunamis caused by different seismological events. Researchers at the University of Washington model the impact of tsunamis on Crescent City, a coastal city in California which has a history of extreme damage from tsunamis. By estimating the probability of occurrence of each simulated tsunami, the annual probability of exceeding a given level of inundation (flooding) can be estimated for every point in the landscape, giving rise to a hazard map. There are multiple sources of uncertainty that feed into hazard maps:</a:t>
+            </a:r>
+          </a:p>
+          <a:p>
+            <a:endParaRPr lang="en-US" sz="1000" dirty="0"/>
           </a:p>
           <a:p>
             <a:pPr marL="914400" lvl="1" indent="-640080">
@@ -3845,20 +3696,8 @@
               <a:buAutoNum type="arabicPeriod"/>
             </a:pPr>
             <a:r>
-              <a:rPr lang="en-US" sz="4000" dirty="0" smtClean="0"/>
-              <a:t>Estimation </a:t>
-            </a:r>
-            <a:r>
               <a:rPr lang="en-US" sz="4000" dirty="0"/>
-              <a:t>of the annual likelihood of </a:t>
-            </a:r>
-            <a:r>
-              <a:rPr lang="en-US" sz="4000" dirty="0" smtClean="0"/>
-              <a:t>seismic </a:t>
-            </a:r>
-            <a:r>
-              <a:rPr lang="en-US" sz="4000" dirty="0"/>
-              <a:t>events</a:t>
+              <a:t>Estimation of the annual likelihood of seismic events</a:t>
             </a:r>
           </a:p>
           <a:p>
@@ -3867,26 +3706,9 @@
               <a:buAutoNum type="arabicPeriod"/>
             </a:pPr>
             <a:r>
-              <a:rPr lang="en-US" sz="4000" dirty="0" smtClean="0"/>
-              <a:t>Error </a:t>
-            </a:r>
-            <a:r>
               <a:rPr lang="en-US" sz="4000" dirty="0"/>
-              <a:t>in the numerical </a:t>
-            </a:r>
-            <a:r>
-              <a:rPr lang="en-US" sz="4000" dirty="0" smtClean="0"/>
-              <a:t>simulation </a:t>
-            </a:r>
-            <a:r>
-              <a:rPr lang="en-US" sz="4000" dirty="0"/>
-              <a:t>of </a:t>
-            </a:r>
-            <a:r>
-              <a:rPr lang="en-US" sz="4000" dirty="0" smtClean="0"/>
-              <a:t>tsunamis</a:t>
-            </a:r>
-            <a:endParaRPr lang="en-US" sz="4000" dirty="0"/>
+              <a:t>Error in the numerical simulation of tsunamis</a:t>
+            </a:r>
           </a:p>
           <a:p>
             <a:pPr marL="914400" lvl="1" indent="-640080">
@@ -3894,18 +3716,9 @@
               <a:buAutoNum type="arabicPeriod"/>
             </a:pPr>
             <a:r>
-              <a:rPr lang="en-US" sz="4000" dirty="0" smtClean="0"/>
-              <a:t>Variance </a:t>
-            </a:r>
-            <a:r>
               <a:rPr lang="en-US" sz="4000" dirty="0"/>
-              <a:t>due to the relatively small number of </a:t>
-            </a:r>
-            <a:r>
-              <a:rPr lang="en-US" sz="4000" dirty="0" smtClean="0"/>
-              <a:t>events</a:t>
-            </a:r>
-            <a:endParaRPr lang="en-US" sz="4000" dirty="0"/>
+              <a:t>Variance due to the relatively small number of events</a:t>
+            </a:r>
           </a:p>
           <a:p>
             <a:pPr marL="914400" lvl="1" indent="-640080">
@@ -3913,16 +3726,8 @@
               <a:buAutoNum type="arabicPeriod"/>
             </a:pPr>
             <a:r>
-              <a:rPr lang="en-US" sz="4000" dirty="0" smtClean="0"/>
-              <a:t>Error </a:t>
-            </a:r>
-            <a:r>
               <a:rPr lang="en-US" sz="4000" dirty="0"/>
-              <a:t>due to the assumption that the seismic events are </a:t>
-            </a:r>
-            <a:r>
-              <a:rPr lang="en-US" sz="4000" dirty="0" smtClean="0"/>
-              <a:t>independent</a:t>
+              <a:t>Error due to the assumption that the seismic events are independent</a:t>
             </a:r>
           </a:p>
           <a:p>
@@ -3935,29 +3740,8 @@
           <a:p>
             <a:r>
               <a:rPr lang="en-US" sz="4000" dirty="0"/>
-              <a:t>Furthermore, the hazard maps plot complicated hazard functions at every point, </a:t>
-            </a:r>
-            <a:r>
-              <a:rPr lang="en-US" sz="4000" dirty="0" smtClean="0"/>
-              <a:t>which describes </a:t>
-            </a:r>
-            <a:r>
-              <a:rPr lang="en-US" sz="4000" dirty="0"/>
-              <a:t>the probability of inundation at every depth. Properly interpreting this map </a:t>
-            </a:r>
-            <a:r>
-              <a:rPr lang="en-US" sz="4000" dirty="0" smtClean="0"/>
-              <a:t>can be </a:t>
-            </a:r>
-            <a:r>
-              <a:rPr lang="en-US" sz="4000" dirty="0"/>
-              <a:t>difficult for people without a technical background</a:t>
-            </a:r>
-            <a:r>
-              <a:rPr lang="en-US" sz="4000" dirty="0" smtClean="0"/>
-              <a:t>.</a:t>
-            </a:r>
-            <a:endParaRPr lang="en-US" sz="4000" dirty="0"/>
+              <a:t>Furthermore, the hazard maps plot complicated hazard functions at every point, which describes the probability of inundation at every depth. Properly interpreting this map can be difficult for people without a technical background.</a:t>
+            </a:r>
           </a:p>
         </p:txBody>
       </p:sp>
@@ -3985,18 +3769,17 @@
           <a:p>
             <a:pPr algn="ctr"/>
             <a:r>
-              <a:rPr lang="en-US" sz="4400" dirty="0" smtClean="0"/>
+              <a:rPr lang="en-US" sz="4400" dirty="0"/>
               <a:t>Brian de Silva, Kellie </a:t>
             </a:r>
             <a:r>
-              <a:rPr lang="en-US" sz="4400" dirty="0" err="1" smtClean="0"/>
+              <a:rPr lang="en-US" sz="4400" dirty="0" err="1"/>
               <a:t>MacPhee</a:t>
             </a:r>
             <a:r>
-              <a:rPr lang="en-US" sz="4400" dirty="0" smtClean="0"/>
+              <a:rPr lang="en-US" sz="4400" dirty="0"/>
               <a:t>, Abe Engel, Benjamin Liu</a:t>
             </a:r>
-            <a:endParaRPr lang="en-US" sz="4400" dirty="0"/>
           </a:p>
         </p:txBody>
       </p:sp>
@@ -4027,7 +3810,7 @@
               <a:buChar char="•"/>
             </a:pPr>
             <a:r>
-              <a:rPr lang="en-US" sz="4000" dirty="0" smtClean="0"/>
+              <a:rPr lang="en-US" sz="4000" dirty="0"/>
               <a:t>Greater spatial extent</a:t>
             </a:r>
           </a:p>
@@ -4037,7 +3820,7 @@
               <a:buChar char="•"/>
             </a:pPr>
             <a:r>
-              <a:rPr lang="en-US" sz="4000" dirty="0" smtClean="0"/>
+              <a:rPr lang="en-US" sz="4000" dirty="0"/>
               <a:t>Larger number of simulations</a:t>
             </a:r>
           </a:p>
@@ -4047,7 +3830,7 @@
               <a:buChar char="•"/>
             </a:pPr>
             <a:r>
-              <a:rPr lang="en-US" sz="4000" dirty="0" smtClean="0"/>
+              <a:rPr lang="en-US" sz="4000" dirty="0"/>
               <a:t>Alternate expressions of uncertainty</a:t>
             </a:r>
           </a:p>
@@ -4117,10 +3900,9 @@
           <a:p>
             <a:pPr algn="just"/>
             <a:r>
-              <a:rPr lang="en-US" sz="4000" dirty="0" smtClean="0"/>
+              <a:rPr lang="en-US" sz="4000" dirty="0"/>
               <a:t>Text</a:t>
             </a:r>
-            <a:endParaRPr lang="en-US" sz="4000" dirty="0"/>
           </a:p>
         </p:txBody>
       </p:sp>
@@ -4158,28 +3940,8 @@
               <a:buAutoNum type="arabicPeriod"/>
             </a:pPr>
             <a:r>
-              <a:rPr lang="en-US" sz="4000" dirty="0" smtClean="0"/>
-              <a:t>Hazard </a:t>
-            </a:r>
-            <a:r>
               <a:rPr lang="en-US" sz="4000" dirty="0"/>
-              <a:t>maps and the data used to produce them contain multiple sources </a:t>
-            </a:r>
-            <a:r>
-              <a:rPr lang="en-US" sz="4000" dirty="0" smtClean="0"/>
-              <a:t>of uncertainty</a:t>
-            </a:r>
-            <a:r>
-              <a:rPr lang="en-US" sz="4000" dirty="0"/>
-              <a:t>. It is challenging to communicate this uncertainty alongside or </a:t>
-            </a:r>
-            <a:r>
-              <a:rPr lang="en-US" sz="4000" dirty="0" smtClean="0"/>
-              <a:t>as part </a:t>
-            </a:r>
-            <a:r>
-              <a:rPr lang="en-US" sz="4000" dirty="0"/>
-              <a:t>of hazard maps in an intuitive way.</a:t>
+              <a:t>Hazard maps and the data used to produce them contain multiple sources of uncertainty. It is challenging to communicate this uncertainty alongside or as part of hazard maps in an intuitive way.</a:t>
             </a:r>
           </a:p>
           <a:p>
@@ -4188,24 +3950,8 @@
               <a:buAutoNum type="arabicPeriod"/>
             </a:pPr>
             <a:r>
-              <a:rPr lang="en-US" sz="4000" dirty="0" smtClean="0"/>
-              <a:t>Hazard </a:t>
-            </a:r>
-            <a:r>
               <a:rPr lang="en-US" sz="4000" dirty="0"/>
-              <a:t>maps are inherently complex and nuanced and can therefore be </a:t>
-            </a:r>
-            <a:r>
-              <a:rPr lang="en-US" sz="4000" dirty="0" smtClean="0"/>
-              <a:t>difficult for </a:t>
-            </a:r>
-            <a:r>
-              <a:rPr lang="en-US" sz="4000" dirty="0"/>
-              <a:t>non-experts to decipher</a:t>
-            </a:r>
-            <a:r>
-              <a:rPr lang="en-US" sz="4000" dirty="0" smtClean="0"/>
-              <a:t>.</a:t>
+              <a:t>Hazard maps are inherently complex and nuanced and can therefore be difficult for non-experts to decipher.</a:t>
             </a:r>
           </a:p>
           <a:p>
@@ -4217,7 +3963,7 @@
           </a:p>
           <a:p>
             <a:pPr algn="just"/>
-            <a:endParaRPr lang="en-US" sz="4000" dirty="0" smtClean="0"/>
+            <a:endParaRPr lang="en-US" sz="4000" dirty="0"/>
           </a:p>
           <a:p>
             <a:pPr algn="just"/>
@@ -4226,12 +3972,8 @@
           <a:p>
             <a:pPr algn="just"/>
             <a:r>
-              <a:rPr lang="en-US" sz="4000" dirty="0" smtClean="0"/>
-              <a:t>Although </a:t>
-            </a:r>
-            <a:r>
               <a:rPr lang="en-US" sz="4000" dirty="0"/>
-              <a:t>the process of numerical simulation is highly sophisticated, each tsunami can only be simulated as a result of a prescribed earthquake slip pattern. Many slip patterns are possible, and so many tsunamis are possible. </a:t>
+              <a:t>Although the process of numerical simulation is highly sophisticated, each tsunami can only be simulated as a result of a prescribed earthquake slip pattern. Many slip patterns are possible, and so many tsunamis are possible. </a:t>
             </a:r>
           </a:p>
           <a:p>
@@ -4239,7 +3981,7 @@
               <a:buFont typeface="+mj-lt"/>
               <a:buAutoNum type="arabicPeriod"/>
             </a:pPr>
-            <a:endParaRPr lang="en-US" sz="4000" dirty="0" smtClean="0"/>
+            <a:endParaRPr lang="en-US" sz="4000" dirty="0"/>
           </a:p>
         </p:txBody>
       </p:sp>
@@ -4296,7 +4038,7 @@
         <p:spPr>
           <a:xfrm>
             <a:off x="13944600" y="28869382"/>
-            <a:ext cx="14859000" cy="1077218"/>
+            <a:ext cx="14859000" cy="3539430"/>
           </a:xfrm>
           <a:prstGeom prst="rect">
             <a:avLst/>
@@ -4310,8 +4052,12 @@
           <a:lstStyle/>
           <a:p>
             <a:r>
-              <a:rPr lang="en-US" sz="3200" dirty="0" smtClean="0"/>
-              <a:t>[3] Edward </a:t>
+              <a:rPr lang="en-US" sz="3200"/>
+              <a:t>[1] </a:t>
+            </a:r>
+            <a:r>
+              <a:rPr lang="en-US" sz="3200" dirty="0"/>
+              <a:t>Edward </a:t>
             </a:r>
             <a:r>
               <a:rPr lang="en-US" sz="3200" dirty="0" err="1"/>
@@ -4327,25 +4073,76 @@
             </a:r>
             <a:r>
               <a:rPr lang="en-US" sz="3200" dirty="0"/>
-              <a:t>. Narrative visualization: Telling stories with </a:t>
-            </a:r>
-            <a:r>
-              <a:rPr lang="en-US" sz="3200" dirty="0" smtClean="0"/>
-              <a:t>data. </a:t>
-            </a:r>
-            <a:r>
-              <a:rPr lang="en-US" sz="3200" i="1" dirty="0" smtClean="0"/>
-              <a:t>IEEE </a:t>
+              <a:t>. Narrative visualization: Telling stories with data. </a:t>
             </a:r>
             <a:r>
               <a:rPr lang="en-US" sz="3200" i="1" dirty="0"/>
-              <a:t>transactions on visualization and computer graphics</a:t>
+              <a:t>IEEE transactions on visualization and computer graphics</a:t>
             </a:r>
             <a:r>
               <a:rPr lang="en-US" sz="3200" dirty="0"/>
               <a:t>, 16(6):1139–1148, 2010.</a:t>
             </a:r>
-            <a:endParaRPr lang="en-US" sz="3200" dirty="0" smtClean="0"/>
+          </a:p>
+          <a:p>
+            <a:r>
+              <a:rPr lang="en-US" sz="3200" dirty="0"/>
+              <a:t>[2] Gonzalez, Frank I., Randall J. </a:t>
+            </a:r>
+            <a:r>
+              <a:rPr lang="en-US" sz="3200" dirty="0" err="1"/>
+              <a:t>LeVeque</a:t>
+            </a:r>
+            <a:r>
+              <a:rPr lang="en-US" sz="3200" dirty="0"/>
+              <a:t>, and Loyce M. Adams. </a:t>
+            </a:r>
+            <a:r>
+              <a:rPr lang="en-US" sz="3200" i="1" dirty="0"/>
+              <a:t>Probabilistic Tsunami Hazard Assessment (PTHA) for Crescent City, CA. Final Report for Phase I</a:t>
+            </a:r>
+            <a:r>
+              <a:rPr lang="en-US" sz="3200" dirty="0"/>
+              <a:t>. University of Washington Department of Applied </a:t>
+            </a:r>
+            <a:r>
+              <a:rPr lang="en-US" sz="3200" dirty="0" err="1"/>
+              <a:t>Mathmatics</a:t>
+            </a:r>
+            <a:r>
+              <a:rPr lang="en-US" sz="3200" dirty="0"/>
+              <a:t>, 2013.</a:t>
+            </a:r>
+          </a:p>
+          <a:p>
+            <a:r>
+              <a:rPr lang="en-US" sz="3200" dirty="0"/>
+              <a:t>[3] </a:t>
+            </a:r>
+            <a:r>
+              <a:rPr lang="en-US" sz="3200" dirty="0" err="1"/>
+              <a:t>LeVeque</a:t>
+            </a:r>
+            <a:r>
+              <a:rPr lang="en-US" sz="3200" dirty="0"/>
+              <a:t>, R.J., </a:t>
+            </a:r>
+            <a:r>
+              <a:rPr lang="en-US" sz="3200" dirty="0" err="1"/>
+              <a:t>Waagan</a:t>
+            </a:r>
+            <a:r>
+              <a:rPr lang="en-US" sz="3200" dirty="0"/>
+              <a:t>, K., González, F.I. et al. Pure Appl. </a:t>
+            </a:r>
+            <a:r>
+              <a:rPr lang="en-US" sz="3200" dirty="0" err="1"/>
+              <a:t>Geophys</a:t>
+            </a:r>
+            <a:r>
+              <a:rPr lang="en-US" sz="3200" dirty="0"/>
+              <a:t>. (2016) 173: 3671. https://doi.org/10.1007/s00024-016-1357-1</a:t>
+            </a:r>
           </a:p>
         </p:txBody>
       </p:sp>
@@ -4372,41 +4169,17 @@
           <a:lstStyle/>
           <a:p>
             <a:r>
-              <a:rPr lang="en-US" sz="4000" dirty="0" smtClean="0"/>
-              <a:t>We use small multiples to convey that there are many </a:t>
-            </a:r>
-            <a:r>
-              <a:rPr lang="en-US" sz="4000" dirty="0" smtClean="0"/>
-              <a:t>possible outcomes </a:t>
-            </a:r>
-            <a:r>
-              <a:rPr lang="en-US" sz="4000" dirty="0" smtClean="0"/>
-              <a:t>in the event of a tsunami. Showing a small number of specific events highlights the variety of possible outcomes and allows the reader to make direct comparisons.</a:t>
-            </a:r>
-          </a:p>
-          <a:p>
-            <a:endParaRPr lang="en-US" sz="1000" dirty="0" smtClean="0"/>
-          </a:p>
-          <a:p>
-            <a:r>
-              <a:rPr lang="en-US" sz="4000" dirty="0" smtClean="0"/>
-              <a:t>We implement small multiples as replicated displays of a small geographic region of interest. The multiples are positioned opposite the large hazard map. Clicking the hazard map focuses the multiples on a specific region. Each multiple overlays the inundation </a:t>
-            </a:r>
-            <a:r>
               <a:rPr lang="en-US" sz="4000" dirty="0"/>
-              <a:t>depth of particular events </a:t>
-            </a:r>
-            <a:r>
-              <a:rPr lang="en-US" sz="4000" dirty="0" smtClean="0"/>
-              <a:t>as </a:t>
-            </a:r>
+              <a:t>We use small multiples to convey that there are many possible outcomes in the event of a tsunami. Showing a small number of specific events highlights the variety of possible outcomes and allows the reader to make direct comparisons.</a:t>
+            </a:r>
+          </a:p>
+          <a:p>
+            <a:endParaRPr lang="en-US" sz="1000" dirty="0"/>
+          </a:p>
+          <a:p>
             <a:r>
               <a:rPr lang="en-US" sz="4000" dirty="0"/>
-              <a:t>shaded contour </a:t>
-            </a:r>
-            <a:r>
-              <a:rPr lang="en-US" sz="4000" dirty="0" smtClean="0"/>
-              <a:t>plots.</a:t>
+              <a:t>We implement small multiples as replicated displays of a small geographic region of interest. The multiples are positioned opposite the large hazard map. Clicking the hazard map focuses the multiples on a specific region. Each multiple overlays the inundation depth of particular events as shaded contour plots.</a:t>
             </a:r>
           </a:p>
         </p:txBody>
@@ -4475,10 +4248,9 @@
           <a:lstStyle/>
           <a:p>
             <a:r>
-              <a:rPr lang="en-US" sz="3200" dirty="0" smtClean="0"/>
+              <a:rPr lang="en-US" sz="3200" dirty="0"/>
               <a:t>Figure 1. Small multiples of flooding under simulated tsunamis. Colors indicate shallow flooding (green) to deep flooding (purple).</a:t>
             </a:r>
-            <a:endParaRPr lang="en-US" sz="3200" dirty="0"/>
           </a:p>
         </p:txBody>
       </p:sp>
@@ -4545,7 +4317,7 @@
           <a:lstStyle/>
           <a:p>
             <a:r>
-              <a:rPr lang="en-US" sz="4000" dirty="0" smtClean="0"/>
+              <a:rPr lang="en-US" sz="4000" dirty="0"/>
               <a:t>The results of individual simulations are combined into an aggregated hazard map.</a:t>
             </a:r>
           </a:p>
@@ -4574,10 +4346,9 @@
           <a:lstStyle/>
           <a:p>
             <a:r>
-              <a:rPr lang="en-US" sz="3200" dirty="0" smtClean="0"/>
+              <a:rPr lang="en-US" sz="3200" dirty="0"/>
               <a:t>Figure 1. The interactive hazard map and small multiples. Color encodes inundation depth.</a:t>
             </a:r>
-            <a:endParaRPr lang="en-US" sz="3200" dirty="0" smtClean="0"/>
           </a:p>
         </p:txBody>
       </p:sp>

</xml_diff>

<commit_message>
Add some things to poster
</commit_message>
<xml_diff>
--- a/poster/poster.pptx
+++ b/poster/poster.pptx
@@ -3236,7 +3236,7 @@
         <p:spPr>
           <a:xfrm>
             <a:off x="13944600" y="4867809"/>
-            <a:ext cx="14859000" cy="2554545"/>
+            <a:ext cx="14859000" cy="4401205"/>
           </a:xfrm>
           <a:prstGeom prst="rect">
             <a:avLst/>
@@ -3267,8 +3267,23 @@
               <a:t>Heer</a:t>
             </a:r>
             <a:r>
+              <a:rPr lang="en-US" sz="4000" dirty="0"/>
+              <a:t> [1].</a:t>
+            </a:r>
+          </a:p>
+          <a:p>
+            <a:pPr algn="just"/>
+            <a:endParaRPr lang="en-US" sz="4000" dirty="0"/>
+          </a:p>
+          <a:p>
+            <a:pPr algn="just"/>
+            <a:r>
+              <a:rPr lang="en-US" sz="4000" dirty="0"/>
+              <a:t>We begin with an anecdote that emphasizes the importance of probabilistic estimates. We present </a:t>
+            </a:r>
+            <a:r>
               <a:rPr lang="en-US" sz="4000"/>
-              <a:t> [1].</a:t>
+              <a:t>a flipbook,</a:t>
             </a:r>
             <a:endParaRPr lang="en-US" sz="4000" dirty="0"/>
           </a:p>
@@ -3536,7 +3551,7 @@
           </p:nvSpPr>
           <p:spPr>
             <a:xfrm>
-              <a:off x="457200" y="18687871"/>
+              <a:off x="457200" y="19202400"/>
               <a:ext cx="3657600" cy="1200329"/>
             </a:xfrm>
             <a:prstGeom prst="rect">
@@ -3685,7 +3700,43 @@
           <a:p>
             <a:r>
               <a:rPr lang="en-US" sz="4000" dirty="0"/>
-              <a:t>Coastal cities along the west coast are susceptible to damage caused by tsunamis. In order to improve tsunami preparedness, researchers use numerical simulations to predict the impact of tsunamis caused by different seismological events. Researchers at the University of Washington model the impact of tsunamis on Crescent City, a coastal city in California which has a history of extreme damage from tsunamis. By estimating the probability of occurrence of each simulated tsunami, the annual probability of exceeding a given level of inundation (flooding) can be estimated for every point in the landscape, giving rise to a hazard map. There are multiple sources of uncertainty that feed into hazard maps:</a:t>
+              <a:t>Coastal cities along the west coast are susceptible to damage caused by tsunamis. In order to improve tsunami preparedness, researchers use numerical simulations to predict the impact of tsunamis caused by different seismological events. Researchers at the University of Washington model the impact of tsunamis on Crescent City, a coastal city in California which has a history of extreme damage from tsunamis. By estimating the probability of occurrence of each simulated tsunami, the annual probability of exceeding a given level of inundation (flooding) can be estimated for every point in the landscape, giving rise to a hazard map. There are multiple sources of uncertainty ([</a:t>
+            </a:r>
+            <a:r>
+              <a:rPr lang="en-US" sz="4000" i="1" dirty="0"/>
+              <a:t>A</a:t>
+            </a:r>
+            <a:r>
+              <a:rPr lang="en-US" sz="4000" dirty="0"/>
+              <a:t>]</a:t>
+            </a:r>
+            <a:r>
+              <a:rPr lang="en-US" sz="4000" i="1" dirty="0" err="1"/>
+              <a:t>leatoric</a:t>
+            </a:r>
+            <a:r>
+              <a:rPr lang="en-US" sz="4000" i="1" dirty="0"/>
+              <a:t> </a:t>
+            </a:r>
+            <a:r>
+              <a:rPr lang="en-US" sz="4000" dirty="0"/>
+              <a:t>and [</a:t>
+            </a:r>
+            <a:r>
+              <a:rPr lang="en-US" sz="4000" i="1" dirty="0"/>
+              <a:t>E</a:t>
+            </a:r>
+            <a:r>
+              <a:rPr lang="en-US" sz="4000" dirty="0"/>
+              <a:t>]</a:t>
+            </a:r>
+            <a:r>
+              <a:rPr lang="en-US" sz="4000" i="1" dirty="0" err="1"/>
+              <a:t>pistemic</a:t>
+            </a:r>
+            <a:r>
+              <a:rPr lang="en-US" sz="4000" dirty="0"/>
+              <a:t>) that feed into hazard maps:</a:t>
             </a:r>
           </a:p>
           <a:p>
@@ -3698,7 +3749,15 @@
             </a:pPr>
             <a:r>
               <a:rPr lang="en-US" sz="4000" dirty="0"/>
-              <a:t>Estimation of the annual likelihood of seismic events</a:t>
+              <a:t>[</a:t>
+            </a:r>
+            <a:r>
+              <a:rPr lang="en-US" sz="4000" i="1" dirty="0"/>
+              <a:t>A</a:t>
+            </a:r>
+            <a:r>
+              <a:rPr lang="en-US" sz="4000" dirty="0"/>
+              <a:t>] Estimation of the annual likelihood of seismic events</a:t>
             </a:r>
           </a:p>
           <a:p>
@@ -3708,7 +3767,15 @@
             </a:pPr>
             <a:r>
               <a:rPr lang="en-US" sz="4000" dirty="0"/>
-              <a:t>Error in the numerical simulation of tsunamis</a:t>
+              <a:t>[</a:t>
+            </a:r>
+            <a:r>
+              <a:rPr lang="en-US" sz="4000" i="1" dirty="0"/>
+              <a:t>A</a:t>
+            </a:r>
+            <a:r>
+              <a:rPr lang="en-US" sz="4000" dirty="0"/>
+              <a:t>] Variance due to the relatively small number of events</a:t>
             </a:r>
           </a:p>
           <a:p>
@@ -3718,7 +3785,15 @@
             </a:pPr>
             <a:r>
               <a:rPr lang="en-US" sz="4000" dirty="0"/>
-              <a:t>Variance due to the relatively small number of events</a:t>
+              <a:t>[</a:t>
+            </a:r>
+            <a:r>
+              <a:rPr lang="en-US" sz="4000" i="1" dirty="0"/>
+              <a:t>A</a:t>
+            </a:r>
+            <a:r>
+              <a:rPr lang="en-US" sz="4000" dirty="0"/>
+              <a:t>] Error due to the assumption that the seismic events are independent</a:t>
             </a:r>
           </a:p>
           <a:p>
@@ -3728,7 +3803,15 @@
             </a:pPr>
             <a:r>
               <a:rPr lang="en-US" sz="4000" dirty="0"/>
-              <a:t>Error due to the assumption that the seismic events are independent</a:t>
+              <a:t>[</a:t>
+            </a:r>
+            <a:r>
+              <a:rPr lang="en-US" sz="4000" i="1" dirty="0"/>
+              <a:t>E</a:t>
+            </a:r>
+            <a:r>
+              <a:rPr lang="en-US" sz="4000" dirty="0"/>
+              <a:t>] Error in the numerical simulation of tsunamis</a:t>
             </a:r>
           </a:p>
           <a:p>
@@ -3771,15 +3854,7 @@
             <a:pPr algn="ctr"/>
             <a:r>
               <a:rPr lang="en-US" sz="4400" dirty="0"/>
-              <a:t>Brian de Silva, Kellie </a:t>
-            </a:r>
-            <a:r>
-              <a:rPr lang="en-US" sz="4400" dirty="0" err="1"/>
-              <a:t>MacPhee</a:t>
-            </a:r>
-            <a:r>
-              <a:rPr lang="en-US" sz="4400" dirty="0"/>
-              <a:t>, Abe Engel, Benjamin Liu</a:t>
+              <a:t>Brian de Silva, Kellie MacPhee, Abe Engle, Benjamin Liu</a:t>
             </a:r>
           </a:p>
         </p:txBody>
@@ -3915,7 +3990,7 @@
         </p:nvSpPr>
         <p:spPr>
           <a:xfrm>
-            <a:off x="457200" y="19888200"/>
+            <a:off x="457200" y="20392370"/>
             <a:ext cx="12801599" cy="9325630"/>
           </a:xfrm>
           <a:prstGeom prst="rect">
@@ -4277,7 +4352,7 @@
         </p:blipFill>
         <p:spPr bwMode="auto">
           <a:xfrm>
-            <a:off x="29718000" y="9789339"/>
+            <a:off x="44484060" y="8901519"/>
             <a:ext cx="13487400" cy="7355661"/>
           </a:xfrm>
           <a:prstGeom prst="rect">
@@ -4332,7 +4407,7 @@
         </p:nvSpPr>
         <p:spPr>
           <a:xfrm>
-            <a:off x="29489400" y="17210782"/>
+            <a:off x="29489400" y="14252863"/>
             <a:ext cx="13944600" cy="1077218"/>
           </a:xfrm>
           <a:prstGeom prst="rect">
@@ -4349,6 +4424,77 @@
             <a:r>
               <a:rPr lang="en-US" sz="3200" dirty="0"/>
               <a:t>Figure 1. The interactive hazard map and small multiples. Color encodes inundation depth.</a:t>
+            </a:r>
+          </a:p>
+        </p:txBody>
+      </p:sp>
+      <p:pic>
+        <p:nvPicPr>
+          <p:cNvPr id="10" name="Picture 9">
+            <a:extLst>
+              <a:ext uri="{FF2B5EF4-FFF2-40B4-BE49-F238E27FC236}">
+                <a16:creationId xmlns:a16="http://schemas.microsoft.com/office/drawing/2014/main" id="{0F101F15-4A42-B24F-A91A-75F3A3AEE1C9}"/>
+              </a:ext>
+            </a:extLst>
+          </p:cNvPr>
+          <p:cNvPicPr>
+            <a:picLocks noChangeAspect="1"/>
+          </p:cNvPicPr>
+          <p:nvPr/>
+        </p:nvPicPr>
+        <p:blipFill>
+          <a:blip r:embed="rId5">
+            <a:extLst>
+              <a:ext uri="{28A0092B-C50C-407E-A947-70E740481C1C}">
+                <a14:useLocalDpi xmlns:a14="http://schemas.microsoft.com/office/drawing/2010/main" val="0"/>
+              </a:ext>
+            </a:extLst>
+          </a:blip>
+          <a:stretch>
+            <a:fillRect/>
+          </a:stretch>
+        </p:blipFill>
+        <p:spPr>
+          <a:xfrm>
+            <a:off x="29576110" y="5943600"/>
+            <a:ext cx="13629290" cy="7772400"/>
+          </a:xfrm>
+          <a:prstGeom prst="rect">
+            <a:avLst/>
+          </a:prstGeom>
+        </p:spPr>
+      </p:pic>
+      <p:sp>
+        <p:nvSpPr>
+          <p:cNvPr id="14" name="TextBox 13">
+            <a:extLst>
+              <a:ext uri="{FF2B5EF4-FFF2-40B4-BE49-F238E27FC236}">
+                <a16:creationId xmlns:a16="http://schemas.microsoft.com/office/drawing/2014/main" id="{DB2B5135-D460-A444-B7D3-8529E73C687A}"/>
+              </a:ext>
+            </a:extLst>
+          </p:cNvPr>
+          <p:cNvSpPr txBox="1"/>
+          <p:nvPr/>
+        </p:nvSpPr>
+        <p:spPr>
+          <a:xfrm>
+            <a:off x="29576110" y="15443751"/>
+            <a:ext cx="13629290" cy="1938992"/>
+          </a:xfrm>
+          <a:prstGeom prst="rect">
+            <a:avLst/>
+          </a:prstGeom>
+          <a:noFill/>
+        </p:spPr>
+        <p:txBody>
+          <a:bodyPr wrap="square" rtlCol="0">
+            <a:spAutoFit/>
+          </a:bodyPr>
+          <a:lstStyle/>
+          <a:p>
+            <a:r>
+              <a:rPr lang="en-US" sz="4000" dirty="0"/>
+              <a:t>Users can interact with the aggregate map by panning, zooming, and selecting areas of interest. Selecting an area pans and centers the small multiples plots to to the same location.</a:t>
             </a:r>
           </a:p>
         </p:txBody>

</xml_diff>

<commit_message>
Kellie's in-flight poster updates
</commit_message>
<xml_diff>
--- a/poster/poster.pptx
+++ b/poster/poster.pptx
@@ -3273,7 +3273,7 @@
         <p:spPr>
           <a:xfrm>
             <a:off x="29260800" y="3657600"/>
-            <a:ext cx="14401800" cy="16002000"/>
+            <a:ext cx="14401800" cy="14020800"/>
           </a:xfrm>
           <a:prstGeom prst="roundRect">
             <a:avLst>
@@ -3351,8 +3351,8 @@
         </p:nvSpPr>
         <p:spPr>
           <a:xfrm>
-            <a:off x="29260800" y="20040600"/>
-            <a:ext cx="14401800" cy="5410200"/>
+            <a:off x="29260800" y="18059400"/>
+            <a:ext cx="14401800" cy="6248400"/>
           </a:xfrm>
           <a:prstGeom prst="roundRect">
             <a:avLst>
@@ -3384,39 +3384,6 @@
           <a:p>
             <a:pPr algn="ctr"/>
             <a:endParaRPr lang="en-US"/>
-          </a:p>
-        </p:txBody>
-      </p:sp>
-      <p:sp>
-        <p:nvSpPr>
-          <p:cNvPr id="44" name="TextBox 43"/>
-          <p:cNvSpPr txBox="1"/>
-          <p:nvPr/>
-        </p:nvSpPr>
-        <p:spPr>
-          <a:xfrm>
-            <a:off x="29489400" y="20193000"/>
-            <a:ext cx="4979248" cy="1200329"/>
-          </a:xfrm>
-          <a:prstGeom prst="rect">
-            <a:avLst/>
-          </a:prstGeom>
-          <a:noFill/>
-        </p:spPr>
-        <p:txBody>
-          <a:bodyPr wrap="none" rtlCol="0">
-            <a:spAutoFit/>
-          </a:bodyPr>
-          <a:lstStyle/>
-          <a:p>
-            <a:r>
-              <a:rPr lang="en-US" sz="7200" b="1" dirty="0">
-                <a:solidFill>
-                  <a:srgbClr val="33006F"/>
-                </a:solidFill>
-              </a:rPr>
-              <a:t>Future Work</a:t>
-            </a:r>
           </a:p>
         </p:txBody>
       </p:sp>
@@ -3607,59 +3574,138 @@
           </a:p>
         </p:txBody>
       </p:sp>
-      <p:sp>
-        <p:nvSpPr>
-          <p:cNvPr id="54" name="TextBox 53"/>
-          <p:cNvSpPr txBox="1"/>
+      <p:grpSp>
+        <p:nvGrpSpPr>
+          <p:cNvPr id="75" name="Group 74"/>
+          <p:cNvGrpSpPr/>
           <p:nvPr/>
-        </p:nvSpPr>
-        <p:spPr>
+        </p:nvGrpSpPr>
+        <p:grpSpPr>
           <a:xfrm>
-            <a:off x="29413200" y="21564600"/>
-            <a:ext cx="13944600" cy="1938992"/>
+            <a:off x="29413200" y="18135600"/>
+            <a:ext cx="13944600" cy="5620405"/>
+            <a:chOff x="29413200" y="18364200"/>
+            <a:chExt cx="13944600" cy="5620405"/>
           </a:xfrm>
-          <a:prstGeom prst="rect">
-            <a:avLst/>
-          </a:prstGeom>
-          <a:noFill/>
-        </p:spPr>
-        <p:txBody>
-          <a:bodyPr wrap="square" rtlCol="0">
-            <a:spAutoFit/>
-          </a:bodyPr>
-          <a:lstStyle/>
-          <a:p>
-            <a:pPr marL="571500" indent="-571500">
-              <a:buFont typeface="Arial" panose="020B0604020202020204" pitchFamily="34" charset="0"/>
-              <a:buChar char="•"/>
-            </a:pPr>
-            <a:r>
-              <a:rPr lang="en-US" sz="4000" dirty="0"/>
-              <a:t>Greater spatial extent</a:t>
-            </a:r>
-          </a:p>
-          <a:p>
-            <a:pPr marL="571500" indent="-571500">
-              <a:buFont typeface="Arial" panose="020B0604020202020204" pitchFamily="34" charset="0"/>
-              <a:buChar char="•"/>
-            </a:pPr>
-            <a:r>
-              <a:rPr lang="en-US" sz="4000" dirty="0"/>
-              <a:t>Larger number of simulations</a:t>
-            </a:r>
-          </a:p>
-          <a:p>
-            <a:pPr marL="571500" indent="-571500">
-              <a:buFont typeface="Arial" panose="020B0604020202020204" pitchFamily="34" charset="0"/>
-              <a:buChar char="•"/>
-            </a:pPr>
-            <a:r>
-              <a:rPr lang="en-US" sz="4000" dirty="0"/>
-              <a:t>Alternate expressions of uncertainty</a:t>
-            </a:r>
-          </a:p>
-        </p:txBody>
-      </p:sp>
+        </p:grpSpPr>
+        <p:sp>
+          <p:nvSpPr>
+            <p:cNvPr id="44" name="TextBox 43"/>
+            <p:cNvSpPr txBox="1"/>
+            <p:nvPr/>
+          </p:nvSpPr>
+          <p:spPr>
+            <a:xfrm>
+              <a:off x="29413200" y="18364200"/>
+              <a:ext cx="4979248" cy="1200329"/>
+            </a:xfrm>
+            <a:prstGeom prst="rect">
+              <a:avLst/>
+            </a:prstGeom>
+            <a:noFill/>
+          </p:spPr>
+          <p:txBody>
+            <a:bodyPr wrap="none" rtlCol="0">
+              <a:spAutoFit/>
+            </a:bodyPr>
+            <a:lstStyle/>
+            <a:p>
+              <a:r>
+                <a:rPr lang="en-US" sz="7200" b="1" dirty="0">
+                  <a:solidFill>
+                    <a:srgbClr val="33006F"/>
+                  </a:solidFill>
+                </a:rPr>
+                <a:t>Future Work</a:t>
+              </a:r>
+            </a:p>
+          </p:txBody>
+        </p:sp>
+        <p:sp>
+          <p:nvSpPr>
+            <p:cNvPr id="54" name="TextBox 53"/>
+            <p:cNvSpPr txBox="1"/>
+            <p:nvPr/>
+          </p:nvSpPr>
+          <p:spPr>
+            <a:xfrm>
+              <a:off x="29413200" y="19583400"/>
+              <a:ext cx="13944600" cy="4401205"/>
+            </a:xfrm>
+            <a:prstGeom prst="rect">
+              <a:avLst/>
+            </a:prstGeom>
+            <a:noFill/>
+          </p:spPr>
+          <p:txBody>
+            <a:bodyPr wrap="square" rtlCol="0">
+              <a:spAutoFit/>
+            </a:bodyPr>
+            <a:lstStyle/>
+            <a:p>
+              <a:pPr marL="571500" indent="-571500"/>
+              <a:r>
+                <a:rPr lang="en-US" sz="4000" dirty="0" smtClean="0"/>
+                <a:t>Extending beyond the project as it is, we hope to:</a:t>
+              </a:r>
+            </a:p>
+            <a:p>
+              <a:pPr marL="571500" indent="-571500">
+                <a:buFont typeface="Arial" panose="020B0604020202020204" pitchFamily="34" charset="0"/>
+                <a:buChar char="•"/>
+              </a:pPr>
+              <a:r>
+                <a:rPr lang="en-US" sz="4000" dirty="0" smtClean="0"/>
+                <a:t>Cover a g</a:t>
+              </a:r>
+              <a:r>
+                <a:rPr lang="en-US" sz="4000" dirty="0" smtClean="0"/>
+                <a:t>reater geographic region, including additional cities</a:t>
+              </a:r>
+            </a:p>
+            <a:p>
+              <a:pPr marL="571500" indent="-571500">
+                <a:buFont typeface="Arial" panose="020B0604020202020204" pitchFamily="34" charset="0"/>
+                <a:buChar char="•"/>
+              </a:pPr>
+              <a:r>
+                <a:rPr lang="en-US" sz="4000" dirty="0" smtClean="0"/>
+                <a:t>Expand to a l</a:t>
+              </a:r>
+              <a:r>
+                <a:rPr lang="en-US" sz="4000" dirty="0" smtClean="0"/>
+                <a:t>arger </a:t>
+              </a:r>
+              <a:r>
+                <a:rPr lang="en-US" sz="4000" dirty="0"/>
+                <a:t>number of simulations</a:t>
+              </a:r>
+            </a:p>
+            <a:p>
+              <a:pPr marL="571500" indent="-571500">
+                <a:buFont typeface="Arial" panose="020B0604020202020204" pitchFamily="34" charset="0"/>
+                <a:buChar char="•"/>
+              </a:pPr>
+              <a:r>
+                <a:rPr lang="en-US" sz="4000" dirty="0"/>
+                <a:t>Alternate expressions of </a:t>
+              </a:r>
+              <a:r>
+                <a:rPr lang="en-US" sz="4000" dirty="0" smtClean="0"/>
+                <a:t>uncertainty</a:t>
+              </a:r>
+            </a:p>
+            <a:p>
+              <a:pPr marL="571500" indent="-571500"/>
+              <a:r>
+                <a:rPr lang="en-US" sz="4000" dirty="0" smtClean="0"/>
+                <a:t>In addition, it would be interesting to evaluate the usefulness of the interactive probability explorer in a study with human subjects.</a:t>
+              </a:r>
+              <a:endParaRPr lang="en-US" sz="4000" dirty="0" smtClean="0"/>
+            </a:p>
+          </p:txBody>
+        </p:sp>
+      </p:grpSp>
       <p:pic>
         <p:nvPicPr>
           <p:cNvPr id="1027" name="Picture 3"/>
@@ -4499,10 +4545,10 @@
         </p:nvGrpSpPr>
         <p:grpSpPr>
           <a:xfrm>
-            <a:off x="29946600" y="12801600"/>
-            <a:ext cx="13944600" cy="6161246"/>
+            <a:off x="29413200" y="12573000"/>
+            <a:ext cx="13944600" cy="4776252"/>
             <a:chOff x="29489400" y="8991600"/>
-            <a:chExt cx="13944600" cy="6161246"/>
+            <a:chExt cx="13944600" cy="4776252"/>
           </a:xfrm>
         </p:grpSpPr>
         <p:sp>
@@ -4547,7 +4593,7 @@
           <p:spPr>
             <a:xfrm>
               <a:off x="29489400" y="9982200"/>
-              <a:ext cx="13944600" cy="5170646"/>
+              <a:ext cx="13944600" cy="3785652"/>
             </a:xfrm>
             <a:prstGeom prst="rect">
               <a:avLst/>
@@ -4562,32 +4608,51 @@
             <a:p>
               <a:r>
                 <a:rPr lang="en-US" sz="4000" dirty="0"/>
-                <a:t>We use small multiples to convey that there are many possible outcomes in the event of a tsunami. Showing a small number of specific events highlights the variety of possible outcomes and allows the reader to make direct comparisons.</a:t>
-              </a:r>
-            </a:p>
-            <a:p>
-              <a:endParaRPr lang="en-US" sz="1000" dirty="0"/>
-            </a:p>
-            <a:p>
+                <a:t>We use small multiples </a:t>
+              </a:r>
+              <a:r>
+                <a:rPr lang="en-US" sz="4000" dirty="0" smtClean="0"/>
+                <a:t>to simultaneously convey a broad range of possible outcomes </a:t>
+              </a:r>
               <a:r>
                 <a:rPr lang="en-US" sz="4000" dirty="0"/>
-                <a:t>We implement small multiples as replicated displays of a small geographic region of interest. The multiples are positioned opposite the </a:t>
-              </a:r>
-              <a:r>
-                <a:rPr lang="en-US" sz="4000" dirty="0" smtClean="0"/>
-                <a:t>larger aggregated </a:t>
+                <a:t>in the event of a tsunami. </a:t>
+              </a:r>
+              <a:r>
+                <a:rPr lang="en-US" sz="4000" dirty="0" smtClean="0"/>
+                <a:t>Showing</a:t>
+              </a:r>
+              <a:r>
+                <a:rPr lang="en-US" sz="4000" dirty="0" smtClean="0"/>
+                <a:t> </a:t>
+              </a:r>
+              <a:r>
+                <a:rPr lang="en-US" sz="4000" dirty="0" smtClean="0"/>
+                <a:t>specific </a:t>
               </a:r>
               <a:r>
                 <a:rPr lang="en-US" sz="4000" dirty="0"/>
-                <a:t>hazard map.</a:t>
-              </a:r>
-              <a:r>
-                <a:rPr lang="en-US" sz="4000" dirty="0" smtClean="0"/>
-                <a:t> Each </a:t>
+                <a:t>events highlights the variety of possible </a:t>
+              </a:r>
+              <a:r>
+                <a:rPr lang="en-US" sz="4000" dirty="0" smtClean="0"/>
+                <a:t>outcomes, ensuring that extreme events are not lost in the aggregate map. The small multiples also allow </a:t>
               </a:r>
               <a:r>
                 <a:rPr lang="en-US" sz="4000" dirty="0"/>
-                <a:t>multiple overlays the inundation depth of particular events as shaded contour plots.</a:t>
+                <a:t>the reader to make direct </a:t>
+              </a:r>
+              <a:r>
+                <a:rPr lang="en-US" sz="4000" dirty="0" smtClean="0"/>
+                <a:t>comparisons between simulations, which is </a:t>
+              </a:r>
+              <a:r>
+                <a:rPr lang="en-US" sz="4000" dirty="0" smtClean="0"/>
+                <a:t>difficult with the flipbook</a:t>
+              </a:r>
+              <a:r>
+                <a:rPr lang="en-US" sz="4000" dirty="0" smtClean="0"/>
+                <a:t>.</a:t>
               </a:r>
             </a:p>
           </p:txBody>
@@ -4897,9 +4962,10 @@
             <a:p>
               <a:pPr algn="just"/>
               <a:r>
-                <a:rPr lang="en-US" sz="4000" dirty="0"/>
-                <a:t>Text</a:t>
-              </a:r>
+                <a:rPr lang="en-US" sz="4000" dirty="0" smtClean="0"/>
+                <a:t>Image + short description</a:t>
+              </a:r>
+              <a:endParaRPr lang="en-US" sz="4000" dirty="0"/>
             </a:p>
           </p:txBody>
         </p:sp>
@@ -5006,7 +5072,7 @@
             <a:pPr algn="just"/>
             <a:r>
               <a:rPr lang="en-US" sz="4000" dirty="0" smtClean="0"/>
-              <a:t>Throughout, inundation levels are plotted as contour  maps, with color encoding water depth (meters).</a:t>
+              <a:t>Throughout, inundation levels are overlaid on the maps as shaded contour  plots, with color encoding water depth (meters). </a:t>
             </a:r>
             <a:endParaRPr lang="en-US" sz="4000" dirty="0"/>
           </a:p>
@@ -5195,6 +5261,30 @@
           </p:txBody>
         </p:sp>
       </p:grpSp>
+      <p:pic>
+        <p:nvPicPr>
+          <p:cNvPr id="76" name="Picture 75" descr="prob_explorer.png"/>
+          <p:cNvPicPr>
+            <a:picLocks noChangeAspect="1"/>
+          </p:cNvPicPr>
+          <p:nvPr/>
+        </p:nvPicPr>
+        <p:blipFill>
+          <a:blip r:embed="rId5"/>
+          <a:stretch>
+            <a:fillRect/>
+          </a:stretch>
+        </p:blipFill>
+        <p:spPr>
+          <a:xfrm>
+            <a:off x="22174200" y="22631400"/>
+            <a:ext cx="5854700" cy="1549400"/>
+          </a:xfrm>
+          <a:prstGeom prst="rect">
+            <a:avLst/>
+          </a:prstGeom>
+        </p:spPr>
+      </p:pic>
     </p:spTree>
     <p:extLst>
       <p:ext uri="{BB962C8B-B14F-4D97-AF65-F5344CB8AC3E}">

</xml_diff>

<commit_message>
Updated uncertainty citation and probability explorer.
</commit_message>
<xml_diff>
--- a/poster/poster.pptx
+++ b/poster/poster.pptx
@@ -1,6 +1,6 @@
 
 <file path=ppt/presentation.xml><?xml version="1.0" encoding="utf-8"?>
-<p:presentation xmlns:a="http://schemas.openxmlformats.org/drawingml/2006/main" xmlns:r="http://schemas.openxmlformats.org/officeDocument/2006/relationships" xmlns:mc="http://schemas.openxmlformats.org/markup-compatibility/2006" xmlns:mv="urn:schemas-microsoft-com:mac:vml" xmlns:p="http://schemas.openxmlformats.org/presentationml/2006/main" mc:Ignorable="mv" mc:PreserveAttributes="mv:*" saveSubsetFonts="1">
+<p:presentation xmlns:a="http://schemas.openxmlformats.org/drawingml/2006/main" xmlns:r="http://schemas.openxmlformats.org/officeDocument/2006/relationships" xmlns:p="http://schemas.openxmlformats.org/presentationml/2006/main" saveSubsetFonts="1">
   <p:sldMasterIdLst>
     <p:sldMasterId id="2147483648" r:id="rId1"/>
   </p:sldMasterIdLst>
@@ -106,7 +106,7 @@
   </p:defaultTextStyle>
   <p:extLst>
     <p:ext uri="{EFAFB233-063F-42B5-8137-9DF3F51BA10A}">
-      <p15:sldGuideLst xmlns:p15="http://schemas.microsoft.com/office/powerpoint/2012/main" xmlns:p="http://schemas.openxmlformats.org/presentationml/2006/main" xmlns:r="http://schemas.openxmlformats.org/officeDocument/2006/relationships" xmlns:a="http://schemas.openxmlformats.org/drawingml/2006/main" xmlns="">
+      <p15:sldGuideLst xmlns:p15="http://schemas.microsoft.com/office/powerpoint/2012/main">
         <p15:guide id="1" orient="horz" pos="10368">
           <p15:clr>
             <a:srgbClr val="A4A3A4"/>
@@ -124,7 +124,7 @@
 </file>
 
 <file path=ppt/slideLayouts/slideLayout1.xml><?xml version="1.0" encoding="utf-8"?>
-<p:sldLayout xmlns:a="http://schemas.openxmlformats.org/drawingml/2006/main" xmlns:r="http://schemas.openxmlformats.org/officeDocument/2006/relationships" xmlns:mc="http://schemas.openxmlformats.org/markup-compatibility/2006" xmlns:mv="urn:schemas-microsoft-com:mac:vml" xmlns:p="http://schemas.openxmlformats.org/presentationml/2006/main" mc:Ignorable="mv" mc:PreserveAttributes="mv:*" type="title" preserve="1">
+<p:sldLayout xmlns:a="http://schemas.openxmlformats.org/drawingml/2006/main" xmlns:r="http://schemas.openxmlformats.org/officeDocument/2006/relationships" xmlns:p="http://schemas.openxmlformats.org/presentationml/2006/main" type="title" preserve="1">
   <p:cSld name="Title Slide">
     <p:spTree>
       <p:nvGrpSpPr>
@@ -303,7 +303,7 @@
             <a:fld id="{0809B32C-EADE-4737-9FCF-CC2867D24216}" type="datetimeFigureOut">
               <a:rPr lang="en-US" altLang="ja-JP" smtClean="0"/>
               <a:pPr/>
-              <a:t>18.5.29</a:t>
+              <a:t>5/29/2018</a:t>
             </a:fld>
             <a:endParaRPr lang="en-US"/>
           </a:p>
@@ -355,7 +355,7 @@
     </p:spTree>
     <p:extLst>
       <p:ext uri="{BB962C8B-B14F-4D97-AF65-F5344CB8AC3E}">
-        <p14:creationId xmlns:p14="http://schemas.microsoft.com/office/powerpoint/2010/main" xmlns:p="http://schemas.openxmlformats.org/presentationml/2006/main" xmlns:r="http://schemas.openxmlformats.org/officeDocument/2006/relationships" xmlns:a="http://schemas.openxmlformats.org/drawingml/2006/main" xmlns="" val="2867589700"/>
+        <p14:creationId xmlns:p14="http://schemas.microsoft.com/office/powerpoint/2010/main" val="2867589700"/>
       </p:ext>
     </p:extLst>
   </p:cSld>
@@ -366,7 +366,7 @@
 </file>
 
 <file path=ppt/slideLayouts/slideLayout10.xml><?xml version="1.0" encoding="utf-8"?>
-<p:sldLayout xmlns:a="http://schemas.openxmlformats.org/drawingml/2006/main" xmlns:r="http://schemas.openxmlformats.org/officeDocument/2006/relationships" xmlns:mc="http://schemas.openxmlformats.org/markup-compatibility/2006" xmlns:mv="urn:schemas-microsoft-com:mac:vml" xmlns:p="http://schemas.openxmlformats.org/presentationml/2006/main" mc:Ignorable="mv" mc:PreserveAttributes="mv:*" type="vertTx" preserve="1">
+<p:sldLayout xmlns:a="http://schemas.openxmlformats.org/drawingml/2006/main" xmlns:r="http://schemas.openxmlformats.org/officeDocument/2006/relationships" xmlns:p="http://schemas.openxmlformats.org/presentationml/2006/main" type="vertTx" preserve="1">
   <p:cSld name="Title and Vertical Text">
     <p:spTree>
       <p:nvGrpSpPr>
@@ -473,7 +473,7 @@
             <a:fld id="{0809B32C-EADE-4737-9FCF-CC2867D24216}" type="datetimeFigureOut">
               <a:rPr lang="en-US" altLang="ja-JP" smtClean="0"/>
               <a:pPr/>
-              <a:t>18.5.29</a:t>
+              <a:t>5/29/2018</a:t>
             </a:fld>
             <a:endParaRPr lang="en-US"/>
           </a:p>
@@ -525,7 +525,7 @@
     </p:spTree>
     <p:extLst>
       <p:ext uri="{BB962C8B-B14F-4D97-AF65-F5344CB8AC3E}">
-        <p14:creationId xmlns:p14="http://schemas.microsoft.com/office/powerpoint/2010/main" xmlns:p="http://schemas.openxmlformats.org/presentationml/2006/main" xmlns:r="http://schemas.openxmlformats.org/officeDocument/2006/relationships" xmlns:a="http://schemas.openxmlformats.org/drawingml/2006/main" xmlns="" val="3541726029"/>
+        <p14:creationId xmlns:p14="http://schemas.microsoft.com/office/powerpoint/2010/main" val="3541726029"/>
       </p:ext>
     </p:extLst>
   </p:cSld>
@@ -536,7 +536,7 @@
 </file>
 
 <file path=ppt/slideLayouts/slideLayout11.xml><?xml version="1.0" encoding="utf-8"?>
-<p:sldLayout xmlns:a="http://schemas.openxmlformats.org/drawingml/2006/main" xmlns:r="http://schemas.openxmlformats.org/officeDocument/2006/relationships" xmlns:mc="http://schemas.openxmlformats.org/markup-compatibility/2006" xmlns:mv="urn:schemas-microsoft-com:mac:vml" xmlns:p="http://schemas.openxmlformats.org/presentationml/2006/main" mc:Ignorable="mv" mc:PreserveAttributes="mv:*" type="vertTitleAndTx" preserve="1">
+<p:sldLayout xmlns:a="http://schemas.openxmlformats.org/drawingml/2006/main" xmlns:r="http://schemas.openxmlformats.org/officeDocument/2006/relationships" xmlns:p="http://schemas.openxmlformats.org/presentationml/2006/main" type="vertTitleAndTx" preserve="1">
   <p:cSld name="Vertical Title and Text">
     <p:spTree>
       <p:nvGrpSpPr>
@@ -653,7 +653,7 @@
             <a:fld id="{0809B32C-EADE-4737-9FCF-CC2867D24216}" type="datetimeFigureOut">
               <a:rPr lang="en-US" altLang="ja-JP" smtClean="0"/>
               <a:pPr/>
-              <a:t>18.5.29</a:t>
+              <a:t>5/29/2018</a:t>
             </a:fld>
             <a:endParaRPr lang="en-US"/>
           </a:p>
@@ -705,7 +705,7 @@
     </p:spTree>
     <p:extLst>
       <p:ext uri="{BB962C8B-B14F-4D97-AF65-F5344CB8AC3E}">
-        <p14:creationId xmlns:p14="http://schemas.microsoft.com/office/powerpoint/2010/main" xmlns:p="http://schemas.openxmlformats.org/presentationml/2006/main" xmlns:r="http://schemas.openxmlformats.org/officeDocument/2006/relationships" xmlns:a="http://schemas.openxmlformats.org/drawingml/2006/main" xmlns="" val="2225759547"/>
+        <p14:creationId xmlns:p14="http://schemas.microsoft.com/office/powerpoint/2010/main" val="2225759547"/>
       </p:ext>
     </p:extLst>
   </p:cSld>
@@ -716,7 +716,7 @@
 </file>
 
 <file path=ppt/slideLayouts/slideLayout2.xml><?xml version="1.0" encoding="utf-8"?>
-<p:sldLayout xmlns:a="http://schemas.openxmlformats.org/drawingml/2006/main" xmlns:r="http://schemas.openxmlformats.org/officeDocument/2006/relationships" xmlns:mc="http://schemas.openxmlformats.org/markup-compatibility/2006" xmlns:mv="urn:schemas-microsoft-com:mac:vml" xmlns:p="http://schemas.openxmlformats.org/presentationml/2006/main" mc:Ignorable="mv" mc:PreserveAttributes="mv:*" type="obj" preserve="1">
+<p:sldLayout xmlns:a="http://schemas.openxmlformats.org/drawingml/2006/main" xmlns:r="http://schemas.openxmlformats.org/officeDocument/2006/relationships" xmlns:p="http://schemas.openxmlformats.org/presentationml/2006/main" type="obj" preserve="1">
   <p:cSld name="Title and Content">
     <p:spTree>
       <p:nvGrpSpPr>
@@ -823,7 +823,7 @@
             <a:fld id="{0809B32C-EADE-4737-9FCF-CC2867D24216}" type="datetimeFigureOut">
               <a:rPr lang="en-US" altLang="ja-JP" smtClean="0"/>
               <a:pPr/>
-              <a:t>18.5.29</a:t>
+              <a:t>5/29/2018</a:t>
             </a:fld>
             <a:endParaRPr lang="en-US"/>
           </a:p>
@@ -875,7 +875,7 @@
     </p:spTree>
     <p:extLst>
       <p:ext uri="{BB962C8B-B14F-4D97-AF65-F5344CB8AC3E}">
-        <p14:creationId xmlns:p14="http://schemas.microsoft.com/office/powerpoint/2010/main" xmlns:p="http://schemas.openxmlformats.org/presentationml/2006/main" xmlns:r="http://schemas.openxmlformats.org/officeDocument/2006/relationships" xmlns:a="http://schemas.openxmlformats.org/drawingml/2006/main" xmlns="" val="593273982"/>
+        <p14:creationId xmlns:p14="http://schemas.microsoft.com/office/powerpoint/2010/main" val="593273982"/>
       </p:ext>
     </p:extLst>
   </p:cSld>
@@ -886,7 +886,7 @@
 </file>
 
 <file path=ppt/slideLayouts/slideLayout3.xml><?xml version="1.0" encoding="utf-8"?>
-<p:sldLayout xmlns:a="http://schemas.openxmlformats.org/drawingml/2006/main" xmlns:r="http://schemas.openxmlformats.org/officeDocument/2006/relationships" xmlns:mc="http://schemas.openxmlformats.org/markup-compatibility/2006" xmlns:mv="urn:schemas-microsoft-com:mac:vml" xmlns:p="http://schemas.openxmlformats.org/presentationml/2006/main" mc:Ignorable="mv" mc:PreserveAttributes="mv:*" type="secHead" preserve="1">
+<p:sldLayout xmlns:a="http://schemas.openxmlformats.org/drawingml/2006/main" xmlns:r="http://schemas.openxmlformats.org/officeDocument/2006/relationships" xmlns:p="http://schemas.openxmlformats.org/presentationml/2006/main" type="secHead" preserve="1">
   <p:cSld name="Section Header">
     <p:spTree>
       <p:nvGrpSpPr>
@@ -1070,7 +1070,7 @@
             <a:fld id="{0809B32C-EADE-4737-9FCF-CC2867D24216}" type="datetimeFigureOut">
               <a:rPr lang="en-US" altLang="ja-JP" smtClean="0"/>
               <a:pPr/>
-              <a:t>18.5.29</a:t>
+              <a:t>5/29/2018</a:t>
             </a:fld>
             <a:endParaRPr lang="en-US"/>
           </a:p>
@@ -1122,7 +1122,7 @@
     </p:spTree>
     <p:extLst>
       <p:ext uri="{BB962C8B-B14F-4D97-AF65-F5344CB8AC3E}">
-        <p14:creationId xmlns:p14="http://schemas.microsoft.com/office/powerpoint/2010/main" xmlns:p="http://schemas.openxmlformats.org/presentationml/2006/main" xmlns:r="http://schemas.openxmlformats.org/officeDocument/2006/relationships" xmlns:a="http://schemas.openxmlformats.org/drawingml/2006/main" xmlns="" val="1190219301"/>
+        <p14:creationId xmlns:p14="http://schemas.microsoft.com/office/powerpoint/2010/main" val="1190219301"/>
       </p:ext>
     </p:extLst>
   </p:cSld>
@@ -1133,7 +1133,7 @@
 </file>
 
 <file path=ppt/slideLayouts/slideLayout4.xml><?xml version="1.0" encoding="utf-8"?>
-<p:sldLayout xmlns:a="http://schemas.openxmlformats.org/drawingml/2006/main" xmlns:r="http://schemas.openxmlformats.org/officeDocument/2006/relationships" xmlns:mc="http://schemas.openxmlformats.org/markup-compatibility/2006" xmlns:mv="urn:schemas-microsoft-com:mac:vml" xmlns:p="http://schemas.openxmlformats.org/presentationml/2006/main" mc:Ignorable="mv" mc:PreserveAttributes="mv:*" type="twoObj" preserve="1">
+<p:sldLayout xmlns:a="http://schemas.openxmlformats.org/drawingml/2006/main" xmlns:r="http://schemas.openxmlformats.org/officeDocument/2006/relationships" xmlns:p="http://schemas.openxmlformats.org/presentationml/2006/main" type="twoObj" preserve="1">
   <p:cSld name="Two Content">
     <p:spTree>
       <p:nvGrpSpPr>
@@ -1357,7 +1357,7 @@
             <a:fld id="{0809B32C-EADE-4737-9FCF-CC2867D24216}" type="datetimeFigureOut">
               <a:rPr lang="en-US" altLang="ja-JP" smtClean="0"/>
               <a:pPr/>
-              <a:t>18.5.29</a:t>
+              <a:t>5/29/2018</a:t>
             </a:fld>
             <a:endParaRPr lang="en-US"/>
           </a:p>
@@ -1409,7 +1409,7 @@
     </p:spTree>
     <p:extLst>
       <p:ext uri="{BB962C8B-B14F-4D97-AF65-F5344CB8AC3E}">
-        <p14:creationId xmlns:p14="http://schemas.microsoft.com/office/powerpoint/2010/main" xmlns:p="http://schemas.openxmlformats.org/presentationml/2006/main" xmlns:r="http://schemas.openxmlformats.org/officeDocument/2006/relationships" xmlns:a="http://schemas.openxmlformats.org/drawingml/2006/main" xmlns="" val="3755065682"/>
+        <p14:creationId xmlns:p14="http://schemas.microsoft.com/office/powerpoint/2010/main" val="3755065682"/>
       </p:ext>
     </p:extLst>
   </p:cSld>
@@ -1420,7 +1420,7 @@
 </file>
 
 <file path=ppt/slideLayouts/slideLayout5.xml><?xml version="1.0" encoding="utf-8"?>
-<p:sldLayout xmlns:a="http://schemas.openxmlformats.org/drawingml/2006/main" xmlns:r="http://schemas.openxmlformats.org/officeDocument/2006/relationships" xmlns:mc="http://schemas.openxmlformats.org/markup-compatibility/2006" xmlns:mv="urn:schemas-microsoft-com:mac:vml" xmlns:p="http://schemas.openxmlformats.org/presentationml/2006/main" mc:Ignorable="mv" mc:PreserveAttributes="mv:*" type="twoTxTwoObj" preserve="1">
+<p:sldLayout xmlns:a="http://schemas.openxmlformats.org/drawingml/2006/main" xmlns:r="http://schemas.openxmlformats.org/officeDocument/2006/relationships" xmlns:p="http://schemas.openxmlformats.org/presentationml/2006/main" type="twoTxTwoObj" preserve="1">
   <p:cSld name="Comparison">
     <p:spTree>
       <p:nvGrpSpPr>
@@ -1783,7 +1783,7 @@
             <a:fld id="{0809B32C-EADE-4737-9FCF-CC2867D24216}" type="datetimeFigureOut">
               <a:rPr lang="en-US" altLang="ja-JP" smtClean="0"/>
               <a:pPr/>
-              <a:t>18.5.29</a:t>
+              <a:t>5/29/2018</a:t>
             </a:fld>
             <a:endParaRPr lang="en-US"/>
           </a:p>
@@ -1835,7 +1835,7 @@
     </p:spTree>
     <p:extLst>
       <p:ext uri="{BB962C8B-B14F-4D97-AF65-F5344CB8AC3E}">
-        <p14:creationId xmlns:p14="http://schemas.microsoft.com/office/powerpoint/2010/main" xmlns:p="http://schemas.openxmlformats.org/presentationml/2006/main" xmlns:r="http://schemas.openxmlformats.org/officeDocument/2006/relationships" xmlns:a="http://schemas.openxmlformats.org/drawingml/2006/main" xmlns="" val="3739948909"/>
+        <p14:creationId xmlns:p14="http://schemas.microsoft.com/office/powerpoint/2010/main" val="3739948909"/>
       </p:ext>
     </p:extLst>
   </p:cSld>
@@ -1846,7 +1846,7 @@
 </file>
 
 <file path=ppt/slideLayouts/slideLayout6.xml><?xml version="1.0" encoding="utf-8"?>
-<p:sldLayout xmlns:a="http://schemas.openxmlformats.org/drawingml/2006/main" xmlns:r="http://schemas.openxmlformats.org/officeDocument/2006/relationships" xmlns:mc="http://schemas.openxmlformats.org/markup-compatibility/2006" xmlns:mv="urn:schemas-microsoft-com:mac:vml" xmlns:p="http://schemas.openxmlformats.org/presentationml/2006/main" mc:Ignorable="mv" mc:PreserveAttributes="mv:*" type="titleOnly" preserve="1">
+<p:sldLayout xmlns:a="http://schemas.openxmlformats.org/drawingml/2006/main" xmlns:r="http://schemas.openxmlformats.org/officeDocument/2006/relationships" xmlns:p="http://schemas.openxmlformats.org/presentationml/2006/main" type="titleOnly" preserve="1">
   <p:cSld name="Title Only">
     <p:spTree>
       <p:nvGrpSpPr>
@@ -1902,7 +1902,7 @@
             <a:fld id="{0809B32C-EADE-4737-9FCF-CC2867D24216}" type="datetimeFigureOut">
               <a:rPr lang="en-US" altLang="ja-JP" smtClean="0"/>
               <a:pPr/>
-              <a:t>18.5.29</a:t>
+              <a:t>5/29/2018</a:t>
             </a:fld>
             <a:endParaRPr lang="en-US"/>
           </a:p>
@@ -1954,7 +1954,7 @@
     </p:spTree>
     <p:extLst>
       <p:ext uri="{BB962C8B-B14F-4D97-AF65-F5344CB8AC3E}">
-        <p14:creationId xmlns:p14="http://schemas.microsoft.com/office/powerpoint/2010/main" xmlns:p="http://schemas.openxmlformats.org/presentationml/2006/main" xmlns:r="http://schemas.openxmlformats.org/officeDocument/2006/relationships" xmlns:a="http://schemas.openxmlformats.org/drawingml/2006/main" xmlns="" val="3928910103"/>
+        <p14:creationId xmlns:p14="http://schemas.microsoft.com/office/powerpoint/2010/main" val="3928910103"/>
       </p:ext>
     </p:extLst>
   </p:cSld>
@@ -1965,7 +1965,7 @@
 </file>
 
 <file path=ppt/slideLayouts/slideLayout7.xml><?xml version="1.0" encoding="utf-8"?>
-<p:sldLayout xmlns:a="http://schemas.openxmlformats.org/drawingml/2006/main" xmlns:r="http://schemas.openxmlformats.org/officeDocument/2006/relationships" xmlns:mc="http://schemas.openxmlformats.org/markup-compatibility/2006" xmlns:mv="urn:schemas-microsoft-com:mac:vml" xmlns:p="http://schemas.openxmlformats.org/presentationml/2006/main" mc:Ignorable="mv" mc:PreserveAttributes="mv:*" type="blank" preserve="1">
+<p:sldLayout xmlns:a="http://schemas.openxmlformats.org/drawingml/2006/main" xmlns:r="http://schemas.openxmlformats.org/officeDocument/2006/relationships" xmlns:p="http://schemas.openxmlformats.org/presentationml/2006/main" type="blank" preserve="1">
   <p:cSld name="Blank">
     <p:spTree>
       <p:nvGrpSpPr>
@@ -1999,7 +1999,7 @@
             <a:fld id="{0809B32C-EADE-4737-9FCF-CC2867D24216}" type="datetimeFigureOut">
               <a:rPr lang="en-US" altLang="ja-JP" smtClean="0"/>
               <a:pPr/>
-              <a:t>18.5.29</a:t>
+              <a:t>5/29/2018</a:t>
             </a:fld>
             <a:endParaRPr lang="en-US"/>
           </a:p>
@@ -2051,7 +2051,7 @@
     </p:spTree>
     <p:extLst>
       <p:ext uri="{BB962C8B-B14F-4D97-AF65-F5344CB8AC3E}">
-        <p14:creationId xmlns:p14="http://schemas.microsoft.com/office/powerpoint/2010/main" xmlns:p="http://schemas.openxmlformats.org/presentationml/2006/main" xmlns:r="http://schemas.openxmlformats.org/officeDocument/2006/relationships" xmlns:a="http://schemas.openxmlformats.org/drawingml/2006/main" xmlns="" val="644220210"/>
+        <p14:creationId xmlns:p14="http://schemas.microsoft.com/office/powerpoint/2010/main" val="644220210"/>
       </p:ext>
     </p:extLst>
   </p:cSld>
@@ -2062,7 +2062,7 @@
 </file>
 
 <file path=ppt/slideLayouts/slideLayout8.xml><?xml version="1.0" encoding="utf-8"?>
-<p:sldLayout xmlns:a="http://schemas.openxmlformats.org/drawingml/2006/main" xmlns:r="http://schemas.openxmlformats.org/officeDocument/2006/relationships" xmlns:mc="http://schemas.openxmlformats.org/markup-compatibility/2006" xmlns:mv="urn:schemas-microsoft-com:mac:vml" xmlns:p="http://schemas.openxmlformats.org/presentationml/2006/main" mc:Ignorable="mv" mc:PreserveAttributes="mv:*" type="objTx" preserve="1">
+<p:sldLayout xmlns:a="http://schemas.openxmlformats.org/drawingml/2006/main" xmlns:r="http://schemas.openxmlformats.org/officeDocument/2006/relationships" xmlns:p="http://schemas.openxmlformats.org/presentationml/2006/main" type="objTx" preserve="1">
   <p:cSld name="Content with Caption">
     <p:spTree>
       <p:nvGrpSpPr>
@@ -2276,7 +2276,7 @@
             <a:fld id="{0809B32C-EADE-4737-9FCF-CC2867D24216}" type="datetimeFigureOut">
               <a:rPr lang="en-US" altLang="ja-JP" smtClean="0"/>
               <a:pPr/>
-              <a:t>18.5.29</a:t>
+              <a:t>5/29/2018</a:t>
             </a:fld>
             <a:endParaRPr lang="en-US"/>
           </a:p>
@@ -2328,7 +2328,7 @@
     </p:spTree>
     <p:extLst>
       <p:ext uri="{BB962C8B-B14F-4D97-AF65-F5344CB8AC3E}">
-        <p14:creationId xmlns:p14="http://schemas.microsoft.com/office/powerpoint/2010/main" xmlns:p="http://schemas.openxmlformats.org/presentationml/2006/main" xmlns:r="http://schemas.openxmlformats.org/officeDocument/2006/relationships" xmlns:a="http://schemas.openxmlformats.org/drawingml/2006/main" xmlns="" val="3588224904"/>
+        <p14:creationId xmlns:p14="http://schemas.microsoft.com/office/powerpoint/2010/main" val="3588224904"/>
       </p:ext>
     </p:extLst>
   </p:cSld>
@@ -2339,7 +2339,7 @@
 </file>
 
 <file path=ppt/slideLayouts/slideLayout9.xml><?xml version="1.0" encoding="utf-8"?>
-<p:sldLayout xmlns:a="http://schemas.openxmlformats.org/drawingml/2006/main" xmlns:r="http://schemas.openxmlformats.org/officeDocument/2006/relationships" xmlns:mc="http://schemas.openxmlformats.org/markup-compatibility/2006" xmlns:mv="urn:schemas-microsoft-com:mac:vml" xmlns:p="http://schemas.openxmlformats.org/presentationml/2006/main" mc:Ignorable="mv" mc:PreserveAttributes="mv:*" type="picTx" preserve="1">
+<p:sldLayout xmlns:a="http://schemas.openxmlformats.org/drawingml/2006/main" xmlns:r="http://schemas.openxmlformats.org/officeDocument/2006/relationships" xmlns:p="http://schemas.openxmlformats.org/presentationml/2006/main" type="picTx" preserve="1">
   <p:cSld name="Picture with Caption">
     <p:spTree>
       <p:nvGrpSpPr>
@@ -2530,7 +2530,7 @@
             <a:fld id="{0809B32C-EADE-4737-9FCF-CC2867D24216}" type="datetimeFigureOut">
               <a:rPr lang="en-US" altLang="ja-JP" smtClean="0"/>
               <a:pPr/>
-              <a:t>18.5.29</a:t>
+              <a:t>5/29/2018</a:t>
             </a:fld>
             <a:endParaRPr lang="en-US"/>
           </a:p>
@@ -2582,7 +2582,7 @@
     </p:spTree>
     <p:extLst>
       <p:ext uri="{BB962C8B-B14F-4D97-AF65-F5344CB8AC3E}">
-        <p14:creationId xmlns:p14="http://schemas.microsoft.com/office/powerpoint/2010/main" xmlns:p="http://schemas.openxmlformats.org/presentationml/2006/main" xmlns:r="http://schemas.openxmlformats.org/officeDocument/2006/relationships" xmlns:a="http://schemas.openxmlformats.org/drawingml/2006/main" xmlns="" val="3421279473"/>
+        <p14:creationId xmlns:p14="http://schemas.microsoft.com/office/powerpoint/2010/main" val="3421279473"/>
       </p:ext>
     </p:extLst>
   </p:cSld>
@@ -2593,7 +2593,7 @@
 </file>
 
 <file path=ppt/slideMasters/slideMaster1.xml><?xml version="1.0" encoding="utf-8"?>
-<p:sldMaster xmlns:a="http://schemas.openxmlformats.org/drawingml/2006/main" xmlns:r="http://schemas.openxmlformats.org/officeDocument/2006/relationships" xmlns:mc="http://schemas.openxmlformats.org/markup-compatibility/2006" xmlns:mv="urn:schemas-microsoft-com:mac:vml" xmlns:p="http://schemas.openxmlformats.org/presentationml/2006/main" mc:Ignorable="mv" mc:PreserveAttributes="mv:*">
+<p:sldMaster xmlns:a="http://schemas.openxmlformats.org/drawingml/2006/main" xmlns:r="http://schemas.openxmlformats.org/officeDocument/2006/relationships" xmlns:p="http://schemas.openxmlformats.org/presentationml/2006/main">
   <p:cSld>
     <p:bg>
       <p:bgRef idx="1001">
@@ -2743,7 +2743,7 @@
             <a:fld id="{0809B32C-EADE-4737-9FCF-CC2867D24216}" type="datetimeFigureOut">
               <a:rPr lang="en-US" altLang="ja-JP" smtClean="0"/>
               <a:pPr/>
-              <a:t>18.5.29</a:t>
+              <a:t>5/29/2018</a:t>
             </a:fld>
             <a:endParaRPr lang="en-US"/>
           </a:p>
@@ -2831,7 +2831,7 @@
     </p:spTree>
     <p:extLst>
       <p:ext uri="{BB962C8B-B14F-4D97-AF65-F5344CB8AC3E}">
-        <p14:creationId xmlns:p14="http://schemas.microsoft.com/office/powerpoint/2010/main" xmlns:p="http://schemas.openxmlformats.org/presentationml/2006/main" xmlns:r="http://schemas.openxmlformats.org/officeDocument/2006/relationships" xmlns:a="http://schemas.openxmlformats.org/drawingml/2006/main" xmlns="" val="3905365285"/>
+        <p14:creationId xmlns:p14="http://schemas.microsoft.com/office/powerpoint/2010/main" val="3905365285"/>
       </p:ext>
     </p:extLst>
   </p:cSld>
@@ -3103,7 +3103,7 @@
 </file>
 
 <file path=ppt/slides/slide1.xml><?xml version="1.0" encoding="utf-8"?>
-<p:sld xmlns:a="http://schemas.openxmlformats.org/drawingml/2006/main" xmlns:r="http://schemas.openxmlformats.org/officeDocument/2006/relationships" xmlns:mc="http://schemas.openxmlformats.org/markup-compatibility/2006" xmlns:mv="urn:schemas-microsoft-com:mac:vml" xmlns:p="http://schemas.openxmlformats.org/presentationml/2006/main" mc:Ignorable="mv" mc:PreserveAttributes="mv:*">
+<p:sld xmlns:a="http://schemas.openxmlformats.org/drawingml/2006/main" xmlns:r="http://schemas.openxmlformats.org/officeDocument/2006/relationships" xmlns:p="http://schemas.openxmlformats.org/presentationml/2006/main">
   <p:cSld>
     <p:spTree>
       <p:nvGrpSpPr>
@@ -3138,7 +3138,7 @@
             <p:cNvPr id="10" name="Picture 9">
               <a:extLst>
                 <a:ext uri="{FF2B5EF4-FFF2-40B4-BE49-F238E27FC236}">
-                  <a16:creationId xmlns:a16="http://schemas.microsoft.com/office/drawing/2014/main" xmlns:p="http://schemas.openxmlformats.org/presentationml/2006/main" xmlns:r="http://schemas.openxmlformats.org/officeDocument/2006/relationships" xmlns:a="http://schemas.openxmlformats.org/drawingml/2006/main" xmlns="" id="{0F101F15-4A42-B24F-A91A-75F3A3AEE1C9}"/>
+                  <a16:creationId xmlns:a16="http://schemas.microsoft.com/office/drawing/2014/main" id="{0F101F15-4A42-B24F-A91A-75F3A3AEE1C9}"/>
                 </a:ext>
               </a:extLst>
             </p:cNvPr>
@@ -3151,7 +3151,7 @@
             <a:blip r:embed="rId2">
               <a:extLst>
                 <a:ext uri="{28A0092B-C50C-407E-A947-70E740481C1C}">
-                  <a14:useLocalDpi xmlns:a14="http://schemas.microsoft.com/office/drawing/2010/main" xmlns:p="http://schemas.openxmlformats.org/presentationml/2006/main" xmlns:r="http://schemas.openxmlformats.org/officeDocument/2006/relationships" xmlns:a="http://schemas.openxmlformats.org/drawingml/2006/main" xmlns="" val="0"/>
+                  <a14:useLocalDpi xmlns:a14="http://schemas.microsoft.com/office/drawing/2010/main" val="0"/>
                 </a:ext>
               </a:extLst>
             </a:blip>
@@ -3484,15 +3484,7 @@
               </a:r>
               <a:r>
                 <a:rPr lang="en-US" sz="4000" dirty="0" smtClean="0"/>
-                <a:t>.</a:t>
-              </a:r>
-              <a:r>
-                <a:rPr lang="en-US" sz="4000" dirty="0" smtClean="0"/>
-                <a:t> </a:t>
-              </a:r>
-              <a:r>
-                <a:rPr lang="en-US" sz="4000" dirty="0" smtClean="0"/>
-                <a:t>We </a:t>
+                <a:t>. We </a:t>
               </a:r>
               <a:r>
                 <a:rPr lang="en-US" sz="4000" dirty="0"/>
@@ -3656,11 +3648,7 @@
               </a:pPr>
               <a:r>
                 <a:rPr lang="en-US" sz="4000" dirty="0" smtClean="0"/>
-                <a:t>Cover a g</a:t>
-              </a:r>
-              <a:r>
-                <a:rPr lang="en-US" sz="4000" dirty="0" smtClean="0"/>
-                <a:t>reater geographic region, including additional cities</a:t>
+                <a:t>Cover a greater geographic region, including additional cities</a:t>
               </a:r>
             </a:p>
             <a:p>
@@ -3670,11 +3658,7 @@
               </a:pPr>
               <a:r>
                 <a:rPr lang="en-US" sz="4000" dirty="0" smtClean="0"/>
-                <a:t>Expand to a l</a:t>
-              </a:r>
-              <a:r>
-                <a:rPr lang="en-US" sz="4000" dirty="0" smtClean="0"/>
-                <a:t>arger </a:t>
+                <a:t>Expand to a larger </a:t>
               </a:r>
               <a:r>
                 <a:rPr lang="en-US" sz="4000" dirty="0"/>
@@ -3701,7 +3685,6 @@
                 <a:rPr lang="en-US" sz="4000" dirty="0" smtClean="0"/>
                 <a:t>In addition, it would be interesting to evaluate the usefulness of the interactive probability explorer in a study with human subjects.</a:t>
               </a:r>
-              <a:endParaRPr lang="en-US" sz="4000" dirty="0" smtClean="0"/>
             </a:p>
           </p:txBody>
         </p:sp>
@@ -3718,7 +3701,7 @@
           <a:blip r:embed="rId3">
             <a:extLst>
               <a:ext uri="{28A0092B-C50C-407E-A947-70E740481C1C}">
-                <a14:useLocalDpi xmlns:a14="http://schemas.microsoft.com/office/drawing/2010/main" xmlns:p="http://schemas.openxmlformats.org/presentationml/2006/main" xmlns:r="http://schemas.openxmlformats.org/officeDocument/2006/relationships" xmlns:a="http://schemas.openxmlformats.org/drawingml/2006/main" xmlns="" val="0"/>
+                <a14:useLocalDpi xmlns:a14="http://schemas.microsoft.com/office/drawing/2010/main" val="0"/>
               </a:ext>
             </a:extLst>
           </a:blip>
@@ -3737,7 +3720,7 @@
           <a:noFill/>
           <a:extLst>
             <a:ext uri="{909E8E84-426E-40DD-AFC4-6F175D3DCCD1}">
-              <a14:hiddenFill xmlns:a14="http://schemas.microsoft.com/office/drawing/2010/main" xmlns:p="http://schemas.openxmlformats.org/presentationml/2006/main" xmlns:r="http://schemas.openxmlformats.org/officeDocument/2006/relationships" xmlns:a="http://schemas.openxmlformats.org/drawingml/2006/main" xmlns="">
+              <a14:hiddenFill xmlns:a14="http://schemas.microsoft.com/office/drawing/2010/main">
                 <a:solidFill>
                   <a:srgbClr val="FFFFFF"/>
                 </a:solidFill>
@@ -3754,8 +3737,8 @@
         </p:nvGrpSpPr>
         <p:grpSpPr>
           <a:xfrm>
-            <a:off x="228601" y="3657600"/>
-            <a:ext cx="13258799" cy="29032199"/>
+            <a:off x="228601" y="3657601"/>
+            <a:ext cx="13258799" cy="28856940"/>
             <a:chOff x="228601" y="3657600"/>
             <a:chExt cx="13258799" cy="29032200"/>
           </a:xfrm>
@@ -3935,15 +3918,7 @@
               </a:r>
               <a:r>
                 <a:rPr lang="en-US" sz="4000" dirty="0" smtClean="0"/>
-                <a:t> </a:t>
-              </a:r>
-              <a:r>
-                <a:rPr lang="en-US" sz="4000" dirty="0" smtClean="0"/>
-                <a:t>R</a:t>
-              </a:r>
-              <a:r>
-                <a:rPr lang="en-US" sz="4000" dirty="0" smtClean="0"/>
-                <a:t>esearchers </a:t>
+                <a:t> Researchers </a:t>
               </a:r>
               <a:r>
                 <a:rPr lang="en-US" sz="4000" dirty="0"/>
@@ -4177,7 +4152,6 @@
                 <a:rPr lang="en-US" sz="4000" dirty="0" smtClean="0"/>
                 <a:t>tsunamis.</a:t>
               </a:r>
-              <a:endParaRPr lang="en-US" sz="4000" dirty="0" smtClean="0"/>
             </a:p>
           </p:txBody>
         </p:sp>
@@ -4206,11 +4180,7 @@
               <a:pPr marL="0" lvl="1" algn="just"/>
               <a:r>
                 <a:rPr lang="en-US" sz="4000" dirty="0" smtClean="0"/>
-                <a:t>The </a:t>
-              </a:r>
-              <a:r>
-                <a:rPr lang="en-US" sz="4000" dirty="0" smtClean="0"/>
-                <a:t>hazard maps correspond to complicated </a:t>
+                <a:t>The hazard maps correspond to complicated </a:t>
               </a:r>
               <a:r>
                 <a:rPr lang="en-US" sz="4000" b="1" dirty="0" smtClean="0"/>
@@ -4218,11 +4188,7 @@
               </a:r>
               <a:r>
                 <a:rPr lang="en-US" sz="4000" dirty="0" smtClean="0"/>
-                <a:t>at every point on the map, which describe the probability of inundation at every depth. Properly interpreting this map can be difficult for people without a technical background</a:t>
-              </a:r>
-              <a:r>
-                <a:rPr lang="en-US" sz="4000" dirty="0" smtClean="0"/>
-                <a:t>.</a:t>
+                <a:t>at every point on the map, which describe the probability of inundation at every depth. Properly interpreting this map can be difficult for people without a technical background.</a:t>
               </a:r>
             </a:p>
             <a:p>
@@ -4241,13 +4207,8 @@
               <a:pPr marL="0" lvl="1" algn="just"/>
               <a:r>
                 <a:rPr lang="en-US" sz="4000" dirty="0" smtClean="0"/>
-                <a:t>[ zeta picture here ] +  [ an example hazard function </a:t>
-              </a:r>
-              <a:r>
-                <a:rPr lang="en-US" sz="4000" dirty="0" smtClean="0"/>
-                <a:t>]</a:t>
-              </a:r>
-              <a:endParaRPr lang="en-US" sz="4000" dirty="0" smtClean="0"/>
+                <a:t>[ zeta picture here ] +  [ an example hazard function ]</a:t>
+              </a:r>
             </a:p>
             <a:p>
               <a:pPr marL="0" lvl="1" algn="just"/>
@@ -4295,13 +4256,8 @@
               </a:r>
               <a:r>
                 <a:rPr lang="en-US" sz="4000" dirty="0" smtClean="0"/>
-                <a:t>uncertainty</a:t>
-              </a:r>
-              <a:r>
-                <a:rPr lang="en-US" sz="4000" dirty="0" smtClean="0"/>
-                <a:t>. It is difficult to communicate this uncertainty in an intuitive way.</a:t>
-              </a:r>
-              <a:endParaRPr lang="en-US" sz="4000" dirty="0" smtClean="0"/>
+                <a:t>uncertainty. It is difficult to communicate this uncertainty in an intuitive way.</a:t>
+              </a:r>
             </a:p>
             <a:p>
               <a:pPr marL="514350" indent="-514350" algn="just">
@@ -4328,10 +4284,10 @@
         </p:nvGrpSpPr>
         <p:grpSpPr>
           <a:xfrm>
-            <a:off x="29184600" y="26289000"/>
-            <a:ext cx="14706600" cy="5715000"/>
-            <a:chOff x="26365200" y="26593800"/>
-            <a:chExt cx="15316200" cy="5715000"/>
+            <a:off x="29184600" y="26089898"/>
+            <a:ext cx="14706600" cy="6424642"/>
+            <a:chOff x="26365200" y="26394698"/>
+            <a:chExt cx="15316200" cy="6424642"/>
           </a:xfrm>
         </p:grpSpPr>
         <p:sp>
@@ -4375,8 +4331,8 @@
           </p:nvSpPr>
           <p:spPr>
             <a:xfrm>
-              <a:off x="26365200" y="26593800"/>
-              <a:ext cx="15316200" cy="5715000"/>
+              <a:off x="26365200" y="26394698"/>
+              <a:ext cx="15316200" cy="6424642"/>
             </a:xfrm>
             <a:prstGeom prst="roundRect">
               <a:avLst>
@@ -4420,7 +4376,7 @@
           <p:spPr>
             <a:xfrm>
               <a:off x="26593799" y="27802582"/>
-              <a:ext cx="14859000" cy="4031873"/>
+              <a:ext cx="14859000" cy="5016758"/>
             </a:xfrm>
             <a:prstGeom prst="rect">
               <a:avLst/>
@@ -4519,18 +4475,58 @@
               </a:r>
               <a:r>
                 <a:rPr lang="en-US" sz="3200" dirty="0"/>
-                <a:t>. (2016) 173: 3671. https://doi.org/10.1007/s00024-016-1357-</a:t>
+                <a:t>. (2016) 173: 3671. https://</a:t>
               </a:r>
               <a:r>
                 <a:rPr lang="en-US" sz="3200" dirty="0" smtClean="0"/>
-                <a:t>1</a:t>
+                <a:t>doi.org/10.1007/s00024-016-1357-1</a:t>
+              </a:r>
+              <a:r>
+                <a:rPr lang="en-US" sz="3200" dirty="0" smtClean="0"/>
+                <a:t/>
               </a:r>
               <a:br>
                 <a:rPr lang="en-US" sz="3200" dirty="0" smtClean="0"/>
               </a:br>
               <a:r>
                 <a:rPr lang="en-US" sz="3200" dirty="0" smtClean="0"/>
-                <a:t>[4] ADD SAMPLING CITATION</a:t>
+                <a:t>[4] </a:t>
+              </a:r>
+              <a:r>
+                <a:rPr lang="en-US" sz="3200" dirty="0" err="1"/>
+                <a:t>Hullman</a:t>
+              </a:r>
+              <a:r>
+                <a:rPr lang="en-US" sz="3200" dirty="0"/>
+                <a:t>, Jessica, et al. </a:t>
+              </a:r>
+              <a:r>
+                <a:rPr lang="en-US" sz="3200" i="1" dirty="0" smtClean="0"/>
+                <a:t>Imagining </a:t>
+              </a:r>
+              <a:r>
+                <a:rPr lang="en-US" sz="3200" i="1" dirty="0"/>
+                <a:t>Replications: Graphical Prediction &amp; Discrete Visualizations Improve Recall &amp; Estimation of Effect Uncertainty</a:t>
+              </a:r>
+              <a:r>
+                <a:rPr lang="en-US" sz="3200" i="1" dirty="0" smtClean="0"/>
+                <a:t>.</a:t>
+              </a:r>
+              <a:r>
+                <a:rPr lang="en-US" sz="3200" dirty="0" smtClean="0"/>
+                <a:t> </a:t>
+              </a:r>
+              <a:r>
+                <a:rPr lang="en-US" sz="3200" i="1" dirty="0"/>
+                <a:t>IEEE transactions on visualization and computer graphics</a:t>
+              </a:r>
+              <a:r>
+                <a:rPr lang="en-US" sz="3200" dirty="0"/>
+                <a:t> </a:t>
+              </a:r>
+              <a:r>
+                <a:rPr lang="en-US" sz="3200" dirty="0" smtClean="0"/>
+                <a:t>24.1: 446-456, 2018.</a:t>
               </a:r>
               <a:endParaRPr lang="en-US" sz="3200" dirty="0" smtClean="0"/>
             </a:p>
@@ -4620,15 +4616,7 @@
               </a:r>
               <a:r>
                 <a:rPr lang="en-US" sz="4000" dirty="0" smtClean="0"/>
-                <a:t>Showing</a:t>
-              </a:r>
-              <a:r>
-                <a:rPr lang="en-US" sz="4000" dirty="0" smtClean="0"/>
-                <a:t> </a:t>
-              </a:r>
-              <a:r>
-                <a:rPr lang="en-US" sz="4000" dirty="0" smtClean="0"/>
-                <a:t>specific </a:t>
+                <a:t>Showing specific </a:t>
               </a:r>
               <a:r>
                 <a:rPr lang="en-US" sz="4000" dirty="0"/>
@@ -4644,15 +4632,7 @@
               </a:r>
               <a:r>
                 <a:rPr lang="en-US" sz="4000" dirty="0" smtClean="0"/>
-                <a:t>comparisons between simulations, which is </a:t>
-              </a:r>
-              <a:r>
-                <a:rPr lang="en-US" sz="4000" dirty="0" smtClean="0"/>
-                <a:t>difficult with the flipbook</a:t>
-              </a:r>
-              <a:r>
-                <a:rPr lang="en-US" sz="4000" dirty="0" smtClean="0"/>
-                <a:t>.</a:t>
+                <a:t>comparisons between simulations, which is difficult with the flipbook.</a:t>
               </a:r>
             </a:p>
           </p:txBody>
@@ -4733,15 +4713,7 @@
               </a:r>
               <a:r>
                 <a:rPr lang="en-US" sz="4000" dirty="0" smtClean="0"/>
-                <a:t> </a:t>
-              </a:r>
-              <a:r>
-                <a:rPr lang="en-US" sz="4000" dirty="0" smtClean="0"/>
-                <a:t>the</a:t>
-              </a:r>
-              <a:r>
-                <a:rPr lang="en-US" sz="4000" dirty="0" smtClean="0"/>
-                <a:t> </a:t>
+                <a:t> the </a:t>
               </a:r>
               <a:r>
                 <a:rPr lang="en-US" sz="4000" dirty="0"/>
@@ -4749,39 +4721,7 @@
               </a:r>
               <a:r>
                 <a:rPr lang="en-US" sz="4000" dirty="0" smtClean="0"/>
-                <a:t>map</a:t>
-              </a:r>
-              <a:r>
-                <a:rPr lang="en-US" sz="4000" dirty="0" smtClean="0"/>
-                <a:t>, to the left in the dashboard. </a:t>
-              </a:r>
-              <a:r>
-                <a:rPr lang="en-US" sz="4000" dirty="0" smtClean="0"/>
-                <a:t>The aggregate map shows expected inundation level over all simulated </a:t>
-              </a:r>
-              <a:r>
-                <a:rPr lang="en-US" sz="4000" dirty="0" smtClean="0"/>
-                <a:t>events.</a:t>
-              </a:r>
-              <a:r>
-                <a:rPr lang="en-US" sz="4000" dirty="0" smtClean="0"/>
-                <a:t> </a:t>
-              </a:r>
-              <a:r>
-                <a:rPr lang="en-US" sz="4000" dirty="0" smtClean="0"/>
-                <a:t>Users </a:t>
-              </a:r>
-              <a:r>
-                <a:rPr lang="en-US" sz="4000" dirty="0" smtClean="0"/>
-                <a:t>can interact with</a:t>
-              </a:r>
-              <a:r>
-                <a:rPr lang="en-US" sz="4000" dirty="0" smtClean="0"/>
-                <a:t> this map </a:t>
-              </a:r>
-              <a:r>
-                <a:rPr lang="en-US" sz="4000" dirty="0" smtClean="0"/>
-                <a:t>by </a:t>
+                <a:t>map, to the left in the dashboard. The aggregate map shows expected inundation level over all simulated events. Users can interact with this map by </a:t>
               </a:r>
               <a:r>
                 <a:rPr lang="en-US" sz="4000" b="1" dirty="0" smtClean="0"/>
@@ -4805,11 +4745,7 @@
               </a:r>
               <a:r>
                 <a:rPr lang="en-US" sz="4000" dirty="0" smtClean="0"/>
-                <a:t> areas of interest. Selecting an area pans and centers the small multiples plots to to the same </a:t>
-              </a:r>
-              <a:r>
-                <a:rPr lang="en-US" sz="4000" dirty="0" smtClean="0"/>
-                <a:t>location.</a:t>
+                <a:t> areas of interest. Selecting an area pans and centers the small multiples plots to to the same location.</a:t>
               </a:r>
             </a:p>
             <a:p>
@@ -4818,19 +4754,7 @@
             <a:p>
               <a:r>
                 <a:rPr lang="en-US" sz="4000" dirty="0" smtClean="0"/>
-                <a:t>For the aggregate map and small multiples, users can also choose </a:t>
-              </a:r>
-              <a:r>
-                <a:rPr lang="en-US" sz="4000" dirty="0" smtClean="0"/>
-                <a:t>between two types of</a:t>
-              </a:r>
-              <a:r>
-                <a:rPr lang="en-US" sz="4000" dirty="0" smtClean="0"/>
-                <a:t> simulations: </a:t>
-              </a:r>
-              <a:r>
-                <a:rPr lang="en-US" sz="4000" dirty="0" smtClean="0"/>
-                <a:t>near-field (</a:t>
+                <a:t>For the aggregate map and small multiples, users can also choose between two types of simulations: near-field (</a:t>
               </a:r>
               <a:r>
                 <a:rPr lang="en-US" sz="4000" dirty="0" err="1" smtClean="0"/>
@@ -4838,11 +4762,7 @@
               </a:r>
               <a:r>
                 <a:rPr lang="en-US" sz="4000" dirty="0" smtClean="0"/>
-                <a:t>) and far-field (other </a:t>
-              </a:r>
-              <a:r>
-                <a:rPr lang="en-US" sz="4000" dirty="0" smtClean="0"/>
-                <a:t>origin) events, which vary in severity and likelihood.</a:t>
+                <a:t>) and far-field (other origin) events, which vary in severity and likelihood.</a:t>
               </a:r>
             </a:p>
           </p:txBody>
@@ -4894,10 +4814,10 @@
         </p:nvGrpSpPr>
         <p:grpSpPr>
           <a:xfrm>
-            <a:off x="14097000" y="21488400"/>
-            <a:ext cx="14935200" cy="1774686"/>
+            <a:off x="14043584" y="21260793"/>
+            <a:ext cx="9115447" cy="3999507"/>
             <a:chOff x="29641800" y="16992600"/>
-            <a:chExt cx="14935200" cy="1774686"/>
+            <a:chExt cx="9115447" cy="2070277"/>
           </a:xfrm>
         </p:grpSpPr>
         <p:sp>
@@ -4909,7 +4829,7 @@
           <p:spPr>
             <a:xfrm>
               <a:off x="29641800" y="16992600"/>
-              <a:ext cx="9115446" cy="923330"/>
+              <a:ext cx="9115447" cy="923330"/>
             </a:xfrm>
             <a:prstGeom prst="rect">
               <a:avLst/>
@@ -4946,8 +4866,8 @@
           </p:nvSpPr>
           <p:spPr>
             <a:xfrm>
-              <a:off x="29718000" y="18059400"/>
-              <a:ext cx="14859000" cy="707886"/>
+              <a:off x="29706133" y="17421929"/>
+              <a:ext cx="7948534" cy="1640948"/>
             </a:xfrm>
             <a:prstGeom prst="rect">
               <a:avLst/>
@@ -4963,7 +4883,7 @@
               <a:pPr algn="just"/>
               <a:r>
                 <a:rPr lang="en-US" sz="4000" dirty="0" smtClean="0"/>
-                <a:t>Image + short description</a:t>
+                <a:t>To mitigate user confusion about annual probabilities, we provide an interactive probability calculator allowing them to explore outcome likelihoods.</a:t>
               </a:r>
               <a:endParaRPr lang="en-US" sz="4000" dirty="0"/>
             </a:p>
@@ -4998,35 +4918,7 @@
             </a:r>
             <a:r>
               <a:rPr lang="en-US" sz="3200" dirty="0" smtClean="0"/>
-              <a:t>. The data we are </a:t>
-            </a:r>
-            <a:r>
-              <a:rPr lang="en-US" sz="3200" dirty="0" smtClean="0"/>
-              <a:t>visualizing</a:t>
-            </a:r>
-            <a:r>
-              <a:rPr lang="en-US" sz="3200" dirty="0" smtClean="0"/>
-              <a:t>:</a:t>
-            </a:r>
-            <a:r>
-              <a:rPr lang="en-US" sz="3200" dirty="0" smtClean="0"/>
-              <a:t> </a:t>
-            </a:r>
-            <a:r>
-              <a:rPr lang="en-US" sz="3200" dirty="0" smtClean="0"/>
-              <a:t>(a) inundation level </a:t>
-            </a:r>
-            <a:r>
-              <a:rPr lang="en-US" sz="3200" dirty="0" smtClean="0"/>
-              <a:t>zeta</a:t>
-            </a:r>
-            <a:r>
-              <a:rPr lang="en-US" sz="3200" dirty="0" smtClean="0"/>
-              <a:t> is the heigh</a:t>
-            </a:r>
-            <a:r>
-              <a:rPr lang="en-US" sz="3200" dirty="0" smtClean="0"/>
-              <a:t>t of water above normal, (</a:t>
+              <a:t>. The data we are visualizing: (a) inundation level zeta is the height of water above normal, (</a:t>
             </a:r>
             <a:r>
               <a:rPr lang="en-US" sz="3200" dirty="0" err="1" smtClean="0"/>
@@ -5134,7 +5026,7 @@
           <p:spPr>
             <a:xfrm>
               <a:off x="13944600" y="12344400"/>
-              <a:ext cx="8153400" cy="5632311"/>
+              <a:ext cx="8153400" cy="5016758"/>
             </a:xfrm>
             <a:prstGeom prst="rect">
               <a:avLst/>
@@ -5150,11 +5042,23 @@
               <a:pPr algn="just"/>
               <a:r>
                 <a:rPr lang="en-US" sz="4000" dirty="0" smtClean="0"/>
-                <a:t>The flipbook animates through </a:t>
+                <a:t>The flipbook animates through the full set of 13 simulations, showing each on the map. The flipbook was inspired by the sampling-based visualizations of uncertainty at the Interactive Data Lab at the University of Washington </a:t>
               </a:r>
               <a:r>
                 <a:rPr lang="en-US" sz="4000" dirty="0" smtClean="0"/>
-                <a:t>the full set of 13 simulations, showing each on the map. The flipbook was inspired by the sampling-based visualizations of uncertainty at the Interactive Data Lab at the University of Washington [CITE], and gives the viewer an introduction to the </a:t>
+                <a:t>[</a:t>
+              </a:r>
+              <a:r>
+                <a:rPr lang="en-US" sz="4000" dirty="0"/>
+                <a:t>4</a:t>
+              </a:r>
+              <a:r>
+                <a:rPr lang="en-US" sz="4000" dirty="0" smtClean="0"/>
+                <a:t>], </a:t>
+              </a:r>
+              <a:r>
+                <a:rPr lang="en-US" sz="4000" dirty="0" smtClean="0"/>
+                <a:t>and gives the viewer an introduction to the </a:t>
               </a:r>
               <a:r>
                 <a:rPr lang="en-US" sz="4000" b="1" dirty="0" smtClean="0"/>
@@ -5162,8 +5066,13 @@
               </a:r>
               <a:r>
                 <a:rPr lang="en-US" sz="4000" dirty="0" smtClean="0"/>
-                <a:t>inherent in the data (uncertainty source #2). </a:t>
-              </a:r>
+                <a:t>inherent in the data </a:t>
+              </a:r>
+              <a:r>
+                <a:rPr lang="en-US" sz="4000" dirty="0" smtClean="0"/>
+                <a:t>. </a:t>
+              </a:r>
+              <a:endParaRPr lang="en-US" sz="4000" dirty="0" smtClean="0"/>
             </a:p>
           </p:txBody>
         </p:sp>
@@ -5250,11 +5159,7 @@
               </a:r>
               <a:r>
                 <a:rPr lang="en-US" sz="3200" dirty="0" smtClean="0"/>
-                <a:t> 2</a:t>
-              </a:r>
-              <a:r>
-                <a:rPr lang="en-US" sz="3200" dirty="0" smtClean="0"/>
-                <a:t>. A single flipbook slide.</a:t>
+                <a:t> 2. A single flipbook slide.</a:t>
               </a:r>
               <a:endParaRPr lang="en-US" sz="3200" dirty="0"/>
             </a:p>
@@ -5277,8 +5182,8 @@
         </p:blipFill>
         <p:spPr>
           <a:xfrm>
-            <a:off x="22174200" y="22631400"/>
-            <a:ext cx="5854700" cy="1549400"/>
+            <a:off x="22098000" y="22606576"/>
+            <a:ext cx="6910466" cy="1828800"/>
           </a:xfrm>
           <a:prstGeom prst="rect">
             <a:avLst/>
@@ -5288,7 +5193,7 @@
     </p:spTree>
     <p:extLst>
       <p:ext uri="{BB962C8B-B14F-4D97-AF65-F5344CB8AC3E}">
-        <p14:creationId xmlns:p14="http://schemas.microsoft.com/office/powerpoint/2010/main" xmlns:p="http://schemas.openxmlformats.org/presentationml/2006/main" xmlns:r="http://schemas.openxmlformats.org/officeDocument/2006/relationships" xmlns:a="http://schemas.openxmlformats.org/drawingml/2006/main" xmlns="" val="11750383"/>
+        <p14:creationId xmlns:p14="http://schemas.microsoft.com/office/powerpoint/2010/main" val="11750383"/>
       </p:ext>
     </p:extLst>
   </p:cSld>

</xml_diff>

<commit_message>
Add zeta to poster, edit typo in that figure in index.html
</commit_message>
<xml_diff>
--- a/poster/poster.pptx
+++ b/poster/poster.pptx
@@ -303,7 +303,7 @@
             <a:fld id="{0809B32C-EADE-4737-9FCF-CC2867D24216}" type="datetimeFigureOut">
               <a:rPr lang="en-US" altLang="ja-JP" smtClean="0"/>
               <a:pPr/>
-              <a:t>5/29/2018</a:t>
+              <a:t>5/29/18</a:t>
             </a:fld>
             <a:endParaRPr lang="en-US"/>
           </a:p>
@@ -473,7 +473,7 @@
             <a:fld id="{0809B32C-EADE-4737-9FCF-CC2867D24216}" type="datetimeFigureOut">
               <a:rPr lang="en-US" altLang="ja-JP" smtClean="0"/>
               <a:pPr/>
-              <a:t>5/29/2018</a:t>
+              <a:t>5/29/18</a:t>
             </a:fld>
             <a:endParaRPr lang="en-US"/>
           </a:p>
@@ -653,7 +653,7 @@
             <a:fld id="{0809B32C-EADE-4737-9FCF-CC2867D24216}" type="datetimeFigureOut">
               <a:rPr lang="en-US" altLang="ja-JP" smtClean="0"/>
               <a:pPr/>
-              <a:t>5/29/2018</a:t>
+              <a:t>5/29/18</a:t>
             </a:fld>
             <a:endParaRPr lang="en-US"/>
           </a:p>
@@ -823,7 +823,7 @@
             <a:fld id="{0809B32C-EADE-4737-9FCF-CC2867D24216}" type="datetimeFigureOut">
               <a:rPr lang="en-US" altLang="ja-JP" smtClean="0"/>
               <a:pPr/>
-              <a:t>5/29/2018</a:t>
+              <a:t>5/29/18</a:t>
             </a:fld>
             <a:endParaRPr lang="en-US"/>
           </a:p>
@@ -1070,7 +1070,7 @@
             <a:fld id="{0809B32C-EADE-4737-9FCF-CC2867D24216}" type="datetimeFigureOut">
               <a:rPr lang="en-US" altLang="ja-JP" smtClean="0"/>
               <a:pPr/>
-              <a:t>5/29/2018</a:t>
+              <a:t>5/29/18</a:t>
             </a:fld>
             <a:endParaRPr lang="en-US"/>
           </a:p>
@@ -1357,7 +1357,7 @@
             <a:fld id="{0809B32C-EADE-4737-9FCF-CC2867D24216}" type="datetimeFigureOut">
               <a:rPr lang="en-US" altLang="ja-JP" smtClean="0"/>
               <a:pPr/>
-              <a:t>5/29/2018</a:t>
+              <a:t>5/29/18</a:t>
             </a:fld>
             <a:endParaRPr lang="en-US"/>
           </a:p>
@@ -1783,7 +1783,7 @@
             <a:fld id="{0809B32C-EADE-4737-9FCF-CC2867D24216}" type="datetimeFigureOut">
               <a:rPr lang="en-US" altLang="ja-JP" smtClean="0"/>
               <a:pPr/>
-              <a:t>5/29/2018</a:t>
+              <a:t>5/29/18</a:t>
             </a:fld>
             <a:endParaRPr lang="en-US"/>
           </a:p>
@@ -1902,7 +1902,7 @@
             <a:fld id="{0809B32C-EADE-4737-9FCF-CC2867D24216}" type="datetimeFigureOut">
               <a:rPr lang="en-US" altLang="ja-JP" smtClean="0"/>
               <a:pPr/>
-              <a:t>5/29/2018</a:t>
+              <a:t>5/29/18</a:t>
             </a:fld>
             <a:endParaRPr lang="en-US"/>
           </a:p>
@@ -1999,7 +1999,7 @@
             <a:fld id="{0809B32C-EADE-4737-9FCF-CC2867D24216}" type="datetimeFigureOut">
               <a:rPr lang="en-US" altLang="ja-JP" smtClean="0"/>
               <a:pPr/>
-              <a:t>5/29/2018</a:t>
+              <a:t>5/29/18</a:t>
             </a:fld>
             <a:endParaRPr lang="en-US"/>
           </a:p>
@@ -2276,7 +2276,7 @@
             <a:fld id="{0809B32C-EADE-4737-9FCF-CC2867D24216}" type="datetimeFigureOut">
               <a:rPr lang="en-US" altLang="ja-JP" smtClean="0"/>
               <a:pPr/>
-              <a:t>5/29/2018</a:t>
+              <a:t>5/29/18</a:t>
             </a:fld>
             <a:endParaRPr lang="en-US"/>
           </a:p>
@@ -2530,7 +2530,7 @@
             <a:fld id="{0809B32C-EADE-4737-9FCF-CC2867D24216}" type="datetimeFigureOut">
               <a:rPr lang="en-US" altLang="ja-JP" smtClean="0"/>
               <a:pPr/>
-              <a:t>5/29/2018</a:t>
+              <a:t>5/29/18</a:t>
             </a:fld>
             <a:endParaRPr lang="en-US"/>
           </a:p>
@@ -2743,7 +2743,7 @@
             <a:fld id="{0809B32C-EADE-4737-9FCF-CC2867D24216}" type="datetimeFigureOut">
               <a:rPr lang="en-US" altLang="ja-JP" smtClean="0"/>
               <a:pPr/>
-              <a:t>5/29/2018</a:t>
+              <a:t>5/29/18</a:t>
             </a:fld>
             <a:endParaRPr lang="en-US"/>
           </a:p>
@@ -3193,29 +3193,8 @@
             <a:p>
               <a:r>
                 <a:rPr lang="en-US" sz="3200" dirty="0"/>
-                <a:t>Figure</a:t>
-              </a:r>
-              <a:r>
-                <a:rPr lang="en-US" sz="3200" dirty="0" smtClean="0"/>
-                <a:t> 3. </a:t>
-              </a:r>
-              <a:r>
-                <a:rPr lang="en-US" sz="3200" dirty="0"/>
-                <a:t>The interactive</a:t>
-              </a:r>
-              <a:r>
-                <a:rPr lang="en-US" sz="3200" dirty="0" smtClean="0"/>
-                <a:t> aggregate map </a:t>
-              </a:r>
-              <a:r>
-                <a:rPr lang="en-US" sz="3200" dirty="0"/>
-                <a:t>and small multiples. Color encodes inundation </a:t>
-              </a:r>
-              <a:r>
-                <a:rPr lang="en-US" sz="3200" dirty="0" smtClean="0"/>
-                <a:t>depth, from shallow flooding (green) to deep flooding (purple).</a:t>
-              </a:r>
-              <a:endParaRPr lang="en-US" sz="3200" dirty="0"/>
+                <a:t>Figure 3. The interactive aggregate map and small multiples. Color encodes inundation depth, from shallow flooding (green) to deep flooding (purple).</a:t>
+              </a:r>
             </a:p>
           </p:txBody>
         </p:sp>
@@ -3333,13 +3312,8 @@
             <a:pPr algn="ctr"/>
             <a:r>
               <a:rPr lang="en-US" sz="9000" dirty="0"/>
-              <a:t>Tsunami Inundation </a:t>
-            </a:r>
-            <a:r>
-              <a:rPr lang="en-US" sz="9000" dirty="0" smtClean="0"/>
-              <a:t>Maps: Visualizing Uncertainty for a General Audience</a:t>
-            </a:r>
-            <a:endParaRPr lang="en-US" sz="9000" dirty="0"/>
+              <a:t>Tsunami Inundation Maps: Visualizing Uncertainty for a General Audience</a:t>
+            </a:r>
           </a:p>
         </p:txBody>
       </p:sp>
@@ -3456,15 +3430,7 @@
               <a:pPr algn="just"/>
               <a:r>
                 <a:rPr lang="en-US" sz="4000" dirty="0"/>
-                <a:t>To make the visualizations more </a:t>
-              </a:r>
-              <a:r>
-                <a:rPr lang="en-US" sz="4000" dirty="0" smtClean="0"/>
-                <a:t>digestible, </a:t>
-              </a:r>
-              <a:r>
-                <a:rPr lang="en-US" sz="4000" dirty="0"/>
-                <a:t>we embed them within a larger narrative structure. In particular, we adopt the “magazine style” approach of </a:t>
+                <a:t>To make the visualizations more digestible, we embed them within a larger narrative structure. In particular, we adopt the “magazine style” approach of </a:t>
               </a:r>
               <a:r>
                 <a:rPr lang="en-US" sz="4000" dirty="0" err="1"/>
@@ -3480,19 +3446,7 @@
               </a:r>
               <a:r>
                 <a:rPr lang="en-US" sz="4000" dirty="0"/>
-                <a:t> [1]</a:t>
-              </a:r>
-              <a:r>
-                <a:rPr lang="en-US" sz="4000" dirty="0" smtClean="0"/>
-                <a:t>. We </a:t>
-              </a:r>
-              <a:r>
-                <a:rPr lang="en-US" sz="4000" dirty="0"/>
-                <a:t>begin with an anecdote that emphasizes the importance of probabilistic </a:t>
-              </a:r>
-              <a:r>
-                <a:rPr lang="en-US" sz="4000" dirty="0" smtClean="0"/>
-                <a:t>estimates, and continue to provide details and context for the visualizations throughout.</a:t>
+                <a:t> [1]. We begin with an anecdote that emphasizes the importance of probabilistic estimates, and continue to provide details and context for the visualizations throughout.</a:t>
               </a:r>
             </a:p>
           </p:txBody>
@@ -3556,13 +3510,8 @@
             <a:pPr algn="ctr"/>
             <a:r>
               <a:rPr lang="en-US" sz="4400" dirty="0"/>
-              <a:t>Brian de Silva,</a:t>
-            </a:r>
-            <a:r>
-              <a:rPr lang="en-US" sz="4400" dirty="0" smtClean="0"/>
-              <a:t> Abe Engle, Benjamin Liu, and Kellie MacPhee</a:t>
-            </a:r>
-            <a:endParaRPr lang="en-US" sz="4400" dirty="0"/>
+              <a:t>Brian de Silva, Abe Engle, Benjamin Liu, and Kellie MacPhee</a:t>
+            </a:r>
           </a:p>
         </p:txBody>
       </p:sp>
@@ -3637,7 +3586,7 @@
             <a:p>
               <a:pPr marL="571500" indent="-571500"/>
               <a:r>
-                <a:rPr lang="en-US" sz="4000" dirty="0" smtClean="0"/>
+                <a:rPr lang="en-US" sz="4000" dirty="0"/>
                 <a:t>Extending beyond the project as it is, we hope to:</a:t>
               </a:r>
             </a:p>
@@ -3647,7 +3596,7 @@
                 <a:buChar char="•"/>
               </a:pPr>
               <a:r>
-                <a:rPr lang="en-US" sz="4000" dirty="0" smtClean="0"/>
+                <a:rPr lang="en-US" sz="4000" dirty="0"/>
                 <a:t>Cover a greater geographic region, including additional cities</a:t>
               </a:r>
             </a:p>
@@ -3657,12 +3606,8 @@
                 <a:buChar char="•"/>
               </a:pPr>
               <a:r>
-                <a:rPr lang="en-US" sz="4000" dirty="0" smtClean="0"/>
-                <a:t>Expand to a larger </a:t>
-              </a:r>
-              <a:r>
                 <a:rPr lang="en-US" sz="4000" dirty="0"/>
-                <a:t>number of simulations</a:t>
+                <a:t>Expand to a larger number of simulations</a:t>
               </a:r>
             </a:p>
             <a:p>
@@ -3672,17 +3617,13 @@
               </a:pPr>
               <a:r>
                 <a:rPr lang="en-US" sz="4000" dirty="0"/>
-                <a:t>Alternate expressions of </a:t>
-              </a:r>
-              <a:r>
-                <a:rPr lang="en-US" sz="4000" dirty="0" smtClean="0"/>
-                <a:t>uncertainty</a:t>
+                <a:t>Alternate expressions of uncertainty</a:t>
               </a:r>
             </a:p>
             <a:p>
               <a:pPr marL="571500" indent="-571500"/>
               <a:r>
-                <a:rPr lang="en-US" sz="4000" dirty="0" smtClean="0"/>
+                <a:rPr lang="en-US" sz="4000" dirty="0"/>
                 <a:t>In addition, it would be interesting to evaluate the usefulness of the interactive probability explorer in a study with human subjects.</a:t>
               </a:r>
             </a:p>
@@ -3843,18 +3784,13 @@
             <a:lstStyle/>
             <a:p>
               <a:r>
-                <a:rPr lang="en-US" sz="7200" b="1" dirty="0" smtClean="0">
+                <a:rPr lang="en-US" sz="7200" b="1" dirty="0">
                   <a:solidFill>
                     <a:srgbClr val="33006F"/>
                   </a:solidFill>
                 </a:rPr>
                 <a:t>Goals</a:t>
               </a:r>
-              <a:endParaRPr lang="en-US" sz="7200" b="1" dirty="0">
-                <a:solidFill>
-                  <a:srgbClr val="33006F"/>
-                </a:solidFill>
-              </a:endParaRPr>
             </a:p>
           </p:txBody>
         </p:sp>
@@ -3867,7 +3803,7 @@
           <p:spPr>
             <a:xfrm>
               <a:off x="457200" y="5029200"/>
-              <a:ext cx="12649200" cy="13172837"/>
+              <a:ext cx="12649200" cy="13872133"/>
             </a:xfrm>
             <a:prstGeom prst="rect">
               <a:avLst/>
@@ -3882,23 +3818,7 @@
             <a:p>
               <a:r>
                 <a:rPr lang="en-US" sz="4000" dirty="0"/>
-                <a:t>Coastal cities along the</a:t>
-              </a:r>
-              <a:r>
-                <a:rPr lang="en-US" sz="4000" dirty="0" smtClean="0"/>
-                <a:t> West </a:t>
-              </a:r>
-              <a:r>
-                <a:rPr lang="en-US" sz="4000" dirty="0"/>
-                <a:t>C</a:t>
-              </a:r>
-              <a:r>
-                <a:rPr lang="en-US" sz="4000" dirty="0" smtClean="0"/>
-                <a:t>oast </a:t>
-              </a:r>
-              <a:r>
-                <a:rPr lang="en-US" sz="4000" dirty="0"/>
-                <a:t>are susceptible to damage caused by tsunamis. In order to improve tsunami preparedness, researchers use </a:t>
+                <a:t>Coastal cities along the West Coast are susceptible to damage caused by tsunamis. In order to improve tsunami preparedness, researchers use </a:t>
               </a:r>
               <a:r>
                 <a:rPr lang="en-US" sz="4000" b="1" dirty="0"/>
@@ -3906,35 +3826,7 @@
               </a:r>
               <a:r>
                 <a:rPr lang="en-US" sz="4000" dirty="0"/>
-                <a:t> to predict the impact of</a:t>
-              </a:r>
-              <a:r>
-                <a:rPr lang="en-US" sz="4000" dirty="0" smtClean="0"/>
-                <a:t> possible tsunamis </a:t>
-              </a:r>
-              <a:r>
-                <a:rPr lang="en-US" sz="4000" dirty="0"/>
-                <a:t>caused by different seismological events.</a:t>
-              </a:r>
-              <a:r>
-                <a:rPr lang="en-US" sz="4000" dirty="0" smtClean="0"/>
-                <a:t> Researchers </a:t>
-              </a:r>
-              <a:r>
-                <a:rPr lang="en-US" sz="4000" dirty="0"/>
-                <a:t>at the University of Washington </a:t>
-              </a:r>
-              <a:r>
-                <a:rPr lang="en-US" sz="4000" dirty="0" smtClean="0"/>
-                <a:t>model </a:t>
-              </a:r>
-              <a:r>
-                <a:rPr lang="en-US" sz="4000" dirty="0"/>
-                <a:t>the impact of tsunamis </a:t>
-              </a:r>
-              <a:r>
-                <a:rPr lang="en-US" sz="4000" dirty="0" smtClean="0"/>
-                <a:t>on many cities; for the scope of this project, we focus on </a:t>
+                <a:t> to predict the impact of possible tsunamis caused by different seismological events. Researchers at the University of Washington model the impact of tsunamis on many cities; for the scope of this project, we focus on </a:t>
               </a:r>
               <a:r>
                 <a:rPr lang="en-US" sz="4000" b="1" dirty="0"/>
@@ -3942,32 +3834,16 @@
               </a:r>
               <a:r>
                 <a:rPr lang="en-US" sz="4000" dirty="0"/>
-                <a:t>, a coastal city in California which has a history of extreme damage from tsunamis.</a:t>
-              </a:r>
-              <a:r>
-                <a:rPr lang="en-US" sz="4000" dirty="0" smtClean="0"/>
-                <a:t> </a:t>
+                <a:t>, a coastal city in California which has a history of extreme damage from tsunamis. </a:t>
               </a:r>
             </a:p>
             <a:p>
-              <a:endParaRPr lang="en-US" sz="4000" dirty="0" smtClean="0"/>
+              <a:endParaRPr lang="en-US" sz="4000" dirty="0"/>
             </a:p>
             <a:p>
               <a:r>
-                <a:rPr lang="en-US" sz="4000" dirty="0" smtClean="0"/>
-                <a:t>By </a:t>
-              </a:r>
-              <a:r>
                 <a:rPr lang="en-US" sz="4000" dirty="0"/>
-                <a:t>estimating the probability of occurrence of each </a:t>
-              </a:r>
-              <a:r>
-                <a:rPr lang="en-US" sz="4000" dirty="0" smtClean="0"/>
-                <a:t>simulated </a:t>
-              </a:r>
-              <a:r>
-                <a:rPr lang="en-US" sz="4000" dirty="0"/>
-                <a:t>tsunami, the annual probability of exceeding a given level of inundation (flooding) can be estimated for every point in the landscape, giving rise to a </a:t>
+                <a:t>By estimating the probability of occurrence of each simulated tsunami, the annual probability of exceeding a given level of inundation (flooding) can be estimated for every point in the landscape, giving rise to a </a:t>
               </a:r>
               <a:r>
                 <a:rPr lang="en-US" sz="4000" b="1" dirty="0"/>
@@ -4036,19 +3912,11 @@
               </a:r>
               <a:r>
                 <a:rPr lang="en-US" sz="4000" i="1" dirty="0"/>
-                <a:t>A</a:t>
+                <a:t>E</a:t>
               </a:r>
               <a:r>
                 <a:rPr lang="en-US" sz="4000" dirty="0"/>
-                <a:t>]</a:t>
-              </a:r>
-              <a:r>
-                <a:rPr lang="en-US" sz="4000" dirty="0" smtClean="0"/>
-                <a:t> Estimation </a:t>
-              </a:r>
-              <a:r>
-                <a:rPr lang="en-US" sz="4000" dirty="0"/>
-                <a:t>of the annual likelihood of seismic events</a:t>
+                <a:t>] Estimation of annual likelihood of seismic events;</a:t>
               </a:r>
             </a:p>
             <a:p>
@@ -4066,27 +3934,7 @@
               </a:r>
               <a:r>
                 <a:rPr lang="en-US" sz="4000" dirty="0"/>
-                <a:t>]</a:t>
-              </a:r>
-              <a:r>
-                <a:rPr lang="en-US" sz="4000" dirty="0" smtClean="0"/>
-                <a:t> Variance </a:t>
-              </a:r>
-              <a:r>
-                <a:rPr lang="en-US" sz="4000" dirty="0"/>
-                <a:t>due to </a:t>
-              </a:r>
-              <a:r>
-                <a:rPr lang="en-US" sz="4000" dirty="0" smtClean="0"/>
-                <a:t>the </a:t>
-              </a:r>
-              <a:r>
-                <a:rPr lang="en-US" sz="4000" dirty="0"/>
-                <a:t>small number of </a:t>
-              </a:r>
-              <a:r>
-                <a:rPr lang="en-US" sz="4000" dirty="0" smtClean="0"/>
-                <a:t>events</a:t>
+                <a:t>] Variability of outcomes over a small number of events;</a:t>
               </a:r>
             </a:p>
             <a:p>
@@ -4095,24 +3943,20 @@
                 <a:buAutoNum type="arabicPeriod"/>
               </a:pPr>
               <a:r>
+                <a:rPr lang="en-US" sz="4000"/>
+                <a:t>[</a:t>
+              </a:r>
+              <a:r>
+                <a:rPr lang="en-US" sz="4000" i="1" dirty="0"/>
+                <a:t>E</a:t>
+              </a:r>
+              <a:r>
+                <a:rPr lang="en-US" sz="4000"/>
+                <a:t>] </a:t>
+              </a:r>
+              <a:r>
                 <a:rPr lang="en-US" sz="4000" dirty="0"/>
-                <a:t>[</a:t>
-              </a:r>
-              <a:r>
-                <a:rPr lang="en-US" sz="4000" i="1" dirty="0"/>
-                <a:t>A</a:t>
-              </a:r>
-              <a:r>
-                <a:rPr lang="en-US" sz="4000" dirty="0"/>
-                <a:t>]</a:t>
-              </a:r>
-              <a:r>
-                <a:rPr lang="en-US" sz="4000" dirty="0" smtClean="0"/>
-                <a:t> Error </a:t>
-              </a:r>
-              <a:r>
-                <a:rPr lang="en-US" sz="4000" dirty="0"/>
-                <a:t>due to the assumption that the seismic events are independent</a:t>
+                <a:t>Error due to the assumption that the seismic events are independent;</a:t>
               </a:r>
             </a:p>
             <a:p>
@@ -4130,27 +3974,7 @@
               </a:r>
               <a:r>
                 <a:rPr lang="en-US" sz="4000" dirty="0"/>
-                <a:t>]</a:t>
-              </a:r>
-              <a:r>
-                <a:rPr lang="en-US" sz="4000" dirty="0" smtClean="0"/>
-                <a:t> Error </a:t>
-              </a:r>
-              <a:r>
-                <a:rPr lang="en-US" sz="4000" dirty="0"/>
-                <a:t>in the numerical </a:t>
-              </a:r>
-              <a:r>
-                <a:rPr lang="en-US" sz="4000" dirty="0" smtClean="0"/>
-                <a:t>simulations </a:t>
-              </a:r>
-              <a:r>
-                <a:rPr lang="en-US" sz="4000" dirty="0"/>
-                <a:t>of </a:t>
-              </a:r>
-              <a:r>
-                <a:rPr lang="en-US" sz="4000" dirty="0" smtClean="0"/>
-                <a:t>tsunamis.</a:t>
+                <a:t>] Error in the numerical simulations of tsunamis.</a:t>
               </a:r>
             </a:p>
           </p:txBody>
@@ -4179,70 +4003,62 @@
             <a:p>
               <a:pPr marL="0" lvl="1" algn="just"/>
               <a:r>
-                <a:rPr lang="en-US" sz="4000" dirty="0" smtClean="0"/>
+                <a:rPr lang="en-US" sz="4000" dirty="0"/>
                 <a:t>The hazard maps correspond to complicated </a:t>
               </a:r>
               <a:r>
-                <a:rPr lang="en-US" sz="4000" b="1" dirty="0" smtClean="0"/>
+                <a:rPr lang="en-US" sz="4000" b="1" dirty="0"/>
                 <a:t>hazard functions </a:t>
               </a:r>
               <a:r>
-                <a:rPr lang="en-US" sz="4000" dirty="0" smtClean="0"/>
+                <a:rPr lang="en-US" sz="4000" dirty="0"/>
                 <a:t>at every point on the map, which describe the probability of inundation at every depth. Properly interpreting this map can be difficult for people without a technical background.</a:t>
               </a:r>
             </a:p>
             <a:p>
               <a:pPr marL="0" lvl="1" algn="just"/>
-              <a:endParaRPr lang="en-US" sz="4000" dirty="0" smtClean="0"/>
+              <a:endParaRPr lang="en-US" sz="4000" dirty="0"/>
             </a:p>
             <a:p>
               <a:pPr marL="0" lvl="1" algn="just"/>
-              <a:endParaRPr lang="en-US" sz="4000" dirty="0" smtClean="0"/>
+              <a:endParaRPr lang="en-US" sz="4000" dirty="0"/>
             </a:p>
             <a:p>
               <a:pPr marL="0" lvl="1" algn="just"/>
-              <a:endParaRPr lang="en-US" sz="4000" dirty="0" smtClean="0"/>
+              <a:endParaRPr lang="en-US" sz="4000" dirty="0"/>
             </a:p>
             <a:p>
               <a:pPr marL="0" lvl="1" algn="just"/>
               <a:r>
-                <a:rPr lang="en-US" sz="4000" dirty="0" smtClean="0"/>
-                <a:t>[ zeta picture here ] +  [ an example hazard function ]</a:t>
+                <a:rPr lang="en-US" sz="4000" dirty="0"/>
+                <a:t>[ an example hazard function ]</a:t>
               </a:r>
             </a:p>
             <a:p>
               <a:pPr marL="0" lvl="1" algn="just"/>
-              <a:endParaRPr lang="en-US" sz="4000" dirty="0" smtClean="0"/>
+              <a:endParaRPr lang="en-US" sz="4000" dirty="0"/>
             </a:p>
             <a:p>
               <a:pPr marL="0" lvl="1" algn="just"/>
-              <a:endParaRPr lang="en-US" sz="4000" dirty="0" smtClean="0"/>
+              <a:endParaRPr lang="en-US" sz="4000" dirty="0"/>
             </a:p>
             <a:p>
               <a:pPr marL="0" lvl="1" algn="just"/>
-              <a:endParaRPr lang="en-US" sz="4000" dirty="0" smtClean="0"/>
+              <a:endParaRPr lang="en-US" sz="4000" dirty="0"/>
             </a:p>
             <a:p>
               <a:pPr marL="0" lvl="1" algn="just"/>
-              <a:endParaRPr lang="en-US" sz="4000" dirty="0" smtClean="0"/>
+              <a:endParaRPr lang="en-US" sz="4000" dirty="0"/>
             </a:p>
             <a:p>
               <a:pPr algn="just"/>
-              <a:endParaRPr lang="en-US" sz="4000" dirty="0" smtClean="0"/>
+              <a:endParaRPr lang="en-US" sz="4000" dirty="0"/>
             </a:p>
             <a:p>
               <a:pPr algn="just"/>
               <a:r>
-                <a:rPr lang="en-US" sz="4000" dirty="0" smtClean="0"/>
-                <a:t>Our </a:t>
-              </a:r>
-              <a:r>
                 <a:rPr lang="en-US" sz="4000" dirty="0"/>
-                <a:t>project seeks to address the following</a:t>
-              </a:r>
-              <a:r>
-                <a:rPr lang="en-US" sz="4000" dirty="0" smtClean="0"/>
-                <a:t> concerns:</a:t>
+                <a:t>Our project seeks to address the following concerns:</a:t>
               </a:r>
             </a:p>
             <a:p>
@@ -4252,11 +4068,7 @@
               </a:pPr>
               <a:r>
                 <a:rPr lang="en-US" sz="4000" dirty="0"/>
-                <a:t>Hazard maps and the data used to produce them contain multiple sources of </a:t>
-              </a:r>
-              <a:r>
-                <a:rPr lang="en-US" sz="4000" dirty="0" smtClean="0"/>
-                <a:t>uncertainty. It is difficult to communicate this uncertainty in an intuitive way.</a:t>
+                <a:t>Hazard maps and the data used to produce them contain multiple sources of uncertainty. It is difficult to communicate this uncertainty in an intuitive way.</a:t>
               </a:r>
             </a:p>
             <a:p>
@@ -4266,11 +4078,7 @@
               </a:pPr>
               <a:r>
                 <a:rPr lang="en-US" sz="4000" dirty="0"/>
-                <a:t>Hazard maps are inherently complex and nuanced and can therefore be difficult for non-experts to decipher</a:t>
-              </a:r>
-              <a:r>
-                <a:rPr lang="en-US" sz="4000" dirty="0" smtClean="0"/>
-                <a:t>.</a:t>
+                <a:t>Hazard maps are inherently complex and nuanced and can therefore be difficult for non-experts to decipher.</a:t>
               </a:r>
             </a:p>
           </p:txBody>
@@ -4475,21 +4283,13 @@
               </a:r>
               <a:r>
                 <a:rPr lang="en-US" sz="3200" dirty="0"/>
-                <a:t>. (2016) 173: 3671. https://</a:t>
-              </a:r>
-              <a:r>
-                <a:rPr lang="en-US" sz="3200" dirty="0" smtClean="0"/>
-                <a:t>doi.org/10.1007/s00024-016-1357-1</a:t>
-              </a:r>
-              <a:r>
-                <a:rPr lang="en-US" sz="3200" dirty="0" smtClean="0"/>
-                <a:t/>
+                <a:t>. (2016) 173: 3671. https://doi.org/10.1007/s00024-016-1357-1</a:t>
               </a:r>
               <a:br>
-                <a:rPr lang="en-US" sz="3200" dirty="0" smtClean="0"/>
+                <a:rPr lang="en-US" sz="3200" dirty="0"/>
               </a:br>
               <a:r>
-                <a:rPr lang="en-US" sz="3200" dirty="0" smtClean="0"/>
+                <a:rPr lang="en-US" sz="3200" dirty="0"/>
                 <a:t>[4] </a:t>
               </a:r>
               <a:r>
@@ -4501,19 +4301,11 @@
                 <a:t>, Jessica, et al. </a:t>
               </a:r>
               <a:r>
-                <a:rPr lang="en-US" sz="3200" i="1" dirty="0" smtClean="0"/>
-                <a:t>Imagining </a:t>
-              </a:r>
-              <a:r>
                 <a:rPr lang="en-US" sz="3200" i="1" dirty="0"/>
-                <a:t>Replications: Graphical Prediction &amp; Discrete Visualizations Improve Recall &amp; Estimation of Effect Uncertainty</a:t>
-              </a:r>
-              <a:r>
-                <a:rPr lang="en-US" sz="3200" i="1" dirty="0" smtClean="0"/>
-                <a:t>.</a:t>
-              </a:r>
-              <a:r>
-                <a:rPr lang="en-US" sz="3200" dirty="0" smtClean="0"/>
+                <a:t>Imagining Replications: Graphical Prediction &amp; Discrete Visualizations Improve Recall &amp; Estimation of Effect Uncertainty.</a:t>
+              </a:r>
+              <a:r>
+                <a:rPr lang="en-US" sz="3200" dirty="0"/>
                 <a:t> </a:t>
               </a:r>
               <a:r>
@@ -4522,13 +4314,8 @@
               </a:r>
               <a:r>
                 <a:rPr lang="en-US" sz="3200" dirty="0"/>
-                <a:t> </a:t>
-              </a:r>
-              <a:r>
-                <a:rPr lang="en-US" sz="3200" dirty="0" smtClean="0"/>
-                <a:t>24.1: 446-456, 2018.</a:t>
-              </a:r>
-              <a:endParaRPr lang="en-US" sz="3200" dirty="0" smtClean="0"/>
+                <a:t> 24.1: 446-456, 2018.</a:t>
+              </a:r>
             </a:p>
           </p:txBody>
         </p:sp>
@@ -4604,35 +4391,7 @@
             <a:p>
               <a:r>
                 <a:rPr lang="en-US" sz="4000" dirty="0"/>
-                <a:t>We use small multiples </a:t>
-              </a:r>
-              <a:r>
-                <a:rPr lang="en-US" sz="4000" dirty="0" smtClean="0"/>
-                <a:t>to simultaneously convey a broad range of possible outcomes </a:t>
-              </a:r>
-              <a:r>
-                <a:rPr lang="en-US" sz="4000" dirty="0"/>
-                <a:t>in the event of a tsunami. </a:t>
-              </a:r>
-              <a:r>
-                <a:rPr lang="en-US" sz="4000" dirty="0" smtClean="0"/>
-                <a:t>Showing specific </a:t>
-              </a:r>
-              <a:r>
-                <a:rPr lang="en-US" sz="4000" dirty="0"/>
-                <a:t>events highlights the variety of possible </a:t>
-              </a:r>
-              <a:r>
-                <a:rPr lang="en-US" sz="4000" dirty="0" smtClean="0"/>
-                <a:t>outcomes, ensuring that extreme events are not lost in the aggregate map. The small multiples also allow </a:t>
-              </a:r>
-              <a:r>
-                <a:rPr lang="en-US" sz="4000" dirty="0"/>
-                <a:t>the reader to make direct </a:t>
-              </a:r>
-              <a:r>
-                <a:rPr lang="en-US" sz="4000" dirty="0" smtClean="0"/>
-                <a:t>comparisons between simulations, which is difficult with the flipbook.</a:t>
+                <a:t>We use small multiples to simultaneously convey a broad range of possible outcomes in the event of a tsunami. Showing specific events highlights the variety of possible outcomes, ensuring that extreme events are not lost in the aggregate map. The small multiples also allow the reader to make direct comparisons between simulations, which is difficult with the flipbook.</a:t>
               </a:r>
             </a:p>
           </p:txBody>
@@ -4709,59 +4468,47 @@
             <a:p>
               <a:r>
                 <a:rPr lang="en-US" sz="4000" dirty="0"/>
-                <a:t>The results of individual simulations are combined into</a:t>
-              </a:r>
-              <a:r>
-                <a:rPr lang="en-US" sz="4000" dirty="0" smtClean="0"/>
-                <a:t> the </a:t>
+                <a:t>The results of individual simulations are combined into the aggregated hazard map, to the left in the dashboard. The aggregate map shows expected inundation level over all simulated events. Users can interact with this map by </a:t>
+              </a:r>
+              <a:r>
+                <a:rPr lang="en-US" sz="4000" b="1" dirty="0"/>
+                <a:t>panning</a:t>
               </a:r>
               <a:r>
                 <a:rPr lang="en-US" sz="4000" dirty="0"/>
-                <a:t>aggregated hazard </a:t>
-              </a:r>
-              <a:r>
-                <a:rPr lang="en-US" sz="4000" dirty="0" smtClean="0"/>
-                <a:t>map, to the left in the dashboard. The aggregate map shows expected inundation level over all simulated events. Users can interact with this map by </a:t>
-              </a:r>
-              <a:r>
-                <a:rPr lang="en-US" sz="4000" b="1" dirty="0" smtClean="0"/>
-                <a:t>panning</a:t>
-              </a:r>
-              <a:r>
-                <a:rPr lang="en-US" sz="4000" dirty="0" smtClean="0"/>
                 <a:t>, </a:t>
               </a:r>
               <a:r>
-                <a:rPr lang="en-US" sz="4000" b="1" dirty="0" smtClean="0"/>
+                <a:rPr lang="en-US" sz="4000" b="1" dirty="0"/>
                 <a:t>zooming</a:t>
               </a:r>
               <a:r>
-                <a:rPr lang="en-US" sz="4000" dirty="0" smtClean="0"/>
+                <a:rPr lang="en-US" sz="4000" dirty="0"/>
                 <a:t>, and </a:t>
               </a:r>
               <a:r>
-                <a:rPr lang="en-US" sz="4000" b="1" dirty="0" smtClean="0"/>
+                <a:rPr lang="en-US" sz="4000" b="1" dirty="0"/>
                 <a:t>selecting</a:t>
               </a:r>
               <a:r>
-                <a:rPr lang="en-US" sz="4000" dirty="0" smtClean="0"/>
+                <a:rPr lang="en-US" sz="4000" dirty="0"/>
                 <a:t> areas of interest. Selecting an area pans and centers the small multiples plots to to the same location.</a:t>
               </a:r>
             </a:p>
             <a:p>
-              <a:endParaRPr lang="en-US" sz="4000" dirty="0" smtClean="0"/>
+              <a:endParaRPr lang="en-US" sz="4000" dirty="0"/>
             </a:p>
             <a:p>
               <a:r>
-                <a:rPr lang="en-US" sz="4000" dirty="0" smtClean="0"/>
+                <a:rPr lang="en-US" sz="4000" dirty="0"/>
                 <a:t>For the aggregate map and small multiples, users can also choose between two types of simulations: near-field (</a:t>
               </a:r>
               <a:r>
-                <a:rPr lang="en-US" sz="4000" dirty="0" err="1" smtClean="0"/>
+                <a:rPr lang="en-US" sz="4000" dirty="0" err="1"/>
                 <a:t>Cascadia</a:t>
               </a:r>
               <a:r>
-                <a:rPr lang="en-US" sz="4000" dirty="0" smtClean="0"/>
+                <a:rPr lang="en-US" sz="4000" dirty="0"/>
                 <a:t>) and far-field (other origin) events, which vary in severity and likelihood.</a:t>
               </a:r>
             </a:p>
@@ -4791,18 +4538,13 @@
           <a:lstStyle/>
           <a:p>
             <a:r>
-              <a:rPr lang="en-US" sz="7200" b="1" dirty="0" smtClean="0">
+              <a:rPr lang="en-US" sz="7200" b="1" dirty="0">
                 <a:solidFill>
                   <a:srgbClr val="33006F"/>
                 </a:solidFill>
               </a:rPr>
               <a:t>Visualization</a:t>
             </a:r>
-            <a:endParaRPr lang="en-US" sz="7200" b="1" dirty="0">
-              <a:solidFill>
-                <a:srgbClr val="33006F"/>
-              </a:solidFill>
-            </a:endParaRPr>
           </a:p>
         </p:txBody>
       </p:sp>
@@ -4843,18 +4585,13 @@
             <a:lstStyle/>
             <a:p>
               <a:r>
-                <a:rPr lang="en-US" sz="5400" b="1" dirty="0" smtClean="0">
+                <a:rPr lang="en-US" sz="5400" b="1" dirty="0">
                   <a:solidFill>
                     <a:srgbClr val="33006F"/>
                   </a:solidFill>
                 </a:rPr>
                 <a:t>Interactive Probability Explorer</a:t>
               </a:r>
-              <a:endParaRPr lang="en-US" sz="5400" b="1" dirty="0">
-                <a:solidFill>
-                  <a:srgbClr val="33006F"/>
-                </a:solidFill>
-              </a:endParaRPr>
             </a:p>
           </p:txBody>
         </p:sp>
@@ -4882,10 +4619,9 @@
             <a:p>
               <a:pPr algn="just"/>
               <a:r>
-                <a:rPr lang="en-US" sz="4000" dirty="0" smtClean="0"/>
+                <a:rPr lang="en-US" sz="4000" dirty="0"/>
                 <a:t>To mitigate user confusion about annual probabilities, we provide an interactive probability calculator allowing them to explore outcome likelihoods.</a:t>
               </a:r>
-              <a:endParaRPr lang="en-US" sz="4000" dirty="0"/>
             </a:p>
           </p:txBody>
         </p:sp>
@@ -4914,21 +4650,16 @@
           <a:p>
             <a:r>
               <a:rPr lang="en-US" sz="3200" dirty="0"/>
-              <a:t>Figure 1</a:t>
-            </a:r>
-            <a:r>
-              <a:rPr lang="en-US" sz="3200" dirty="0" smtClean="0"/>
-              <a:t>. The data we are visualizing: (a) inundation level zeta is the height of water above normal, (</a:t>
-            </a:r>
-            <a:r>
-              <a:rPr lang="en-US" sz="3200" dirty="0" err="1" smtClean="0"/>
+              <a:t>Figure 1. The data we are visualizing: (a) inundation level zeta is the height of water above normal, (</a:t>
+            </a:r>
+            <a:r>
+              <a:rPr lang="en-US" sz="3200" dirty="0" err="1"/>
               <a:t>b</a:t>
             </a:r>
             <a:r>
-              <a:rPr lang="en-US" sz="3200" dirty="0" smtClean="0"/>
+              <a:rPr lang="en-US" sz="3200" dirty="0"/>
               <a:t>) an example hazard function.</a:t>
             </a:r>
-            <a:endParaRPr lang="en-US" sz="3200" dirty="0"/>
           </a:p>
         </p:txBody>
       </p:sp>
@@ -4956,17 +4687,16 @@
           <a:p>
             <a:pPr algn="just"/>
             <a:r>
-              <a:rPr lang="en-US" sz="4000" dirty="0" smtClean="0"/>
+              <a:rPr lang="en-US" sz="4000" dirty="0"/>
               <a:t>All graphics in our visualization are built using the Google Maps API.</a:t>
             </a:r>
           </a:p>
           <a:p>
             <a:pPr algn="just"/>
             <a:r>
-              <a:rPr lang="en-US" sz="4000" dirty="0" smtClean="0"/>
+              <a:rPr lang="en-US" sz="4000" dirty="0"/>
               <a:t>Throughout, inundation levels are overlaid on the maps as shaded contour  plots, with color encoding water depth (meters). </a:t>
             </a:r>
-            <a:endParaRPr lang="en-US" sz="4000" dirty="0"/>
           </a:p>
         </p:txBody>
       </p:sp>
@@ -5041,38 +4771,17 @@
             <a:p>
               <a:pPr algn="just"/>
               <a:r>
-                <a:rPr lang="en-US" sz="4000" dirty="0" smtClean="0"/>
-                <a:t>The flipbook animates through the full set of 13 simulations, showing each on the map. The flipbook was inspired by the sampling-based visualizations of uncertainty at the Interactive Data Lab at the University of Washington </a:t>
-              </a:r>
-              <a:r>
-                <a:rPr lang="en-US" sz="4000" dirty="0" smtClean="0"/>
-                <a:t>[</a:t>
-              </a:r>
-              <a:r>
                 <a:rPr lang="en-US" sz="4000" dirty="0"/>
-                <a:t>4</a:t>
-              </a:r>
-              <a:r>
-                <a:rPr lang="en-US" sz="4000" dirty="0" smtClean="0"/>
-                <a:t>], </a:t>
-              </a:r>
-              <a:r>
-                <a:rPr lang="en-US" sz="4000" dirty="0" smtClean="0"/>
-                <a:t>and gives the viewer an introduction to the </a:t>
-              </a:r>
-              <a:r>
-                <a:rPr lang="en-US" sz="4000" b="1" dirty="0" smtClean="0"/>
+                <a:t>The flipbook animates through the full set of 13 simulations, showing each on the map. The flipbook was inspired by the sampling-based visualizations of uncertainty at the Interactive Data Lab at the University of Washington [4], and gives the viewer an introduction to the </a:t>
+              </a:r>
+              <a:r>
+                <a:rPr lang="en-US" sz="4000" b="1" dirty="0"/>
                 <a:t>variability </a:t>
               </a:r>
               <a:r>
-                <a:rPr lang="en-US" sz="4000" dirty="0" smtClean="0"/>
-                <a:t>inherent in the data </a:t>
-              </a:r>
-              <a:r>
-                <a:rPr lang="en-US" sz="4000" dirty="0" smtClean="0"/>
-                <a:t>. </a:t>
-              </a:r>
-              <a:endParaRPr lang="en-US" sz="4000" dirty="0" smtClean="0"/>
+                <a:rPr lang="en-US" sz="4000" dirty="0"/>
+                <a:t>inherent in the data . </a:t>
+              </a:r>
             </a:p>
           </p:txBody>
         </p:sp>
@@ -5124,10 +4833,9 @@
             <a:p>
               <a:pPr algn="just"/>
               <a:r>
-                <a:rPr lang="en-US" sz="4000" dirty="0" smtClean="0"/>
+                <a:rPr lang="en-US" sz="4000" dirty="0"/>
                 <a:t>We have a relatively small number of simulations, and the likelihood of each event can vary by orders of magnitude. In order to show a range of possible events including the most extreme simulations, we postpone considerations of the likelihood of each event for the aggregate maps and probability explorer to follow.</a:t>
               </a:r>
-              <a:endParaRPr lang="en-US" sz="4000" dirty="0"/>
             </a:p>
           </p:txBody>
         </p:sp>
@@ -5155,13 +4863,8 @@
             <a:p>
               <a:r>
                 <a:rPr lang="en-US" sz="3200" dirty="0"/>
-                <a:t>Figure</a:t>
-              </a:r>
-              <a:r>
-                <a:rPr lang="en-US" sz="3200" dirty="0" smtClean="0"/>
-                <a:t> 2. A single flipbook slide.</a:t>
-              </a:r>
-              <a:endParaRPr lang="en-US" sz="3200" dirty="0"/>
+                <a:t>Figure 2. A single flipbook slide.</a:t>
+              </a:r>
             </a:p>
           </p:txBody>
         </p:sp>
@@ -5184,6 +4887,45 @@
           <a:xfrm>
             <a:off x="22098000" y="22606576"/>
             <a:ext cx="6910466" cy="1828800"/>
+          </a:xfrm>
+          <a:prstGeom prst="rect">
+            <a:avLst/>
+          </a:prstGeom>
+        </p:spPr>
+      </p:pic>
+      <p:pic>
+        <p:nvPicPr>
+          <p:cNvPr id="16" name="Graphic 15">
+            <a:extLst>
+              <a:ext uri="{FF2B5EF4-FFF2-40B4-BE49-F238E27FC236}">
+                <a16:creationId xmlns:a16="http://schemas.microsoft.com/office/drawing/2014/main" id="{1C0DAB8A-927F-664F-8C2F-9024F28C3096}"/>
+              </a:ext>
+            </a:extLst>
+          </p:cNvPr>
+          <p:cNvPicPr>
+            <a:picLocks noChangeAspect="1"/>
+          </p:cNvPicPr>
+          <p:nvPr/>
+        </p:nvPicPr>
+        <p:blipFill>
+          <a:blip r:embed="rId6">
+            <a:extLst>
+              <a:ext uri="{28A0092B-C50C-407E-A947-70E740481C1C}">
+                <a14:useLocalDpi xmlns:a14="http://schemas.microsoft.com/office/drawing/2010/main" val="0"/>
+              </a:ext>
+              <a:ext uri="{96DAC541-7B7A-43D3-8B79-37D633B846F1}">
+                <asvg:svgBlip xmlns:asvg="http://schemas.microsoft.com/office/drawing/2016/SVG/main" r:embed="rId7"/>
+              </a:ext>
+            </a:extLst>
+          </a:blip>
+          <a:stretch>
+            <a:fillRect/>
+          </a:stretch>
+        </p:blipFill>
+        <p:spPr>
+          <a:xfrm>
+            <a:off x="609600" y="23044547"/>
+            <a:ext cx="5791200" cy="3860800"/>
           </a:xfrm>
           <a:prstGeom prst="rect">
             <a:avLst/>

</xml_diff>

<commit_message>
Add zeta contour from python notebook to poster
</commit_message>
<xml_diff>
--- a/poster/poster.pptx
+++ b/poster/poster.pptx
@@ -4029,10 +4029,7 @@
             </a:p>
             <a:p>
               <a:pPr marL="0" lvl="1" algn="just"/>
-              <a:r>
-                <a:rPr lang="en-US" sz="4000" dirty="0"/>
-                <a:t>[ an example hazard function ]</a:t>
-              </a:r>
+              <a:endParaRPr lang="en-US" sz="4000" dirty="0"/>
             </a:p>
             <a:p>
               <a:pPr marL="0" lvl="1" algn="just"/>
@@ -4925,6 +4922,42 @@
         <p:spPr>
           <a:xfrm>
             <a:off x="609600" y="23044547"/>
+            <a:ext cx="5791200" cy="3860800"/>
+          </a:xfrm>
+          <a:prstGeom prst="rect">
+            <a:avLst/>
+          </a:prstGeom>
+        </p:spPr>
+      </p:pic>
+      <p:pic>
+        <p:nvPicPr>
+          <p:cNvPr id="4" name="Picture 3">
+            <a:extLst>
+              <a:ext uri="{FF2B5EF4-FFF2-40B4-BE49-F238E27FC236}">
+                <a16:creationId xmlns:a16="http://schemas.microsoft.com/office/drawing/2014/main" id="{FB15D964-42E3-524C-B0D1-92A94444B38A}"/>
+              </a:ext>
+            </a:extLst>
+          </p:cNvPr>
+          <p:cNvPicPr>
+            <a:picLocks noChangeAspect="1"/>
+          </p:cNvPicPr>
+          <p:nvPr/>
+        </p:nvPicPr>
+        <p:blipFill>
+          <a:blip r:embed="rId8">
+            <a:extLst>
+              <a:ext uri="{28A0092B-C50C-407E-A947-70E740481C1C}">
+                <a14:useLocalDpi xmlns:a14="http://schemas.microsoft.com/office/drawing/2010/main" val="0"/>
+              </a:ext>
+            </a:extLst>
+          </a:blip>
+          <a:stretch>
+            <a:fillRect/>
+          </a:stretch>
+        </p:blipFill>
+        <p:spPr>
+          <a:xfrm>
+            <a:off x="7467600" y="23044547"/>
             <a:ext cx="5791200" cy="3860800"/>
           </a:xfrm>
           <a:prstGeom prst="rect">

</xml_diff>